<commit_message>
minor change to presentation, and continue working on concentration.py
</commit_message>
<xml_diff>
--- a/Cascading thesis/Presentation/Halfway presentation.pptx
+++ b/Cascading thesis/Presentation/Halfway presentation.pptx
@@ -123,13 +123,29 @@
       </a:defRPr>
     </a:lvl9pPr>
   </p:defaultTextStyle>
+  <p:extLst>
+    <p:ext uri="{EFAFB233-063F-42B5-8137-9DF3F51BA10A}">
+      <p15:sldGuideLst xmlns:p15="http://schemas.microsoft.com/office/powerpoint/2012/main">
+        <p15:guide id="1" orient="horz" pos="2160">
+          <p15:clr>
+            <a:srgbClr val="A4A3A4"/>
+          </p15:clr>
+        </p15:guide>
+        <p15:guide id="2" pos="2880">
+          <p15:clr>
+            <a:srgbClr val="A4A3A4"/>
+          </p15:clr>
+        </p15:guide>
+      </p15:sldGuideLst>
+    </p:ext>
+  </p:extLst>
 </p:presentation>
 </file>
 
 <file path=ppt/charts/chart1.xml><?xml version="1.0" encoding="utf-8"?>
 <c:chartSpace xmlns:c="http://schemas.openxmlformats.org/drawingml/2006/chart" xmlns:a="http://schemas.openxmlformats.org/drawingml/2006/main" xmlns:r="http://schemas.openxmlformats.org/officeDocument/2006/relationships">
   <c:date1904 val="0"/>
-  <c:lang val="nl-NL"/>
+  <c:lang val="en-US"/>
   <c:roundedCorners val="0"/>
   <mc:AlternateContent xmlns:mc="http://schemas.openxmlformats.org/markup-compatibility/2006">
     <mc:Choice xmlns:c14="http://schemas.microsoft.com/office/drawing/2007/8/2/chart" Requires="c14">
@@ -162,7 +178,6 @@
           </a:p>
         </c:rich>
       </c:tx>
-      <c:layout/>
       <c:overlay val="0"/>
     </c:title>
     <c:autoTitleDeleted val="0"/>
@@ -506,20 +521,21 @@
           <c:showBubbleSize val="0"/>
         </c:dLbls>
         <c:gapWidth val="150"/>
-        <c:axId val="139546624"/>
-        <c:axId val="139548544"/>
+        <c:axId val="647273872"/>
+        <c:axId val="647274960"/>
       </c:barChart>
       <c:catAx>
-        <c:axId val="139546624"/>
+        <c:axId val="647273872"/>
         <c:scaling>
           <c:orientation val="minMax"/>
         </c:scaling>
         <c:delete val="0"/>
         <c:axPos val="b"/>
+        <c:numFmt formatCode="General" sourceLinked="0"/>
         <c:majorTickMark val="out"/>
         <c:minorTickMark val="none"/>
         <c:tickLblPos val="nextTo"/>
-        <c:crossAx val="139548544"/>
+        <c:crossAx val="647274960"/>
         <c:crossesAt val="1.0000000000000002E-2"/>
         <c:auto val="1"/>
         <c:lblAlgn val="ctr"/>
@@ -527,7 +543,7 @@
         <c:noMultiLvlLbl val="0"/>
       </c:catAx>
       <c:valAx>
-        <c:axId val="139548544"/>
+        <c:axId val="647274960"/>
         <c:scaling>
           <c:logBase val="10"/>
           <c:orientation val="minMax"/>
@@ -539,7 +555,7 @@
         <c:majorTickMark val="out"/>
         <c:minorTickMark val="none"/>
         <c:tickLblPos val="nextTo"/>
-        <c:crossAx val="139546624"/>
+        <c:crossAx val="647273872"/>
         <c:crosses val="autoZero"/>
         <c:crossBetween val="between"/>
       </c:valAx>
@@ -564,7 +580,7 @@
           <a:pPr>
             <a:defRPr sz="1200"/>
           </a:pPr>
-          <a:endParaRPr lang="nl-NL"/>
+          <a:endParaRPr lang="en-US"/>
         </a:p>
       </c:txPr>
     </c:legend>
@@ -6196,333 +6212,6 @@
       <dsp:cNvGrpSpPr/>
     </dsp:nvGrpSpPr>
     <dsp:grpSpPr/>
-    <dsp:sp modelId="{24488344-03B9-4938-8268-6A2816D722F0}">
-      <dsp:nvSpPr>
-        <dsp:cNvPr id="0" name=""/>
-        <dsp:cNvSpPr/>
-      </dsp:nvSpPr>
-      <dsp:spPr>
-        <a:xfrm>
-          <a:off x="0" y="466"/>
-          <a:ext cx="1354183" cy="0"/>
-        </a:xfrm>
-        <a:prstGeom prst="line">
-          <a:avLst/>
-        </a:prstGeom>
-        <a:solidFill>
-          <a:schemeClr val="accent1">
-            <a:hueOff val="0"/>
-            <a:satOff val="0"/>
-            <a:lumOff val="0"/>
-            <a:alphaOff val="0"/>
-          </a:schemeClr>
-        </a:solidFill>
-        <a:ln w="25400" cap="flat" cmpd="sng" algn="ctr">
-          <a:solidFill>
-            <a:schemeClr val="accent1">
-              <a:hueOff val="0"/>
-              <a:satOff val="0"/>
-              <a:lumOff val="0"/>
-              <a:alphaOff val="0"/>
-            </a:schemeClr>
-          </a:solidFill>
-          <a:prstDash val="solid"/>
-        </a:ln>
-        <a:effectLst/>
-      </dsp:spPr>
-      <dsp:style>
-        <a:lnRef idx="2">
-          <a:scrgbClr r="0" g="0" b="0"/>
-        </a:lnRef>
-        <a:fillRef idx="1">
-          <a:scrgbClr r="0" g="0" b="0"/>
-        </a:fillRef>
-        <a:effectRef idx="0">
-          <a:scrgbClr r="0" g="0" b="0"/>
-        </a:effectRef>
-        <a:fontRef idx="minor">
-          <a:schemeClr val="lt1"/>
-        </a:fontRef>
-      </dsp:style>
-    </dsp:sp>
-    <dsp:sp modelId="{D778619D-D5FF-46A3-8581-B8F8902A789A}">
-      <dsp:nvSpPr>
-        <dsp:cNvPr id="0" name=""/>
-        <dsp:cNvSpPr/>
-      </dsp:nvSpPr>
-      <dsp:spPr>
-        <a:xfrm>
-          <a:off x="0" y="466"/>
-          <a:ext cx="1354183" cy="317838"/>
-        </a:xfrm>
-        <a:prstGeom prst="rect">
-          <a:avLst/>
-        </a:prstGeom>
-        <a:noFill/>
-        <a:ln>
-          <a:noFill/>
-        </a:ln>
-        <a:effectLst/>
-      </dsp:spPr>
-      <dsp:style>
-        <a:lnRef idx="0">
-          <a:scrgbClr r="0" g="0" b="0"/>
-        </a:lnRef>
-        <a:fillRef idx="0">
-          <a:scrgbClr r="0" g="0" b="0"/>
-        </a:fillRef>
-        <a:effectRef idx="0">
-          <a:scrgbClr r="0" g="0" b="0"/>
-        </a:effectRef>
-        <a:fontRef idx="minor"/>
-      </dsp:style>
-      <dsp:txBody>
-        <a:bodyPr spcFirstLastPara="0" vert="horz" wrap="square" lIns="53340" tIns="53340" rIns="53340" bIns="53340" numCol="1" spcCol="1270" anchor="t" anchorCtr="0">
-          <a:noAutofit/>
-        </a:bodyPr>
-        <a:lstStyle/>
-        <a:p>
-          <a:pPr lvl="0" algn="l" defTabSz="622300">
-            <a:lnSpc>
-              <a:spcPct val="90000"/>
-            </a:lnSpc>
-            <a:spcBef>
-              <a:spcPct val="0"/>
-            </a:spcBef>
-            <a:spcAft>
-              <a:spcPct val="35000"/>
-            </a:spcAft>
-          </a:pPr>
-          <a:r>
-            <a:rPr lang="en-GB" sz="1400" kern="1200" dirty="0" smtClean="0"/>
-            <a:t>Molecule 1</a:t>
-          </a:r>
-          <a:endParaRPr lang="nl-NL" sz="1400" kern="1200" dirty="0"/>
-        </a:p>
-      </dsp:txBody>
-      <dsp:txXfrm>
-        <a:off x="0" y="466"/>
-        <a:ext cx="1354183" cy="317838"/>
-      </dsp:txXfrm>
-    </dsp:sp>
-    <dsp:sp modelId="{6073C3BF-591B-4F23-A6DC-EEA692BF150E}">
-      <dsp:nvSpPr>
-        <dsp:cNvPr id="0" name=""/>
-        <dsp:cNvSpPr/>
-      </dsp:nvSpPr>
-      <dsp:spPr>
-        <a:xfrm>
-          <a:off x="0" y="318304"/>
-          <a:ext cx="1354183" cy="0"/>
-        </a:xfrm>
-        <a:prstGeom prst="line">
-          <a:avLst/>
-        </a:prstGeom>
-        <a:solidFill>
-          <a:schemeClr val="accent1">
-            <a:hueOff val="0"/>
-            <a:satOff val="0"/>
-            <a:lumOff val="0"/>
-            <a:alphaOff val="0"/>
-          </a:schemeClr>
-        </a:solidFill>
-        <a:ln w="25400" cap="flat" cmpd="sng" algn="ctr">
-          <a:solidFill>
-            <a:schemeClr val="accent1">
-              <a:hueOff val="0"/>
-              <a:satOff val="0"/>
-              <a:lumOff val="0"/>
-              <a:alphaOff val="0"/>
-            </a:schemeClr>
-          </a:solidFill>
-          <a:prstDash val="solid"/>
-        </a:ln>
-        <a:effectLst/>
-      </dsp:spPr>
-      <dsp:style>
-        <a:lnRef idx="2">
-          <a:scrgbClr r="0" g="0" b="0"/>
-        </a:lnRef>
-        <a:fillRef idx="1">
-          <a:scrgbClr r="0" g="0" b="0"/>
-        </a:fillRef>
-        <a:effectRef idx="0">
-          <a:scrgbClr r="0" g="0" b="0"/>
-        </a:effectRef>
-        <a:fontRef idx="minor">
-          <a:schemeClr val="lt1"/>
-        </a:fontRef>
-      </dsp:style>
-    </dsp:sp>
-    <dsp:sp modelId="{6A717171-A44D-4353-9F36-4B4321A28F32}">
-      <dsp:nvSpPr>
-        <dsp:cNvPr id="0" name=""/>
-        <dsp:cNvSpPr/>
-      </dsp:nvSpPr>
-      <dsp:spPr>
-        <a:xfrm>
-          <a:off x="0" y="318304"/>
-          <a:ext cx="1354183" cy="317838"/>
-        </a:xfrm>
-        <a:prstGeom prst="rect">
-          <a:avLst/>
-        </a:prstGeom>
-        <a:noFill/>
-        <a:ln>
-          <a:noFill/>
-        </a:ln>
-        <a:effectLst/>
-      </dsp:spPr>
-      <dsp:style>
-        <a:lnRef idx="0">
-          <a:scrgbClr r="0" g="0" b="0"/>
-        </a:lnRef>
-        <a:fillRef idx="0">
-          <a:scrgbClr r="0" g="0" b="0"/>
-        </a:fillRef>
-        <a:effectRef idx="0">
-          <a:scrgbClr r="0" g="0" b="0"/>
-        </a:effectRef>
-        <a:fontRef idx="minor"/>
-      </dsp:style>
-      <dsp:txBody>
-        <a:bodyPr spcFirstLastPara="0" vert="horz" wrap="square" lIns="53340" tIns="53340" rIns="53340" bIns="53340" numCol="1" spcCol="1270" anchor="t" anchorCtr="0">
-          <a:noAutofit/>
-        </a:bodyPr>
-        <a:lstStyle/>
-        <a:p>
-          <a:pPr lvl="0" algn="l" defTabSz="622300">
-            <a:lnSpc>
-              <a:spcPct val="90000"/>
-            </a:lnSpc>
-            <a:spcBef>
-              <a:spcPct val="0"/>
-            </a:spcBef>
-            <a:spcAft>
-              <a:spcPct val="35000"/>
-            </a:spcAft>
-          </a:pPr>
-          <a:r>
-            <a:rPr lang="en-GB" sz="1400" kern="1200" dirty="0" smtClean="0"/>
-            <a:t>…</a:t>
-          </a:r>
-          <a:endParaRPr lang="nl-NL" sz="1400" kern="1200" dirty="0"/>
-        </a:p>
-      </dsp:txBody>
-      <dsp:txXfrm>
-        <a:off x="0" y="318304"/>
-        <a:ext cx="1354183" cy="317838"/>
-      </dsp:txXfrm>
-    </dsp:sp>
-    <dsp:sp modelId="{7762E45A-D92B-4217-AAEB-09D39F4615D0}">
-      <dsp:nvSpPr>
-        <dsp:cNvPr id="0" name=""/>
-        <dsp:cNvSpPr/>
-      </dsp:nvSpPr>
-      <dsp:spPr>
-        <a:xfrm>
-          <a:off x="0" y="636143"/>
-          <a:ext cx="1354183" cy="0"/>
-        </a:xfrm>
-        <a:prstGeom prst="line">
-          <a:avLst/>
-        </a:prstGeom>
-        <a:solidFill>
-          <a:schemeClr val="accent1">
-            <a:hueOff val="0"/>
-            <a:satOff val="0"/>
-            <a:lumOff val="0"/>
-            <a:alphaOff val="0"/>
-          </a:schemeClr>
-        </a:solidFill>
-        <a:ln w="25400" cap="flat" cmpd="sng" algn="ctr">
-          <a:solidFill>
-            <a:schemeClr val="accent1">
-              <a:hueOff val="0"/>
-              <a:satOff val="0"/>
-              <a:lumOff val="0"/>
-              <a:alphaOff val="0"/>
-            </a:schemeClr>
-          </a:solidFill>
-          <a:prstDash val="solid"/>
-        </a:ln>
-        <a:effectLst/>
-      </dsp:spPr>
-      <dsp:style>
-        <a:lnRef idx="2">
-          <a:scrgbClr r="0" g="0" b="0"/>
-        </a:lnRef>
-        <a:fillRef idx="1">
-          <a:scrgbClr r="0" g="0" b="0"/>
-        </a:fillRef>
-        <a:effectRef idx="0">
-          <a:scrgbClr r="0" g="0" b="0"/>
-        </a:effectRef>
-        <a:fontRef idx="minor">
-          <a:schemeClr val="lt1"/>
-        </a:fontRef>
-      </dsp:style>
-    </dsp:sp>
-    <dsp:sp modelId="{26EE5A52-A089-41C3-9ABB-B002C72BB09D}">
-      <dsp:nvSpPr>
-        <dsp:cNvPr id="0" name=""/>
-        <dsp:cNvSpPr/>
-      </dsp:nvSpPr>
-      <dsp:spPr>
-        <a:xfrm>
-          <a:off x="0" y="636143"/>
-          <a:ext cx="1354183" cy="317838"/>
-        </a:xfrm>
-        <a:prstGeom prst="rect">
-          <a:avLst/>
-        </a:prstGeom>
-        <a:noFill/>
-        <a:ln>
-          <a:noFill/>
-        </a:ln>
-        <a:effectLst/>
-      </dsp:spPr>
-      <dsp:style>
-        <a:lnRef idx="0">
-          <a:scrgbClr r="0" g="0" b="0"/>
-        </a:lnRef>
-        <a:fillRef idx="0">
-          <a:scrgbClr r="0" g="0" b="0"/>
-        </a:fillRef>
-        <a:effectRef idx="0">
-          <a:scrgbClr r="0" g="0" b="0"/>
-        </a:effectRef>
-        <a:fontRef idx="minor"/>
-      </dsp:style>
-      <dsp:txBody>
-        <a:bodyPr spcFirstLastPara="0" vert="horz" wrap="square" lIns="53340" tIns="53340" rIns="53340" bIns="53340" numCol="1" spcCol="1270" anchor="t" anchorCtr="0">
-          <a:noAutofit/>
-        </a:bodyPr>
-        <a:lstStyle/>
-        <a:p>
-          <a:pPr lvl="0" algn="l" defTabSz="622300">
-            <a:lnSpc>
-              <a:spcPct val="90000"/>
-            </a:lnSpc>
-            <a:spcBef>
-              <a:spcPct val="0"/>
-            </a:spcBef>
-            <a:spcAft>
-              <a:spcPct val="35000"/>
-            </a:spcAft>
-          </a:pPr>
-          <a:r>
-            <a:rPr lang="en-GB" sz="1400" kern="1200" dirty="0" smtClean="0"/>
-            <a:t>Molecule 400</a:t>
-          </a:r>
-          <a:endParaRPr lang="nl-NL" sz="1400" kern="1200" dirty="0"/>
-        </a:p>
-      </dsp:txBody>
-      <dsp:txXfrm>
-        <a:off x="0" y="636143"/>
-        <a:ext cx="1354183" cy="317838"/>
-      </dsp:txXfrm>
-    </dsp:sp>
   </dsp:spTree>
 </dsp:drawing>
 </file>
@@ -6535,454 +6224,6 @@
       <dsp:cNvGrpSpPr/>
     </dsp:nvGrpSpPr>
     <dsp:grpSpPr/>
-    <dsp:sp modelId="{24488344-03B9-4938-8268-6A2816D722F0}">
-      <dsp:nvSpPr>
-        <dsp:cNvPr id="0" name=""/>
-        <dsp:cNvSpPr/>
-      </dsp:nvSpPr>
-      <dsp:spPr>
-        <a:xfrm>
-          <a:off x="0" y="0"/>
-          <a:ext cx="1354183" cy="0"/>
-        </a:xfrm>
-        <a:prstGeom prst="line">
-          <a:avLst/>
-        </a:prstGeom>
-        <a:solidFill>
-          <a:schemeClr val="accent1">
-            <a:hueOff val="0"/>
-            <a:satOff val="0"/>
-            <a:lumOff val="0"/>
-            <a:alphaOff val="0"/>
-          </a:schemeClr>
-        </a:solidFill>
-        <a:ln w="25400" cap="flat" cmpd="sng" algn="ctr">
-          <a:solidFill>
-            <a:schemeClr val="accent1">
-              <a:hueOff val="0"/>
-              <a:satOff val="0"/>
-              <a:lumOff val="0"/>
-              <a:alphaOff val="0"/>
-            </a:schemeClr>
-          </a:solidFill>
-          <a:prstDash val="solid"/>
-        </a:ln>
-        <a:effectLst/>
-      </dsp:spPr>
-      <dsp:style>
-        <a:lnRef idx="2">
-          <a:scrgbClr r="0" g="0" b="0"/>
-        </a:lnRef>
-        <a:fillRef idx="1">
-          <a:scrgbClr r="0" g="0" b="0"/>
-        </a:fillRef>
-        <a:effectRef idx="0">
-          <a:scrgbClr r="0" g="0" b="0"/>
-        </a:effectRef>
-        <a:fontRef idx="minor">
-          <a:schemeClr val="lt1"/>
-        </a:fontRef>
-      </dsp:style>
-    </dsp:sp>
-    <dsp:sp modelId="{D778619D-D5FF-46A3-8581-B8F8902A789A}">
-      <dsp:nvSpPr>
-        <dsp:cNvPr id="0" name=""/>
-        <dsp:cNvSpPr/>
-      </dsp:nvSpPr>
-      <dsp:spPr>
-        <a:xfrm>
-          <a:off x="0" y="0"/>
-          <a:ext cx="1354183" cy="238612"/>
-        </a:xfrm>
-        <a:prstGeom prst="rect">
-          <a:avLst/>
-        </a:prstGeom>
-        <a:noFill/>
-        <a:ln>
-          <a:noFill/>
-        </a:ln>
-        <a:effectLst/>
-      </dsp:spPr>
-      <dsp:style>
-        <a:lnRef idx="0">
-          <a:scrgbClr r="0" g="0" b="0"/>
-        </a:lnRef>
-        <a:fillRef idx="0">
-          <a:scrgbClr r="0" g="0" b="0"/>
-        </a:fillRef>
-        <a:effectRef idx="0">
-          <a:scrgbClr r="0" g="0" b="0"/>
-        </a:effectRef>
-        <a:fontRef idx="minor"/>
-      </dsp:style>
-      <dsp:txBody>
-        <a:bodyPr spcFirstLastPara="0" vert="horz" wrap="square" lIns="41910" tIns="41910" rIns="41910" bIns="41910" numCol="1" spcCol="1270" anchor="t" anchorCtr="0">
-          <a:noAutofit/>
-        </a:bodyPr>
-        <a:lstStyle/>
-        <a:p>
-          <a:pPr lvl="0" algn="l" defTabSz="488950">
-            <a:lnSpc>
-              <a:spcPct val="90000"/>
-            </a:lnSpc>
-            <a:spcBef>
-              <a:spcPct val="0"/>
-            </a:spcBef>
-            <a:spcAft>
-              <a:spcPct val="35000"/>
-            </a:spcAft>
-          </a:pPr>
-          <a:r>
-            <a:rPr lang="en-GB" sz="1100" kern="1200" dirty="0" smtClean="0"/>
-            <a:t>H</a:t>
-          </a:r>
-          <a:r>
-            <a:rPr lang="en-GB" sz="1100" kern="1200" baseline="-25000" dirty="0" smtClean="0"/>
-            <a:t>2</a:t>
-          </a:r>
-          <a:r>
-            <a:rPr lang="en-GB" sz="1100" kern="1200" dirty="0" smtClean="0"/>
-            <a:t>O</a:t>
-          </a:r>
-          <a:endParaRPr lang="nl-NL" sz="1100" kern="1200" dirty="0"/>
-        </a:p>
-      </dsp:txBody>
-      <dsp:txXfrm>
-        <a:off x="0" y="0"/>
-        <a:ext cx="1354183" cy="238612"/>
-      </dsp:txXfrm>
-    </dsp:sp>
-    <dsp:sp modelId="{6073C3BF-591B-4F23-A6DC-EEA692BF150E}">
-      <dsp:nvSpPr>
-        <dsp:cNvPr id="0" name=""/>
-        <dsp:cNvSpPr/>
-      </dsp:nvSpPr>
-      <dsp:spPr>
-        <a:xfrm>
-          <a:off x="0" y="238611"/>
-          <a:ext cx="1354183" cy="0"/>
-        </a:xfrm>
-        <a:prstGeom prst="line">
-          <a:avLst/>
-        </a:prstGeom>
-        <a:solidFill>
-          <a:schemeClr val="accent1">
-            <a:hueOff val="0"/>
-            <a:satOff val="0"/>
-            <a:lumOff val="0"/>
-            <a:alphaOff val="0"/>
-          </a:schemeClr>
-        </a:solidFill>
-        <a:ln w="25400" cap="flat" cmpd="sng" algn="ctr">
-          <a:solidFill>
-            <a:schemeClr val="accent1">
-              <a:hueOff val="0"/>
-              <a:satOff val="0"/>
-              <a:lumOff val="0"/>
-              <a:alphaOff val="0"/>
-            </a:schemeClr>
-          </a:solidFill>
-          <a:prstDash val="solid"/>
-        </a:ln>
-        <a:effectLst/>
-      </dsp:spPr>
-      <dsp:style>
-        <a:lnRef idx="2">
-          <a:scrgbClr r="0" g="0" b="0"/>
-        </a:lnRef>
-        <a:fillRef idx="1">
-          <a:scrgbClr r="0" g="0" b="0"/>
-        </a:fillRef>
-        <a:effectRef idx="0">
-          <a:scrgbClr r="0" g="0" b="0"/>
-        </a:effectRef>
-        <a:fontRef idx="minor">
-          <a:schemeClr val="lt1"/>
-        </a:fontRef>
-      </dsp:style>
-    </dsp:sp>
-    <dsp:sp modelId="{6A717171-A44D-4353-9F36-4B4321A28F32}">
-      <dsp:nvSpPr>
-        <dsp:cNvPr id="0" name=""/>
-        <dsp:cNvSpPr/>
-      </dsp:nvSpPr>
-      <dsp:spPr>
-        <a:xfrm>
-          <a:off x="0" y="238612"/>
-          <a:ext cx="1354183" cy="238612"/>
-        </a:xfrm>
-        <a:prstGeom prst="rect">
-          <a:avLst/>
-        </a:prstGeom>
-        <a:noFill/>
-        <a:ln>
-          <a:noFill/>
-        </a:ln>
-        <a:effectLst/>
-      </dsp:spPr>
-      <dsp:style>
-        <a:lnRef idx="0">
-          <a:scrgbClr r="0" g="0" b="0"/>
-        </a:lnRef>
-        <a:fillRef idx="0">
-          <a:scrgbClr r="0" g="0" b="0"/>
-        </a:fillRef>
-        <a:effectRef idx="0">
-          <a:scrgbClr r="0" g="0" b="0"/>
-        </a:effectRef>
-        <a:fontRef idx="minor"/>
-      </dsp:style>
-      <dsp:txBody>
-        <a:bodyPr spcFirstLastPara="0" vert="horz" wrap="square" lIns="41910" tIns="41910" rIns="41910" bIns="41910" numCol="1" spcCol="1270" anchor="t" anchorCtr="0">
-          <a:noAutofit/>
-        </a:bodyPr>
-        <a:lstStyle/>
-        <a:p>
-          <a:pPr lvl="0" algn="l" defTabSz="488950">
-            <a:lnSpc>
-              <a:spcPct val="90000"/>
-            </a:lnSpc>
-            <a:spcBef>
-              <a:spcPct val="0"/>
-            </a:spcBef>
-            <a:spcAft>
-              <a:spcPct val="35000"/>
-            </a:spcAft>
-          </a:pPr>
-          <a:r>
-            <a:rPr lang="en-GB" sz="1100" kern="1200" dirty="0" smtClean="0"/>
-            <a:t>CO</a:t>
-          </a:r>
-          <a:r>
-            <a:rPr lang="en-GB" sz="1100" kern="1200" baseline="-25000" dirty="0" smtClean="0"/>
-            <a:t>2</a:t>
-          </a:r>
-          <a:endParaRPr lang="nl-NL" sz="1100" kern="1200" baseline="-25000" dirty="0"/>
-        </a:p>
-      </dsp:txBody>
-      <dsp:txXfrm>
-        <a:off x="0" y="238612"/>
-        <a:ext cx="1354183" cy="238612"/>
-      </dsp:txXfrm>
-    </dsp:sp>
-    <dsp:sp modelId="{140DF4FF-D747-4E51-85C6-D1BE7A3EC353}">
-      <dsp:nvSpPr>
-        <dsp:cNvPr id="0" name=""/>
-        <dsp:cNvSpPr/>
-      </dsp:nvSpPr>
-      <dsp:spPr>
-        <a:xfrm>
-          <a:off x="0" y="477223"/>
-          <a:ext cx="1354183" cy="0"/>
-        </a:xfrm>
-        <a:prstGeom prst="line">
-          <a:avLst/>
-        </a:prstGeom>
-        <a:solidFill>
-          <a:schemeClr val="accent1">
-            <a:hueOff val="0"/>
-            <a:satOff val="0"/>
-            <a:lumOff val="0"/>
-            <a:alphaOff val="0"/>
-          </a:schemeClr>
-        </a:solidFill>
-        <a:ln w="25400" cap="flat" cmpd="sng" algn="ctr">
-          <a:solidFill>
-            <a:schemeClr val="accent1">
-              <a:hueOff val="0"/>
-              <a:satOff val="0"/>
-              <a:lumOff val="0"/>
-              <a:alphaOff val="0"/>
-            </a:schemeClr>
-          </a:solidFill>
-          <a:prstDash val="solid"/>
-        </a:ln>
-        <a:effectLst/>
-      </dsp:spPr>
-      <dsp:style>
-        <a:lnRef idx="2">
-          <a:scrgbClr r="0" g="0" b="0"/>
-        </a:lnRef>
-        <a:fillRef idx="1">
-          <a:scrgbClr r="0" g="0" b="0"/>
-        </a:fillRef>
-        <a:effectRef idx="0">
-          <a:scrgbClr r="0" g="0" b="0"/>
-        </a:effectRef>
-        <a:fontRef idx="minor">
-          <a:schemeClr val="lt1"/>
-        </a:fontRef>
-      </dsp:style>
-    </dsp:sp>
-    <dsp:sp modelId="{5B9F906F-DA12-430F-ADB4-CBCA5A498B63}">
-      <dsp:nvSpPr>
-        <dsp:cNvPr id="0" name=""/>
-        <dsp:cNvSpPr/>
-      </dsp:nvSpPr>
-      <dsp:spPr>
-        <a:xfrm>
-          <a:off x="0" y="477224"/>
-          <a:ext cx="1354183" cy="238612"/>
-        </a:xfrm>
-        <a:prstGeom prst="rect">
-          <a:avLst/>
-        </a:prstGeom>
-        <a:noFill/>
-        <a:ln>
-          <a:noFill/>
-        </a:ln>
-        <a:effectLst/>
-      </dsp:spPr>
-      <dsp:style>
-        <a:lnRef idx="0">
-          <a:scrgbClr r="0" g="0" b="0"/>
-        </a:lnRef>
-        <a:fillRef idx="0">
-          <a:scrgbClr r="0" g="0" b="0"/>
-        </a:fillRef>
-        <a:effectRef idx="0">
-          <a:scrgbClr r="0" g="0" b="0"/>
-        </a:effectRef>
-        <a:fontRef idx="minor"/>
-      </dsp:style>
-      <dsp:txBody>
-        <a:bodyPr spcFirstLastPara="0" vert="horz" wrap="square" lIns="41910" tIns="41910" rIns="41910" bIns="41910" numCol="1" spcCol="1270" anchor="t" anchorCtr="0">
-          <a:noAutofit/>
-        </a:bodyPr>
-        <a:lstStyle/>
-        <a:p>
-          <a:pPr lvl="0" algn="l" defTabSz="488950">
-            <a:lnSpc>
-              <a:spcPct val="90000"/>
-            </a:lnSpc>
-            <a:spcBef>
-              <a:spcPct val="0"/>
-            </a:spcBef>
-            <a:spcAft>
-              <a:spcPct val="35000"/>
-            </a:spcAft>
-          </a:pPr>
-          <a:r>
-            <a:rPr lang="en-GB" sz="1100" kern="1200" baseline="-25000" dirty="0" smtClean="0"/>
-            <a:t>…</a:t>
-          </a:r>
-          <a:endParaRPr lang="nl-NL" sz="1100" kern="1200" baseline="-25000" dirty="0"/>
-        </a:p>
-      </dsp:txBody>
-      <dsp:txXfrm>
-        <a:off x="0" y="477224"/>
-        <a:ext cx="1354183" cy="238612"/>
-      </dsp:txXfrm>
-    </dsp:sp>
-    <dsp:sp modelId="{7762E45A-D92B-4217-AAEB-09D39F4615D0}">
-      <dsp:nvSpPr>
-        <dsp:cNvPr id="0" name=""/>
-        <dsp:cNvSpPr/>
-      </dsp:nvSpPr>
-      <dsp:spPr>
-        <a:xfrm>
-          <a:off x="0" y="715836"/>
-          <a:ext cx="1354183" cy="0"/>
-        </a:xfrm>
-        <a:prstGeom prst="line">
-          <a:avLst/>
-        </a:prstGeom>
-        <a:solidFill>
-          <a:schemeClr val="accent1">
-            <a:hueOff val="0"/>
-            <a:satOff val="0"/>
-            <a:lumOff val="0"/>
-            <a:alphaOff val="0"/>
-          </a:schemeClr>
-        </a:solidFill>
-        <a:ln w="25400" cap="flat" cmpd="sng" algn="ctr">
-          <a:solidFill>
-            <a:schemeClr val="accent1">
-              <a:hueOff val="0"/>
-              <a:satOff val="0"/>
-              <a:lumOff val="0"/>
-              <a:alphaOff val="0"/>
-            </a:schemeClr>
-          </a:solidFill>
-          <a:prstDash val="solid"/>
-        </a:ln>
-        <a:effectLst/>
-      </dsp:spPr>
-      <dsp:style>
-        <a:lnRef idx="2">
-          <a:scrgbClr r="0" g="0" b="0"/>
-        </a:lnRef>
-        <a:fillRef idx="1">
-          <a:scrgbClr r="0" g="0" b="0"/>
-        </a:fillRef>
-        <a:effectRef idx="0">
-          <a:scrgbClr r="0" g="0" b="0"/>
-        </a:effectRef>
-        <a:fontRef idx="minor">
-          <a:schemeClr val="lt1"/>
-        </a:fontRef>
-      </dsp:style>
-    </dsp:sp>
-    <dsp:sp modelId="{26EE5A52-A089-41C3-9ABB-B002C72BB09D}">
-      <dsp:nvSpPr>
-        <dsp:cNvPr id="0" name=""/>
-        <dsp:cNvSpPr/>
-      </dsp:nvSpPr>
-      <dsp:spPr>
-        <a:xfrm>
-          <a:off x="0" y="715836"/>
-          <a:ext cx="1354183" cy="238612"/>
-        </a:xfrm>
-        <a:prstGeom prst="rect">
-          <a:avLst/>
-        </a:prstGeom>
-        <a:noFill/>
-        <a:ln>
-          <a:noFill/>
-        </a:ln>
-        <a:effectLst/>
-      </dsp:spPr>
-      <dsp:style>
-        <a:lnRef idx="0">
-          <a:scrgbClr r="0" g="0" b="0"/>
-        </a:lnRef>
-        <a:fillRef idx="0">
-          <a:scrgbClr r="0" g="0" b="0"/>
-        </a:fillRef>
-        <a:effectRef idx="0">
-          <a:scrgbClr r="0" g="0" b="0"/>
-        </a:effectRef>
-        <a:fontRef idx="minor"/>
-      </dsp:style>
-      <dsp:txBody>
-        <a:bodyPr spcFirstLastPara="0" vert="horz" wrap="square" lIns="41910" tIns="41910" rIns="41910" bIns="41910" numCol="1" spcCol="1270" anchor="t" anchorCtr="0">
-          <a:noAutofit/>
-        </a:bodyPr>
-        <a:lstStyle/>
-        <a:p>
-          <a:pPr lvl="0" algn="l" defTabSz="488950">
-            <a:lnSpc>
-              <a:spcPct val="90000"/>
-            </a:lnSpc>
-            <a:spcBef>
-              <a:spcPct val="0"/>
-            </a:spcBef>
-            <a:spcAft>
-              <a:spcPct val="35000"/>
-            </a:spcAft>
-          </a:pPr>
-          <a:r>
-            <a:rPr lang="en-GB" sz="1100" kern="1200" dirty="0" smtClean="0"/>
-            <a:t>Ethanol</a:t>
-          </a:r>
-          <a:endParaRPr lang="nl-NL" sz="1100" kern="1200" dirty="0"/>
-        </a:p>
-      </dsp:txBody>
-      <dsp:txXfrm>
-        <a:off x="0" y="715836"/>
-        <a:ext cx="1354183" cy="238612"/>
-      </dsp:txXfrm>
-    </dsp:sp>
   </dsp:spTree>
 </dsp:drawing>
 </file>
@@ -6995,333 +6236,6 @@
       <dsp:cNvGrpSpPr/>
     </dsp:nvGrpSpPr>
     <dsp:grpSpPr/>
-    <dsp:sp modelId="{24488344-03B9-4938-8268-6A2816D722F0}">
-      <dsp:nvSpPr>
-        <dsp:cNvPr id="0" name=""/>
-        <dsp:cNvSpPr/>
-      </dsp:nvSpPr>
-      <dsp:spPr>
-        <a:xfrm>
-          <a:off x="0" y="466"/>
-          <a:ext cx="1354183" cy="0"/>
-        </a:xfrm>
-        <a:prstGeom prst="line">
-          <a:avLst/>
-        </a:prstGeom>
-        <a:solidFill>
-          <a:schemeClr val="accent1">
-            <a:hueOff val="0"/>
-            <a:satOff val="0"/>
-            <a:lumOff val="0"/>
-            <a:alphaOff val="0"/>
-          </a:schemeClr>
-        </a:solidFill>
-        <a:ln w="25400" cap="flat" cmpd="sng" algn="ctr">
-          <a:solidFill>
-            <a:schemeClr val="accent1">
-              <a:hueOff val="0"/>
-              <a:satOff val="0"/>
-              <a:lumOff val="0"/>
-              <a:alphaOff val="0"/>
-            </a:schemeClr>
-          </a:solidFill>
-          <a:prstDash val="solid"/>
-        </a:ln>
-        <a:effectLst/>
-      </dsp:spPr>
-      <dsp:style>
-        <a:lnRef idx="2">
-          <a:scrgbClr r="0" g="0" b="0"/>
-        </a:lnRef>
-        <a:fillRef idx="1">
-          <a:scrgbClr r="0" g="0" b="0"/>
-        </a:fillRef>
-        <a:effectRef idx="0">
-          <a:scrgbClr r="0" g="0" b="0"/>
-        </a:effectRef>
-        <a:fontRef idx="minor">
-          <a:schemeClr val="lt1"/>
-        </a:fontRef>
-      </dsp:style>
-    </dsp:sp>
-    <dsp:sp modelId="{D778619D-D5FF-46A3-8581-B8F8902A789A}">
-      <dsp:nvSpPr>
-        <dsp:cNvPr id="0" name=""/>
-        <dsp:cNvSpPr/>
-      </dsp:nvSpPr>
-      <dsp:spPr>
-        <a:xfrm>
-          <a:off x="0" y="466"/>
-          <a:ext cx="1354183" cy="317838"/>
-        </a:xfrm>
-        <a:prstGeom prst="rect">
-          <a:avLst/>
-        </a:prstGeom>
-        <a:noFill/>
-        <a:ln>
-          <a:noFill/>
-        </a:ln>
-        <a:effectLst/>
-      </dsp:spPr>
-      <dsp:style>
-        <a:lnRef idx="0">
-          <a:scrgbClr r="0" g="0" b="0"/>
-        </a:lnRef>
-        <a:fillRef idx="0">
-          <a:scrgbClr r="0" g="0" b="0"/>
-        </a:fillRef>
-        <a:effectRef idx="0">
-          <a:scrgbClr r="0" g="0" b="0"/>
-        </a:effectRef>
-        <a:fontRef idx="minor"/>
-      </dsp:style>
-      <dsp:txBody>
-        <a:bodyPr spcFirstLastPara="0" vert="horz" wrap="square" lIns="53340" tIns="53340" rIns="53340" bIns="53340" numCol="1" spcCol="1270" anchor="t" anchorCtr="0">
-          <a:noAutofit/>
-        </a:bodyPr>
-        <a:lstStyle/>
-        <a:p>
-          <a:pPr lvl="0" algn="l" defTabSz="622300">
-            <a:lnSpc>
-              <a:spcPct val="90000"/>
-            </a:lnSpc>
-            <a:spcBef>
-              <a:spcPct val="0"/>
-            </a:spcBef>
-            <a:spcAft>
-              <a:spcPct val="35000"/>
-            </a:spcAft>
-          </a:pPr>
-          <a:r>
-            <a:rPr lang="en-GB" sz="1400" kern="1200" dirty="0" smtClean="0"/>
-            <a:t>Molecule 32</a:t>
-          </a:r>
-          <a:endParaRPr lang="nl-NL" sz="1400" kern="1200" dirty="0"/>
-        </a:p>
-      </dsp:txBody>
-      <dsp:txXfrm>
-        <a:off x="0" y="466"/>
-        <a:ext cx="1354183" cy="317838"/>
-      </dsp:txXfrm>
-    </dsp:sp>
-    <dsp:sp modelId="{6073C3BF-591B-4F23-A6DC-EEA692BF150E}">
-      <dsp:nvSpPr>
-        <dsp:cNvPr id="0" name=""/>
-        <dsp:cNvSpPr/>
-      </dsp:nvSpPr>
-      <dsp:spPr>
-        <a:xfrm>
-          <a:off x="0" y="318304"/>
-          <a:ext cx="1354183" cy="0"/>
-        </a:xfrm>
-        <a:prstGeom prst="line">
-          <a:avLst/>
-        </a:prstGeom>
-        <a:solidFill>
-          <a:schemeClr val="accent1">
-            <a:hueOff val="0"/>
-            <a:satOff val="0"/>
-            <a:lumOff val="0"/>
-            <a:alphaOff val="0"/>
-          </a:schemeClr>
-        </a:solidFill>
-        <a:ln w="25400" cap="flat" cmpd="sng" algn="ctr">
-          <a:solidFill>
-            <a:schemeClr val="accent1">
-              <a:hueOff val="0"/>
-              <a:satOff val="0"/>
-              <a:lumOff val="0"/>
-              <a:alphaOff val="0"/>
-            </a:schemeClr>
-          </a:solidFill>
-          <a:prstDash val="solid"/>
-        </a:ln>
-        <a:effectLst/>
-      </dsp:spPr>
-      <dsp:style>
-        <a:lnRef idx="2">
-          <a:scrgbClr r="0" g="0" b="0"/>
-        </a:lnRef>
-        <a:fillRef idx="1">
-          <a:scrgbClr r="0" g="0" b="0"/>
-        </a:fillRef>
-        <a:effectRef idx="0">
-          <a:scrgbClr r="0" g="0" b="0"/>
-        </a:effectRef>
-        <a:fontRef idx="minor">
-          <a:schemeClr val="lt1"/>
-        </a:fontRef>
-      </dsp:style>
-    </dsp:sp>
-    <dsp:sp modelId="{6A717171-A44D-4353-9F36-4B4321A28F32}">
-      <dsp:nvSpPr>
-        <dsp:cNvPr id="0" name=""/>
-        <dsp:cNvSpPr/>
-      </dsp:nvSpPr>
-      <dsp:spPr>
-        <a:xfrm>
-          <a:off x="0" y="318304"/>
-          <a:ext cx="1354183" cy="317838"/>
-        </a:xfrm>
-        <a:prstGeom prst="rect">
-          <a:avLst/>
-        </a:prstGeom>
-        <a:noFill/>
-        <a:ln>
-          <a:noFill/>
-        </a:ln>
-        <a:effectLst/>
-      </dsp:spPr>
-      <dsp:style>
-        <a:lnRef idx="0">
-          <a:scrgbClr r="0" g="0" b="0"/>
-        </a:lnRef>
-        <a:fillRef idx="0">
-          <a:scrgbClr r="0" g="0" b="0"/>
-        </a:fillRef>
-        <a:effectRef idx="0">
-          <a:scrgbClr r="0" g="0" b="0"/>
-        </a:effectRef>
-        <a:fontRef idx="minor"/>
-      </dsp:style>
-      <dsp:txBody>
-        <a:bodyPr spcFirstLastPara="0" vert="horz" wrap="square" lIns="53340" tIns="53340" rIns="53340" bIns="53340" numCol="1" spcCol="1270" anchor="t" anchorCtr="0">
-          <a:noAutofit/>
-        </a:bodyPr>
-        <a:lstStyle/>
-        <a:p>
-          <a:pPr lvl="0" algn="l" defTabSz="622300">
-            <a:lnSpc>
-              <a:spcPct val="90000"/>
-            </a:lnSpc>
-            <a:spcBef>
-              <a:spcPct val="0"/>
-            </a:spcBef>
-            <a:spcAft>
-              <a:spcPct val="35000"/>
-            </a:spcAft>
-          </a:pPr>
-          <a:r>
-            <a:rPr lang="en-GB" sz="1400" kern="1200" dirty="0" smtClean="0"/>
-            <a:t>Molecule 192</a:t>
-          </a:r>
-          <a:endParaRPr lang="nl-NL" sz="1400" kern="1200" dirty="0"/>
-        </a:p>
-      </dsp:txBody>
-      <dsp:txXfrm>
-        <a:off x="0" y="318304"/>
-        <a:ext cx="1354183" cy="317838"/>
-      </dsp:txXfrm>
-    </dsp:sp>
-    <dsp:sp modelId="{7762E45A-D92B-4217-AAEB-09D39F4615D0}">
-      <dsp:nvSpPr>
-        <dsp:cNvPr id="0" name=""/>
-        <dsp:cNvSpPr/>
-      </dsp:nvSpPr>
-      <dsp:spPr>
-        <a:xfrm>
-          <a:off x="0" y="636143"/>
-          <a:ext cx="1354183" cy="0"/>
-        </a:xfrm>
-        <a:prstGeom prst="line">
-          <a:avLst/>
-        </a:prstGeom>
-        <a:solidFill>
-          <a:schemeClr val="accent1">
-            <a:hueOff val="0"/>
-            <a:satOff val="0"/>
-            <a:lumOff val="0"/>
-            <a:alphaOff val="0"/>
-          </a:schemeClr>
-        </a:solidFill>
-        <a:ln w="25400" cap="flat" cmpd="sng" algn="ctr">
-          <a:solidFill>
-            <a:schemeClr val="accent1">
-              <a:hueOff val="0"/>
-              <a:satOff val="0"/>
-              <a:lumOff val="0"/>
-              <a:alphaOff val="0"/>
-            </a:schemeClr>
-          </a:solidFill>
-          <a:prstDash val="solid"/>
-        </a:ln>
-        <a:effectLst/>
-      </dsp:spPr>
-      <dsp:style>
-        <a:lnRef idx="2">
-          <a:scrgbClr r="0" g="0" b="0"/>
-        </a:lnRef>
-        <a:fillRef idx="1">
-          <a:scrgbClr r="0" g="0" b="0"/>
-        </a:fillRef>
-        <a:effectRef idx="0">
-          <a:scrgbClr r="0" g="0" b="0"/>
-        </a:effectRef>
-        <a:fontRef idx="minor">
-          <a:schemeClr val="lt1"/>
-        </a:fontRef>
-      </dsp:style>
-    </dsp:sp>
-    <dsp:sp modelId="{26EE5A52-A089-41C3-9ABB-B002C72BB09D}">
-      <dsp:nvSpPr>
-        <dsp:cNvPr id="0" name=""/>
-        <dsp:cNvSpPr/>
-      </dsp:nvSpPr>
-      <dsp:spPr>
-        <a:xfrm>
-          <a:off x="0" y="636143"/>
-          <a:ext cx="1354183" cy="317838"/>
-        </a:xfrm>
-        <a:prstGeom prst="rect">
-          <a:avLst/>
-        </a:prstGeom>
-        <a:noFill/>
-        <a:ln>
-          <a:noFill/>
-        </a:ln>
-        <a:effectLst/>
-      </dsp:spPr>
-      <dsp:style>
-        <a:lnRef idx="0">
-          <a:scrgbClr r="0" g="0" b="0"/>
-        </a:lnRef>
-        <a:fillRef idx="0">
-          <a:scrgbClr r="0" g="0" b="0"/>
-        </a:fillRef>
-        <a:effectRef idx="0">
-          <a:scrgbClr r="0" g="0" b="0"/>
-        </a:effectRef>
-        <a:fontRef idx="minor"/>
-      </dsp:style>
-      <dsp:txBody>
-        <a:bodyPr spcFirstLastPara="0" vert="horz" wrap="square" lIns="53340" tIns="53340" rIns="53340" bIns="53340" numCol="1" spcCol="1270" anchor="t" anchorCtr="0">
-          <a:noAutofit/>
-        </a:bodyPr>
-        <a:lstStyle/>
-        <a:p>
-          <a:pPr lvl="0" algn="l" defTabSz="622300">
-            <a:lnSpc>
-              <a:spcPct val="90000"/>
-            </a:lnSpc>
-            <a:spcBef>
-              <a:spcPct val="0"/>
-            </a:spcBef>
-            <a:spcAft>
-              <a:spcPct val="35000"/>
-            </a:spcAft>
-          </a:pPr>
-          <a:r>
-            <a:rPr lang="en-GB" sz="1400" kern="1200" dirty="0" smtClean="0"/>
-            <a:t>Molecule 230</a:t>
-          </a:r>
-          <a:endParaRPr lang="nl-NL" sz="1400" kern="1200" dirty="0"/>
-        </a:p>
-      </dsp:txBody>
-      <dsp:txXfrm>
-        <a:off x="0" y="636143"/>
-        <a:ext cx="1354183" cy="317838"/>
-      </dsp:txXfrm>
-    </dsp:sp>
   </dsp:spTree>
 </dsp:drawing>
 </file>
@@ -7334,776 +6248,6 @@
       <dsp:cNvGrpSpPr/>
     </dsp:nvGrpSpPr>
     <dsp:grpSpPr/>
-    <dsp:sp modelId="{24488344-03B9-4938-8268-6A2816D722F0}">
-      <dsp:nvSpPr>
-        <dsp:cNvPr id="0" name=""/>
-        <dsp:cNvSpPr/>
-      </dsp:nvSpPr>
-      <dsp:spPr>
-        <a:xfrm>
-          <a:off x="0" y="228"/>
-          <a:ext cx="1354183" cy="0"/>
-        </a:xfrm>
-        <a:prstGeom prst="line">
-          <a:avLst/>
-        </a:prstGeom>
-        <a:solidFill>
-          <a:schemeClr val="accent1">
-            <a:hueOff val="0"/>
-            <a:satOff val="0"/>
-            <a:lumOff val="0"/>
-            <a:alphaOff val="0"/>
-          </a:schemeClr>
-        </a:solidFill>
-        <a:ln w="25400" cap="flat" cmpd="sng" algn="ctr">
-          <a:solidFill>
-            <a:schemeClr val="accent1">
-              <a:hueOff val="0"/>
-              <a:satOff val="0"/>
-              <a:lumOff val="0"/>
-              <a:alphaOff val="0"/>
-            </a:schemeClr>
-          </a:solidFill>
-          <a:prstDash val="solid"/>
-        </a:ln>
-        <a:effectLst/>
-      </dsp:spPr>
-      <dsp:style>
-        <a:lnRef idx="2">
-          <a:scrgbClr r="0" g="0" b="0"/>
-        </a:lnRef>
-        <a:fillRef idx="1">
-          <a:scrgbClr r="0" g="0" b="0"/>
-        </a:fillRef>
-        <a:effectRef idx="0">
-          <a:scrgbClr r="0" g="0" b="0"/>
-        </a:effectRef>
-        <a:fontRef idx="minor">
-          <a:schemeClr val="lt1"/>
-        </a:fontRef>
-      </dsp:style>
-    </dsp:sp>
-    <dsp:sp modelId="{D778619D-D5FF-46A3-8581-B8F8902A789A}">
-      <dsp:nvSpPr>
-        <dsp:cNvPr id="0" name=""/>
-        <dsp:cNvSpPr/>
-      </dsp:nvSpPr>
-      <dsp:spPr>
-        <a:xfrm>
-          <a:off x="0" y="228"/>
-          <a:ext cx="1354183" cy="267415"/>
-        </a:xfrm>
-        <a:prstGeom prst="rect">
-          <a:avLst/>
-        </a:prstGeom>
-        <a:noFill/>
-        <a:ln>
-          <a:noFill/>
-        </a:ln>
-        <a:effectLst/>
-      </dsp:spPr>
-      <dsp:style>
-        <a:lnRef idx="0">
-          <a:scrgbClr r="0" g="0" b="0"/>
-        </a:lnRef>
-        <a:fillRef idx="0">
-          <a:scrgbClr r="0" g="0" b="0"/>
-        </a:fillRef>
-        <a:effectRef idx="0">
-          <a:scrgbClr r="0" g="0" b="0"/>
-        </a:effectRef>
-        <a:fontRef idx="minor"/>
-      </dsp:style>
-      <dsp:txBody>
-        <a:bodyPr spcFirstLastPara="0" vert="horz" wrap="square" lIns="45720" tIns="45720" rIns="45720" bIns="45720" numCol="1" spcCol="1270" anchor="t" anchorCtr="0">
-          <a:noAutofit/>
-        </a:bodyPr>
-        <a:lstStyle/>
-        <a:p>
-          <a:pPr lvl="0" algn="l" defTabSz="533400">
-            <a:lnSpc>
-              <a:spcPct val="90000"/>
-            </a:lnSpc>
-            <a:spcBef>
-              <a:spcPct val="0"/>
-            </a:spcBef>
-            <a:spcAft>
-              <a:spcPct val="35000"/>
-            </a:spcAft>
-          </a:pPr>
-          <a:r>
-            <a:rPr lang="en-GB" sz="1200" kern="1200" dirty="0" smtClean="0"/>
-            <a:t>Molecule 32</a:t>
-          </a:r>
-          <a:endParaRPr lang="nl-NL" sz="1200" kern="1200" dirty="0"/>
-        </a:p>
-      </dsp:txBody>
-      <dsp:txXfrm>
-        <a:off x="0" y="228"/>
-        <a:ext cx="1354183" cy="267415"/>
-      </dsp:txXfrm>
-    </dsp:sp>
-    <dsp:sp modelId="{6073C3BF-591B-4F23-A6DC-EEA692BF150E}">
-      <dsp:nvSpPr>
-        <dsp:cNvPr id="0" name=""/>
-        <dsp:cNvSpPr/>
-      </dsp:nvSpPr>
-      <dsp:spPr>
-        <a:xfrm>
-          <a:off x="0" y="267643"/>
-          <a:ext cx="1354183" cy="0"/>
-        </a:xfrm>
-        <a:prstGeom prst="line">
-          <a:avLst/>
-        </a:prstGeom>
-        <a:solidFill>
-          <a:schemeClr val="accent1">
-            <a:hueOff val="0"/>
-            <a:satOff val="0"/>
-            <a:lumOff val="0"/>
-            <a:alphaOff val="0"/>
-          </a:schemeClr>
-        </a:solidFill>
-        <a:ln w="25400" cap="flat" cmpd="sng" algn="ctr">
-          <a:solidFill>
-            <a:schemeClr val="accent1">
-              <a:hueOff val="0"/>
-              <a:satOff val="0"/>
-              <a:lumOff val="0"/>
-              <a:alphaOff val="0"/>
-            </a:schemeClr>
-          </a:solidFill>
-          <a:prstDash val="solid"/>
-        </a:ln>
-        <a:effectLst/>
-      </dsp:spPr>
-      <dsp:style>
-        <a:lnRef idx="2">
-          <a:scrgbClr r="0" g="0" b="0"/>
-        </a:lnRef>
-        <a:fillRef idx="1">
-          <a:scrgbClr r="0" g="0" b="0"/>
-        </a:fillRef>
-        <a:effectRef idx="0">
-          <a:scrgbClr r="0" g="0" b="0"/>
-        </a:effectRef>
-        <a:fontRef idx="minor">
-          <a:schemeClr val="lt1"/>
-        </a:fontRef>
-      </dsp:style>
-    </dsp:sp>
-    <dsp:sp modelId="{6A717171-A44D-4353-9F36-4B4321A28F32}">
-      <dsp:nvSpPr>
-        <dsp:cNvPr id="0" name=""/>
-        <dsp:cNvSpPr/>
-      </dsp:nvSpPr>
-      <dsp:spPr>
-        <a:xfrm>
-          <a:off x="0" y="267643"/>
-          <a:ext cx="1354183" cy="267415"/>
-        </a:xfrm>
-        <a:prstGeom prst="rect">
-          <a:avLst/>
-        </a:prstGeom>
-        <a:noFill/>
-        <a:ln>
-          <a:noFill/>
-        </a:ln>
-        <a:effectLst/>
-      </dsp:spPr>
-      <dsp:style>
-        <a:lnRef idx="0">
-          <a:scrgbClr r="0" g="0" b="0"/>
-        </a:lnRef>
-        <a:fillRef idx="0">
-          <a:scrgbClr r="0" g="0" b="0"/>
-        </a:fillRef>
-        <a:effectRef idx="0">
-          <a:scrgbClr r="0" g="0" b="0"/>
-        </a:effectRef>
-        <a:fontRef idx="minor"/>
-      </dsp:style>
-      <dsp:txBody>
-        <a:bodyPr spcFirstLastPara="0" vert="horz" wrap="square" lIns="45720" tIns="45720" rIns="45720" bIns="45720" numCol="1" spcCol="1270" anchor="t" anchorCtr="0">
-          <a:noAutofit/>
-        </a:bodyPr>
-        <a:lstStyle/>
-        <a:p>
-          <a:pPr lvl="0" algn="l" defTabSz="533400">
-            <a:lnSpc>
-              <a:spcPct val="90000"/>
-            </a:lnSpc>
-            <a:spcBef>
-              <a:spcPct val="0"/>
-            </a:spcBef>
-            <a:spcAft>
-              <a:spcPct val="35000"/>
-            </a:spcAft>
-          </a:pPr>
-          <a:r>
-            <a:rPr lang="en-GB" sz="1200" kern="1200" dirty="0" smtClean="0"/>
-            <a:t>Molecule 192</a:t>
-          </a:r>
-          <a:endParaRPr lang="nl-NL" sz="1200" kern="1200" dirty="0"/>
-        </a:p>
-      </dsp:txBody>
-      <dsp:txXfrm>
-        <a:off x="0" y="267643"/>
-        <a:ext cx="1354183" cy="267415"/>
-      </dsp:txXfrm>
-    </dsp:sp>
-    <dsp:sp modelId="{7762E45A-D92B-4217-AAEB-09D39F4615D0}">
-      <dsp:nvSpPr>
-        <dsp:cNvPr id="0" name=""/>
-        <dsp:cNvSpPr/>
-      </dsp:nvSpPr>
-      <dsp:spPr>
-        <a:xfrm>
-          <a:off x="0" y="535059"/>
-          <a:ext cx="1354183" cy="0"/>
-        </a:xfrm>
-        <a:prstGeom prst="line">
-          <a:avLst/>
-        </a:prstGeom>
-        <a:solidFill>
-          <a:schemeClr val="accent1">
-            <a:hueOff val="0"/>
-            <a:satOff val="0"/>
-            <a:lumOff val="0"/>
-            <a:alphaOff val="0"/>
-          </a:schemeClr>
-        </a:solidFill>
-        <a:ln w="25400" cap="flat" cmpd="sng" algn="ctr">
-          <a:solidFill>
-            <a:schemeClr val="accent1">
-              <a:hueOff val="0"/>
-              <a:satOff val="0"/>
-              <a:lumOff val="0"/>
-              <a:alphaOff val="0"/>
-            </a:schemeClr>
-          </a:solidFill>
-          <a:prstDash val="solid"/>
-        </a:ln>
-        <a:effectLst/>
-      </dsp:spPr>
-      <dsp:style>
-        <a:lnRef idx="2">
-          <a:scrgbClr r="0" g="0" b="0"/>
-        </a:lnRef>
-        <a:fillRef idx="1">
-          <a:scrgbClr r="0" g="0" b="0"/>
-        </a:fillRef>
-        <a:effectRef idx="0">
-          <a:scrgbClr r="0" g="0" b="0"/>
-        </a:effectRef>
-        <a:fontRef idx="minor">
-          <a:schemeClr val="lt1"/>
-        </a:fontRef>
-      </dsp:style>
-    </dsp:sp>
-    <dsp:sp modelId="{26EE5A52-A089-41C3-9ABB-B002C72BB09D}">
-      <dsp:nvSpPr>
-        <dsp:cNvPr id="0" name=""/>
-        <dsp:cNvSpPr/>
-      </dsp:nvSpPr>
-      <dsp:spPr>
-        <a:xfrm>
-          <a:off x="0" y="535059"/>
-          <a:ext cx="1354183" cy="267415"/>
-        </a:xfrm>
-        <a:prstGeom prst="rect">
-          <a:avLst/>
-        </a:prstGeom>
-        <a:noFill/>
-        <a:ln>
-          <a:noFill/>
-        </a:ln>
-        <a:effectLst/>
-      </dsp:spPr>
-      <dsp:style>
-        <a:lnRef idx="0">
-          <a:scrgbClr r="0" g="0" b="0"/>
-        </a:lnRef>
-        <a:fillRef idx="0">
-          <a:scrgbClr r="0" g="0" b="0"/>
-        </a:fillRef>
-        <a:effectRef idx="0">
-          <a:scrgbClr r="0" g="0" b="0"/>
-        </a:effectRef>
-        <a:fontRef idx="minor"/>
-      </dsp:style>
-      <dsp:txBody>
-        <a:bodyPr spcFirstLastPara="0" vert="horz" wrap="square" lIns="45720" tIns="45720" rIns="45720" bIns="45720" numCol="1" spcCol="1270" anchor="t" anchorCtr="0">
-          <a:noAutofit/>
-        </a:bodyPr>
-        <a:lstStyle/>
-        <a:p>
-          <a:pPr lvl="0" algn="l" defTabSz="533400">
-            <a:lnSpc>
-              <a:spcPct val="90000"/>
-            </a:lnSpc>
-            <a:spcBef>
-              <a:spcPct val="0"/>
-            </a:spcBef>
-            <a:spcAft>
-              <a:spcPct val="35000"/>
-            </a:spcAft>
-          </a:pPr>
-          <a:r>
-            <a:rPr lang="en-GB" sz="1200" kern="1200" dirty="0" smtClean="0"/>
-            <a:t>Molecule 230</a:t>
-          </a:r>
-        </a:p>
-      </dsp:txBody>
-      <dsp:txXfrm>
-        <a:off x="0" y="535059"/>
-        <a:ext cx="1354183" cy="267415"/>
-      </dsp:txXfrm>
-    </dsp:sp>
-    <dsp:sp modelId="{96D669F9-91F0-438D-8BF6-1FF0D9BC90DC}">
-      <dsp:nvSpPr>
-        <dsp:cNvPr id="0" name=""/>
-        <dsp:cNvSpPr/>
-      </dsp:nvSpPr>
-      <dsp:spPr>
-        <a:xfrm>
-          <a:off x="0" y="802474"/>
-          <a:ext cx="1354183" cy="0"/>
-        </a:xfrm>
-        <a:prstGeom prst="line">
-          <a:avLst/>
-        </a:prstGeom>
-        <a:solidFill>
-          <a:schemeClr val="accent1">
-            <a:hueOff val="0"/>
-            <a:satOff val="0"/>
-            <a:lumOff val="0"/>
-            <a:alphaOff val="0"/>
-          </a:schemeClr>
-        </a:solidFill>
-        <a:ln w="25400" cap="flat" cmpd="sng" algn="ctr">
-          <a:solidFill>
-            <a:schemeClr val="accent1">
-              <a:hueOff val="0"/>
-              <a:satOff val="0"/>
-              <a:lumOff val="0"/>
-              <a:alphaOff val="0"/>
-            </a:schemeClr>
-          </a:solidFill>
-          <a:prstDash val="solid"/>
-        </a:ln>
-        <a:effectLst/>
-      </dsp:spPr>
-      <dsp:style>
-        <a:lnRef idx="2">
-          <a:scrgbClr r="0" g="0" b="0"/>
-        </a:lnRef>
-        <a:fillRef idx="1">
-          <a:scrgbClr r="0" g="0" b="0"/>
-        </a:fillRef>
-        <a:effectRef idx="0">
-          <a:scrgbClr r="0" g="0" b="0"/>
-        </a:effectRef>
-        <a:fontRef idx="minor">
-          <a:schemeClr val="lt1"/>
-        </a:fontRef>
-      </dsp:style>
-    </dsp:sp>
-    <dsp:sp modelId="{2EED3635-6D7F-45AE-A400-312687E452CB}">
-      <dsp:nvSpPr>
-        <dsp:cNvPr id="0" name=""/>
-        <dsp:cNvSpPr/>
-      </dsp:nvSpPr>
-      <dsp:spPr>
-        <a:xfrm>
-          <a:off x="0" y="802474"/>
-          <a:ext cx="1354183" cy="267415"/>
-        </a:xfrm>
-        <a:prstGeom prst="rect">
-          <a:avLst/>
-        </a:prstGeom>
-        <a:noFill/>
-        <a:ln>
-          <a:noFill/>
-        </a:ln>
-        <a:effectLst/>
-      </dsp:spPr>
-      <dsp:style>
-        <a:lnRef idx="0">
-          <a:scrgbClr r="0" g="0" b="0"/>
-        </a:lnRef>
-        <a:fillRef idx="0">
-          <a:scrgbClr r="0" g="0" b="0"/>
-        </a:fillRef>
-        <a:effectRef idx="0">
-          <a:scrgbClr r="0" g="0" b="0"/>
-        </a:effectRef>
-        <a:fontRef idx="minor"/>
-      </dsp:style>
-      <dsp:txBody>
-        <a:bodyPr spcFirstLastPara="0" vert="horz" wrap="square" lIns="45720" tIns="45720" rIns="45720" bIns="45720" numCol="1" spcCol="1270" anchor="t" anchorCtr="0">
-          <a:noAutofit/>
-        </a:bodyPr>
-        <a:lstStyle/>
-        <a:p>
-          <a:pPr lvl="0" algn="l" defTabSz="533400">
-            <a:lnSpc>
-              <a:spcPct val="90000"/>
-            </a:lnSpc>
-            <a:spcBef>
-              <a:spcPct val="0"/>
-            </a:spcBef>
-            <a:spcAft>
-              <a:spcPct val="35000"/>
-            </a:spcAft>
-          </a:pPr>
-          <a:r>
-            <a:rPr lang="en-GB" sz="1200" kern="1200" dirty="0" smtClean="0"/>
-            <a:t>H</a:t>
-          </a:r>
-          <a:r>
-            <a:rPr lang="en-GB" sz="1200" kern="1200" baseline="-25000" dirty="0" smtClean="0"/>
-            <a:t>2</a:t>
-          </a:r>
-          <a:r>
-            <a:rPr lang="en-GB" sz="1200" kern="1200" dirty="0" smtClean="0"/>
-            <a:t>O</a:t>
-          </a:r>
-        </a:p>
-      </dsp:txBody>
-      <dsp:txXfrm>
-        <a:off x="0" y="802474"/>
-        <a:ext cx="1354183" cy="267415"/>
-      </dsp:txXfrm>
-    </dsp:sp>
-    <dsp:sp modelId="{993AF19B-F4C0-4CCB-B8FD-6845959B2219}">
-      <dsp:nvSpPr>
-        <dsp:cNvPr id="0" name=""/>
-        <dsp:cNvSpPr/>
-      </dsp:nvSpPr>
-      <dsp:spPr>
-        <a:xfrm>
-          <a:off x="0" y="1069890"/>
-          <a:ext cx="1354183" cy="0"/>
-        </a:xfrm>
-        <a:prstGeom prst="line">
-          <a:avLst/>
-        </a:prstGeom>
-        <a:solidFill>
-          <a:schemeClr val="accent1">
-            <a:hueOff val="0"/>
-            <a:satOff val="0"/>
-            <a:lumOff val="0"/>
-            <a:alphaOff val="0"/>
-          </a:schemeClr>
-        </a:solidFill>
-        <a:ln w="25400" cap="flat" cmpd="sng" algn="ctr">
-          <a:solidFill>
-            <a:schemeClr val="accent1">
-              <a:hueOff val="0"/>
-              <a:satOff val="0"/>
-              <a:lumOff val="0"/>
-              <a:alphaOff val="0"/>
-            </a:schemeClr>
-          </a:solidFill>
-          <a:prstDash val="solid"/>
-        </a:ln>
-        <a:effectLst/>
-      </dsp:spPr>
-      <dsp:style>
-        <a:lnRef idx="2">
-          <a:scrgbClr r="0" g="0" b="0"/>
-        </a:lnRef>
-        <a:fillRef idx="1">
-          <a:scrgbClr r="0" g="0" b="0"/>
-        </a:fillRef>
-        <a:effectRef idx="0">
-          <a:scrgbClr r="0" g="0" b="0"/>
-        </a:effectRef>
-        <a:fontRef idx="minor">
-          <a:schemeClr val="lt1"/>
-        </a:fontRef>
-      </dsp:style>
-    </dsp:sp>
-    <dsp:sp modelId="{4835CB2F-D4E1-4DB7-8518-6B7E8BCAEE24}">
-      <dsp:nvSpPr>
-        <dsp:cNvPr id="0" name=""/>
-        <dsp:cNvSpPr/>
-      </dsp:nvSpPr>
-      <dsp:spPr>
-        <a:xfrm>
-          <a:off x="0" y="1069890"/>
-          <a:ext cx="1354183" cy="267415"/>
-        </a:xfrm>
-        <a:prstGeom prst="rect">
-          <a:avLst/>
-        </a:prstGeom>
-        <a:noFill/>
-        <a:ln>
-          <a:noFill/>
-        </a:ln>
-        <a:effectLst/>
-      </dsp:spPr>
-      <dsp:style>
-        <a:lnRef idx="0">
-          <a:scrgbClr r="0" g="0" b="0"/>
-        </a:lnRef>
-        <a:fillRef idx="0">
-          <a:scrgbClr r="0" g="0" b="0"/>
-        </a:fillRef>
-        <a:effectRef idx="0">
-          <a:scrgbClr r="0" g="0" b="0"/>
-        </a:effectRef>
-        <a:fontRef idx="minor"/>
-      </dsp:style>
-      <dsp:txBody>
-        <a:bodyPr spcFirstLastPara="0" vert="horz" wrap="square" lIns="45720" tIns="45720" rIns="45720" bIns="45720" numCol="1" spcCol="1270" anchor="t" anchorCtr="0">
-          <a:noAutofit/>
-        </a:bodyPr>
-        <a:lstStyle/>
-        <a:p>
-          <a:pPr lvl="0" algn="l" defTabSz="533400">
-            <a:lnSpc>
-              <a:spcPct val="90000"/>
-            </a:lnSpc>
-            <a:spcBef>
-              <a:spcPct val="0"/>
-            </a:spcBef>
-            <a:spcAft>
-              <a:spcPct val="35000"/>
-            </a:spcAft>
-          </a:pPr>
-          <a:r>
-            <a:rPr lang="en-GB" sz="1200" kern="1200" dirty="0" smtClean="0"/>
-            <a:t>CO</a:t>
-          </a:r>
-          <a:r>
-            <a:rPr lang="en-GB" sz="1200" kern="1200" baseline="-25000" dirty="0" smtClean="0"/>
-            <a:t>2</a:t>
-          </a:r>
-        </a:p>
-      </dsp:txBody>
-      <dsp:txXfrm>
-        <a:off x="0" y="1069890"/>
-        <a:ext cx="1354183" cy="267415"/>
-      </dsp:txXfrm>
-    </dsp:sp>
-    <dsp:sp modelId="{B14123E0-CF2B-40CB-A5CE-CD922A959523}">
-      <dsp:nvSpPr>
-        <dsp:cNvPr id="0" name=""/>
-        <dsp:cNvSpPr/>
-      </dsp:nvSpPr>
-      <dsp:spPr>
-        <a:xfrm>
-          <a:off x="0" y="1337305"/>
-          <a:ext cx="1354183" cy="0"/>
-        </a:xfrm>
-        <a:prstGeom prst="line">
-          <a:avLst/>
-        </a:prstGeom>
-        <a:solidFill>
-          <a:schemeClr val="accent1">
-            <a:hueOff val="0"/>
-            <a:satOff val="0"/>
-            <a:lumOff val="0"/>
-            <a:alphaOff val="0"/>
-          </a:schemeClr>
-        </a:solidFill>
-        <a:ln w="25400" cap="flat" cmpd="sng" algn="ctr">
-          <a:solidFill>
-            <a:schemeClr val="accent1">
-              <a:hueOff val="0"/>
-              <a:satOff val="0"/>
-              <a:lumOff val="0"/>
-              <a:alphaOff val="0"/>
-            </a:schemeClr>
-          </a:solidFill>
-          <a:prstDash val="solid"/>
-        </a:ln>
-        <a:effectLst/>
-      </dsp:spPr>
-      <dsp:style>
-        <a:lnRef idx="2">
-          <a:scrgbClr r="0" g="0" b="0"/>
-        </a:lnRef>
-        <a:fillRef idx="1">
-          <a:scrgbClr r="0" g="0" b="0"/>
-        </a:fillRef>
-        <a:effectRef idx="0">
-          <a:scrgbClr r="0" g="0" b="0"/>
-        </a:effectRef>
-        <a:fontRef idx="minor">
-          <a:schemeClr val="lt1"/>
-        </a:fontRef>
-      </dsp:style>
-    </dsp:sp>
-    <dsp:sp modelId="{1788D82B-5F89-4395-96EF-60EA41280C38}">
-      <dsp:nvSpPr>
-        <dsp:cNvPr id="0" name=""/>
-        <dsp:cNvSpPr/>
-      </dsp:nvSpPr>
-      <dsp:spPr>
-        <a:xfrm>
-          <a:off x="0" y="1337305"/>
-          <a:ext cx="1354183" cy="267415"/>
-        </a:xfrm>
-        <a:prstGeom prst="rect">
-          <a:avLst/>
-        </a:prstGeom>
-        <a:noFill/>
-        <a:ln>
-          <a:noFill/>
-        </a:ln>
-        <a:effectLst/>
-      </dsp:spPr>
-      <dsp:style>
-        <a:lnRef idx="0">
-          <a:scrgbClr r="0" g="0" b="0"/>
-        </a:lnRef>
-        <a:fillRef idx="0">
-          <a:scrgbClr r="0" g="0" b="0"/>
-        </a:fillRef>
-        <a:effectRef idx="0">
-          <a:scrgbClr r="0" g="0" b="0"/>
-        </a:effectRef>
-        <a:fontRef idx="minor"/>
-      </dsp:style>
-      <dsp:txBody>
-        <a:bodyPr spcFirstLastPara="0" vert="horz" wrap="square" lIns="45720" tIns="45720" rIns="45720" bIns="45720" numCol="1" spcCol="1270" anchor="t" anchorCtr="0">
-          <a:noAutofit/>
-        </a:bodyPr>
-        <a:lstStyle/>
-        <a:p>
-          <a:pPr lvl="0" algn="l" defTabSz="533400">
-            <a:lnSpc>
-              <a:spcPct val="90000"/>
-            </a:lnSpc>
-            <a:spcBef>
-              <a:spcPct val="0"/>
-            </a:spcBef>
-            <a:spcAft>
-              <a:spcPct val="35000"/>
-            </a:spcAft>
-          </a:pPr>
-          <a:r>
-            <a:rPr lang="en-GB" sz="1200" kern="1200" baseline="-25000" dirty="0" smtClean="0"/>
-            <a:t>…</a:t>
-          </a:r>
-        </a:p>
-      </dsp:txBody>
-      <dsp:txXfrm>
-        <a:off x="0" y="1337305"/>
-        <a:ext cx="1354183" cy="267415"/>
-      </dsp:txXfrm>
-    </dsp:sp>
-    <dsp:sp modelId="{0A629F62-9828-42EE-80FE-80D77846B07B}">
-      <dsp:nvSpPr>
-        <dsp:cNvPr id="0" name=""/>
-        <dsp:cNvSpPr/>
-      </dsp:nvSpPr>
-      <dsp:spPr>
-        <a:xfrm>
-          <a:off x="0" y="1604721"/>
-          <a:ext cx="1354183" cy="0"/>
-        </a:xfrm>
-        <a:prstGeom prst="line">
-          <a:avLst/>
-        </a:prstGeom>
-        <a:solidFill>
-          <a:schemeClr val="accent1">
-            <a:hueOff val="0"/>
-            <a:satOff val="0"/>
-            <a:lumOff val="0"/>
-            <a:alphaOff val="0"/>
-          </a:schemeClr>
-        </a:solidFill>
-        <a:ln w="25400" cap="flat" cmpd="sng" algn="ctr">
-          <a:solidFill>
-            <a:schemeClr val="accent1">
-              <a:hueOff val="0"/>
-              <a:satOff val="0"/>
-              <a:lumOff val="0"/>
-              <a:alphaOff val="0"/>
-            </a:schemeClr>
-          </a:solidFill>
-          <a:prstDash val="solid"/>
-        </a:ln>
-        <a:effectLst/>
-      </dsp:spPr>
-      <dsp:style>
-        <a:lnRef idx="2">
-          <a:scrgbClr r="0" g="0" b="0"/>
-        </a:lnRef>
-        <a:fillRef idx="1">
-          <a:scrgbClr r="0" g="0" b="0"/>
-        </a:fillRef>
-        <a:effectRef idx="0">
-          <a:scrgbClr r="0" g="0" b="0"/>
-        </a:effectRef>
-        <a:fontRef idx="minor">
-          <a:schemeClr val="lt1"/>
-        </a:fontRef>
-      </dsp:style>
-    </dsp:sp>
-    <dsp:sp modelId="{642D9065-24BD-490E-ACB9-43EA48A5275E}">
-      <dsp:nvSpPr>
-        <dsp:cNvPr id="0" name=""/>
-        <dsp:cNvSpPr/>
-      </dsp:nvSpPr>
-      <dsp:spPr>
-        <a:xfrm>
-          <a:off x="0" y="1604721"/>
-          <a:ext cx="1354183" cy="267415"/>
-        </a:xfrm>
-        <a:prstGeom prst="rect">
-          <a:avLst/>
-        </a:prstGeom>
-        <a:noFill/>
-        <a:ln>
-          <a:noFill/>
-        </a:ln>
-        <a:effectLst/>
-      </dsp:spPr>
-      <dsp:style>
-        <a:lnRef idx="0">
-          <a:scrgbClr r="0" g="0" b="0"/>
-        </a:lnRef>
-        <a:fillRef idx="0">
-          <a:scrgbClr r="0" g="0" b="0"/>
-        </a:fillRef>
-        <a:effectRef idx="0">
-          <a:scrgbClr r="0" g="0" b="0"/>
-        </a:effectRef>
-        <a:fontRef idx="minor"/>
-      </dsp:style>
-      <dsp:txBody>
-        <a:bodyPr spcFirstLastPara="0" vert="horz" wrap="square" lIns="45720" tIns="45720" rIns="45720" bIns="45720" numCol="1" spcCol="1270" anchor="t" anchorCtr="0">
-          <a:noAutofit/>
-        </a:bodyPr>
-        <a:lstStyle/>
-        <a:p>
-          <a:pPr lvl="0" algn="l" defTabSz="533400">
-            <a:lnSpc>
-              <a:spcPct val="90000"/>
-            </a:lnSpc>
-            <a:spcBef>
-              <a:spcPct val="0"/>
-            </a:spcBef>
-            <a:spcAft>
-              <a:spcPct val="35000"/>
-            </a:spcAft>
-          </a:pPr>
-          <a:r>
-            <a:rPr lang="en-GB" sz="1200" kern="1200" dirty="0" smtClean="0"/>
-            <a:t>Ethanol</a:t>
-          </a:r>
-        </a:p>
-      </dsp:txBody>
-      <dsp:txXfrm>
-        <a:off x="0" y="1604721"/>
-        <a:ext cx="1354183" cy="267415"/>
-      </dsp:txXfrm>
-    </dsp:sp>
   </dsp:spTree>
 </dsp:drawing>
 </file>
@@ -8116,776 +6260,6 @@
       <dsp:cNvGrpSpPr/>
     </dsp:nvGrpSpPr>
     <dsp:grpSpPr/>
-    <dsp:sp modelId="{24488344-03B9-4938-8268-6A2816D722F0}">
-      <dsp:nvSpPr>
-        <dsp:cNvPr id="0" name=""/>
-        <dsp:cNvSpPr/>
-      </dsp:nvSpPr>
-      <dsp:spPr>
-        <a:xfrm>
-          <a:off x="0" y="228"/>
-          <a:ext cx="1354183" cy="0"/>
-        </a:xfrm>
-        <a:prstGeom prst="line">
-          <a:avLst/>
-        </a:prstGeom>
-        <a:solidFill>
-          <a:schemeClr val="accent1">
-            <a:hueOff val="0"/>
-            <a:satOff val="0"/>
-            <a:lumOff val="0"/>
-            <a:alphaOff val="0"/>
-          </a:schemeClr>
-        </a:solidFill>
-        <a:ln w="25400" cap="flat" cmpd="sng" algn="ctr">
-          <a:solidFill>
-            <a:schemeClr val="accent1">
-              <a:hueOff val="0"/>
-              <a:satOff val="0"/>
-              <a:lumOff val="0"/>
-              <a:alphaOff val="0"/>
-            </a:schemeClr>
-          </a:solidFill>
-          <a:prstDash val="solid"/>
-        </a:ln>
-        <a:effectLst/>
-      </dsp:spPr>
-      <dsp:style>
-        <a:lnRef idx="2">
-          <a:scrgbClr r="0" g="0" b="0"/>
-        </a:lnRef>
-        <a:fillRef idx="1">
-          <a:scrgbClr r="0" g="0" b="0"/>
-        </a:fillRef>
-        <a:effectRef idx="0">
-          <a:scrgbClr r="0" g="0" b="0"/>
-        </a:effectRef>
-        <a:fontRef idx="minor">
-          <a:schemeClr val="lt1"/>
-        </a:fontRef>
-      </dsp:style>
-    </dsp:sp>
-    <dsp:sp modelId="{D778619D-D5FF-46A3-8581-B8F8902A789A}">
-      <dsp:nvSpPr>
-        <dsp:cNvPr id="0" name=""/>
-        <dsp:cNvSpPr/>
-      </dsp:nvSpPr>
-      <dsp:spPr>
-        <a:xfrm>
-          <a:off x="0" y="228"/>
-          <a:ext cx="1354183" cy="267415"/>
-        </a:xfrm>
-        <a:prstGeom prst="rect">
-          <a:avLst/>
-        </a:prstGeom>
-        <a:noFill/>
-        <a:ln>
-          <a:noFill/>
-        </a:ln>
-        <a:effectLst/>
-      </dsp:spPr>
-      <dsp:style>
-        <a:lnRef idx="0">
-          <a:scrgbClr r="0" g="0" b="0"/>
-        </a:lnRef>
-        <a:fillRef idx="0">
-          <a:scrgbClr r="0" g="0" b="0"/>
-        </a:fillRef>
-        <a:effectRef idx="0">
-          <a:scrgbClr r="0" g="0" b="0"/>
-        </a:effectRef>
-        <a:fontRef idx="minor"/>
-      </dsp:style>
-      <dsp:txBody>
-        <a:bodyPr spcFirstLastPara="0" vert="horz" wrap="square" lIns="45720" tIns="45720" rIns="45720" bIns="45720" numCol="1" spcCol="1270" anchor="t" anchorCtr="0">
-          <a:noAutofit/>
-        </a:bodyPr>
-        <a:lstStyle/>
-        <a:p>
-          <a:pPr lvl="0" algn="l" defTabSz="533400">
-            <a:lnSpc>
-              <a:spcPct val="90000"/>
-            </a:lnSpc>
-            <a:spcBef>
-              <a:spcPct val="0"/>
-            </a:spcBef>
-            <a:spcAft>
-              <a:spcPct val="35000"/>
-            </a:spcAft>
-          </a:pPr>
-          <a:r>
-            <a:rPr lang="en-GB" sz="1200" kern="1200" dirty="0" smtClean="0"/>
-            <a:t>Molecule 32</a:t>
-          </a:r>
-          <a:endParaRPr lang="nl-NL" sz="1200" kern="1200" dirty="0"/>
-        </a:p>
-      </dsp:txBody>
-      <dsp:txXfrm>
-        <a:off x="0" y="228"/>
-        <a:ext cx="1354183" cy="267415"/>
-      </dsp:txXfrm>
-    </dsp:sp>
-    <dsp:sp modelId="{6073C3BF-591B-4F23-A6DC-EEA692BF150E}">
-      <dsp:nvSpPr>
-        <dsp:cNvPr id="0" name=""/>
-        <dsp:cNvSpPr/>
-      </dsp:nvSpPr>
-      <dsp:spPr>
-        <a:xfrm>
-          <a:off x="0" y="267643"/>
-          <a:ext cx="1354183" cy="0"/>
-        </a:xfrm>
-        <a:prstGeom prst="line">
-          <a:avLst/>
-        </a:prstGeom>
-        <a:solidFill>
-          <a:schemeClr val="accent1">
-            <a:hueOff val="0"/>
-            <a:satOff val="0"/>
-            <a:lumOff val="0"/>
-            <a:alphaOff val="0"/>
-          </a:schemeClr>
-        </a:solidFill>
-        <a:ln w="25400" cap="flat" cmpd="sng" algn="ctr">
-          <a:solidFill>
-            <a:schemeClr val="accent1">
-              <a:hueOff val="0"/>
-              <a:satOff val="0"/>
-              <a:lumOff val="0"/>
-              <a:alphaOff val="0"/>
-            </a:schemeClr>
-          </a:solidFill>
-          <a:prstDash val="solid"/>
-        </a:ln>
-        <a:effectLst/>
-      </dsp:spPr>
-      <dsp:style>
-        <a:lnRef idx="2">
-          <a:scrgbClr r="0" g="0" b="0"/>
-        </a:lnRef>
-        <a:fillRef idx="1">
-          <a:scrgbClr r="0" g="0" b="0"/>
-        </a:fillRef>
-        <a:effectRef idx="0">
-          <a:scrgbClr r="0" g="0" b="0"/>
-        </a:effectRef>
-        <a:fontRef idx="minor">
-          <a:schemeClr val="lt1"/>
-        </a:fontRef>
-      </dsp:style>
-    </dsp:sp>
-    <dsp:sp modelId="{6A717171-A44D-4353-9F36-4B4321A28F32}">
-      <dsp:nvSpPr>
-        <dsp:cNvPr id="0" name=""/>
-        <dsp:cNvSpPr/>
-      </dsp:nvSpPr>
-      <dsp:spPr>
-        <a:xfrm>
-          <a:off x="0" y="267643"/>
-          <a:ext cx="1354183" cy="267415"/>
-        </a:xfrm>
-        <a:prstGeom prst="rect">
-          <a:avLst/>
-        </a:prstGeom>
-        <a:noFill/>
-        <a:ln>
-          <a:noFill/>
-        </a:ln>
-        <a:effectLst/>
-      </dsp:spPr>
-      <dsp:style>
-        <a:lnRef idx="0">
-          <a:scrgbClr r="0" g="0" b="0"/>
-        </a:lnRef>
-        <a:fillRef idx="0">
-          <a:scrgbClr r="0" g="0" b="0"/>
-        </a:fillRef>
-        <a:effectRef idx="0">
-          <a:scrgbClr r="0" g="0" b="0"/>
-        </a:effectRef>
-        <a:fontRef idx="minor"/>
-      </dsp:style>
-      <dsp:txBody>
-        <a:bodyPr spcFirstLastPara="0" vert="horz" wrap="square" lIns="45720" tIns="45720" rIns="45720" bIns="45720" numCol="1" spcCol="1270" anchor="t" anchorCtr="0">
-          <a:noAutofit/>
-        </a:bodyPr>
-        <a:lstStyle/>
-        <a:p>
-          <a:pPr lvl="0" algn="l" defTabSz="533400">
-            <a:lnSpc>
-              <a:spcPct val="90000"/>
-            </a:lnSpc>
-            <a:spcBef>
-              <a:spcPct val="0"/>
-            </a:spcBef>
-            <a:spcAft>
-              <a:spcPct val="35000"/>
-            </a:spcAft>
-          </a:pPr>
-          <a:r>
-            <a:rPr lang="en-GB" sz="1200" kern="1200" dirty="0" smtClean="0"/>
-            <a:t>Molecule 192</a:t>
-          </a:r>
-          <a:endParaRPr lang="nl-NL" sz="1200" kern="1200" dirty="0"/>
-        </a:p>
-      </dsp:txBody>
-      <dsp:txXfrm>
-        <a:off x="0" y="267643"/>
-        <a:ext cx="1354183" cy="267415"/>
-      </dsp:txXfrm>
-    </dsp:sp>
-    <dsp:sp modelId="{7762E45A-D92B-4217-AAEB-09D39F4615D0}">
-      <dsp:nvSpPr>
-        <dsp:cNvPr id="0" name=""/>
-        <dsp:cNvSpPr/>
-      </dsp:nvSpPr>
-      <dsp:spPr>
-        <a:xfrm>
-          <a:off x="0" y="535059"/>
-          <a:ext cx="1354183" cy="0"/>
-        </a:xfrm>
-        <a:prstGeom prst="line">
-          <a:avLst/>
-        </a:prstGeom>
-        <a:solidFill>
-          <a:schemeClr val="accent1">
-            <a:hueOff val="0"/>
-            <a:satOff val="0"/>
-            <a:lumOff val="0"/>
-            <a:alphaOff val="0"/>
-          </a:schemeClr>
-        </a:solidFill>
-        <a:ln w="25400" cap="flat" cmpd="sng" algn="ctr">
-          <a:solidFill>
-            <a:schemeClr val="accent1">
-              <a:hueOff val="0"/>
-              <a:satOff val="0"/>
-              <a:lumOff val="0"/>
-              <a:alphaOff val="0"/>
-            </a:schemeClr>
-          </a:solidFill>
-          <a:prstDash val="solid"/>
-        </a:ln>
-        <a:effectLst/>
-      </dsp:spPr>
-      <dsp:style>
-        <a:lnRef idx="2">
-          <a:scrgbClr r="0" g="0" b="0"/>
-        </a:lnRef>
-        <a:fillRef idx="1">
-          <a:scrgbClr r="0" g="0" b="0"/>
-        </a:fillRef>
-        <a:effectRef idx="0">
-          <a:scrgbClr r="0" g="0" b="0"/>
-        </a:effectRef>
-        <a:fontRef idx="minor">
-          <a:schemeClr val="lt1"/>
-        </a:fontRef>
-      </dsp:style>
-    </dsp:sp>
-    <dsp:sp modelId="{26EE5A52-A089-41C3-9ABB-B002C72BB09D}">
-      <dsp:nvSpPr>
-        <dsp:cNvPr id="0" name=""/>
-        <dsp:cNvSpPr/>
-      </dsp:nvSpPr>
-      <dsp:spPr>
-        <a:xfrm>
-          <a:off x="0" y="535059"/>
-          <a:ext cx="1354183" cy="267415"/>
-        </a:xfrm>
-        <a:prstGeom prst="rect">
-          <a:avLst/>
-        </a:prstGeom>
-        <a:noFill/>
-        <a:ln>
-          <a:noFill/>
-        </a:ln>
-        <a:effectLst/>
-      </dsp:spPr>
-      <dsp:style>
-        <a:lnRef idx="0">
-          <a:scrgbClr r="0" g="0" b="0"/>
-        </a:lnRef>
-        <a:fillRef idx="0">
-          <a:scrgbClr r="0" g="0" b="0"/>
-        </a:fillRef>
-        <a:effectRef idx="0">
-          <a:scrgbClr r="0" g="0" b="0"/>
-        </a:effectRef>
-        <a:fontRef idx="minor"/>
-      </dsp:style>
-      <dsp:txBody>
-        <a:bodyPr spcFirstLastPara="0" vert="horz" wrap="square" lIns="45720" tIns="45720" rIns="45720" bIns="45720" numCol="1" spcCol="1270" anchor="t" anchorCtr="0">
-          <a:noAutofit/>
-        </a:bodyPr>
-        <a:lstStyle/>
-        <a:p>
-          <a:pPr lvl="0" algn="l" defTabSz="533400">
-            <a:lnSpc>
-              <a:spcPct val="90000"/>
-            </a:lnSpc>
-            <a:spcBef>
-              <a:spcPct val="0"/>
-            </a:spcBef>
-            <a:spcAft>
-              <a:spcPct val="35000"/>
-            </a:spcAft>
-          </a:pPr>
-          <a:r>
-            <a:rPr lang="en-GB" sz="1200" kern="1200" dirty="0" smtClean="0"/>
-            <a:t>Molecule 230</a:t>
-          </a:r>
-        </a:p>
-      </dsp:txBody>
-      <dsp:txXfrm>
-        <a:off x="0" y="535059"/>
-        <a:ext cx="1354183" cy="267415"/>
-      </dsp:txXfrm>
-    </dsp:sp>
-    <dsp:sp modelId="{96D669F9-91F0-438D-8BF6-1FF0D9BC90DC}">
-      <dsp:nvSpPr>
-        <dsp:cNvPr id="0" name=""/>
-        <dsp:cNvSpPr/>
-      </dsp:nvSpPr>
-      <dsp:spPr>
-        <a:xfrm>
-          <a:off x="0" y="802474"/>
-          <a:ext cx="1354183" cy="0"/>
-        </a:xfrm>
-        <a:prstGeom prst="line">
-          <a:avLst/>
-        </a:prstGeom>
-        <a:solidFill>
-          <a:schemeClr val="accent1">
-            <a:hueOff val="0"/>
-            <a:satOff val="0"/>
-            <a:lumOff val="0"/>
-            <a:alphaOff val="0"/>
-          </a:schemeClr>
-        </a:solidFill>
-        <a:ln w="25400" cap="flat" cmpd="sng" algn="ctr">
-          <a:solidFill>
-            <a:schemeClr val="accent1">
-              <a:hueOff val="0"/>
-              <a:satOff val="0"/>
-              <a:lumOff val="0"/>
-              <a:alphaOff val="0"/>
-            </a:schemeClr>
-          </a:solidFill>
-          <a:prstDash val="solid"/>
-        </a:ln>
-        <a:effectLst/>
-      </dsp:spPr>
-      <dsp:style>
-        <a:lnRef idx="2">
-          <a:scrgbClr r="0" g="0" b="0"/>
-        </a:lnRef>
-        <a:fillRef idx="1">
-          <a:scrgbClr r="0" g="0" b="0"/>
-        </a:fillRef>
-        <a:effectRef idx="0">
-          <a:scrgbClr r="0" g="0" b="0"/>
-        </a:effectRef>
-        <a:fontRef idx="minor">
-          <a:schemeClr val="lt1"/>
-        </a:fontRef>
-      </dsp:style>
-    </dsp:sp>
-    <dsp:sp modelId="{2EED3635-6D7F-45AE-A400-312687E452CB}">
-      <dsp:nvSpPr>
-        <dsp:cNvPr id="0" name=""/>
-        <dsp:cNvSpPr/>
-      </dsp:nvSpPr>
-      <dsp:spPr>
-        <a:xfrm>
-          <a:off x="0" y="802474"/>
-          <a:ext cx="1354183" cy="267415"/>
-        </a:xfrm>
-        <a:prstGeom prst="rect">
-          <a:avLst/>
-        </a:prstGeom>
-        <a:noFill/>
-        <a:ln>
-          <a:noFill/>
-        </a:ln>
-        <a:effectLst/>
-      </dsp:spPr>
-      <dsp:style>
-        <a:lnRef idx="0">
-          <a:scrgbClr r="0" g="0" b="0"/>
-        </a:lnRef>
-        <a:fillRef idx="0">
-          <a:scrgbClr r="0" g="0" b="0"/>
-        </a:fillRef>
-        <a:effectRef idx="0">
-          <a:scrgbClr r="0" g="0" b="0"/>
-        </a:effectRef>
-        <a:fontRef idx="minor"/>
-      </dsp:style>
-      <dsp:txBody>
-        <a:bodyPr spcFirstLastPara="0" vert="horz" wrap="square" lIns="45720" tIns="45720" rIns="45720" bIns="45720" numCol="1" spcCol="1270" anchor="t" anchorCtr="0">
-          <a:noAutofit/>
-        </a:bodyPr>
-        <a:lstStyle/>
-        <a:p>
-          <a:pPr lvl="0" algn="l" defTabSz="533400">
-            <a:lnSpc>
-              <a:spcPct val="90000"/>
-            </a:lnSpc>
-            <a:spcBef>
-              <a:spcPct val="0"/>
-            </a:spcBef>
-            <a:spcAft>
-              <a:spcPct val="35000"/>
-            </a:spcAft>
-          </a:pPr>
-          <a:r>
-            <a:rPr lang="en-GB" sz="1200" kern="1200" dirty="0" smtClean="0"/>
-            <a:t>H</a:t>
-          </a:r>
-          <a:r>
-            <a:rPr lang="en-GB" sz="1200" kern="1200" baseline="-25000" dirty="0" smtClean="0"/>
-            <a:t>2</a:t>
-          </a:r>
-          <a:r>
-            <a:rPr lang="en-GB" sz="1200" kern="1200" dirty="0" smtClean="0"/>
-            <a:t>O</a:t>
-          </a:r>
-        </a:p>
-      </dsp:txBody>
-      <dsp:txXfrm>
-        <a:off x="0" y="802474"/>
-        <a:ext cx="1354183" cy="267415"/>
-      </dsp:txXfrm>
-    </dsp:sp>
-    <dsp:sp modelId="{993AF19B-F4C0-4CCB-B8FD-6845959B2219}">
-      <dsp:nvSpPr>
-        <dsp:cNvPr id="0" name=""/>
-        <dsp:cNvSpPr/>
-      </dsp:nvSpPr>
-      <dsp:spPr>
-        <a:xfrm>
-          <a:off x="0" y="1069890"/>
-          <a:ext cx="1354183" cy="0"/>
-        </a:xfrm>
-        <a:prstGeom prst="line">
-          <a:avLst/>
-        </a:prstGeom>
-        <a:solidFill>
-          <a:schemeClr val="accent1">
-            <a:hueOff val="0"/>
-            <a:satOff val="0"/>
-            <a:lumOff val="0"/>
-            <a:alphaOff val="0"/>
-          </a:schemeClr>
-        </a:solidFill>
-        <a:ln w="25400" cap="flat" cmpd="sng" algn="ctr">
-          <a:solidFill>
-            <a:schemeClr val="accent1">
-              <a:hueOff val="0"/>
-              <a:satOff val="0"/>
-              <a:lumOff val="0"/>
-              <a:alphaOff val="0"/>
-            </a:schemeClr>
-          </a:solidFill>
-          <a:prstDash val="solid"/>
-        </a:ln>
-        <a:effectLst/>
-      </dsp:spPr>
-      <dsp:style>
-        <a:lnRef idx="2">
-          <a:scrgbClr r="0" g="0" b="0"/>
-        </a:lnRef>
-        <a:fillRef idx="1">
-          <a:scrgbClr r="0" g="0" b="0"/>
-        </a:fillRef>
-        <a:effectRef idx="0">
-          <a:scrgbClr r="0" g="0" b="0"/>
-        </a:effectRef>
-        <a:fontRef idx="minor">
-          <a:schemeClr val="lt1"/>
-        </a:fontRef>
-      </dsp:style>
-    </dsp:sp>
-    <dsp:sp modelId="{4835CB2F-D4E1-4DB7-8518-6B7E8BCAEE24}">
-      <dsp:nvSpPr>
-        <dsp:cNvPr id="0" name=""/>
-        <dsp:cNvSpPr/>
-      </dsp:nvSpPr>
-      <dsp:spPr>
-        <a:xfrm>
-          <a:off x="0" y="1069890"/>
-          <a:ext cx="1354183" cy="267415"/>
-        </a:xfrm>
-        <a:prstGeom prst="rect">
-          <a:avLst/>
-        </a:prstGeom>
-        <a:noFill/>
-        <a:ln>
-          <a:noFill/>
-        </a:ln>
-        <a:effectLst/>
-      </dsp:spPr>
-      <dsp:style>
-        <a:lnRef idx="0">
-          <a:scrgbClr r="0" g="0" b="0"/>
-        </a:lnRef>
-        <a:fillRef idx="0">
-          <a:scrgbClr r="0" g="0" b="0"/>
-        </a:fillRef>
-        <a:effectRef idx="0">
-          <a:scrgbClr r="0" g="0" b="0"/>
-        </a:effectRef>
-        <a:fontRef idx="minor"/>
-      </dsp:style>
-      <dsp:txBody>
-        <a:bodyPr spcFirstLastPara="0" vert="horz" wrap="square" lIns="45720" tIns="45720" rIns="45720" bIns="45720" numCol="1" spcCol="1270" anchor="t" anchorCtr="0">
-          <a:noAutofit/>
-        </a:bodyPr>
-        <a:lstStyle/>
-        <a:p>
-          <a:pPr lvl="0" algn="l" defTabSz="533400">
-            <a:lnSpc>
-              <a:spcPct val="90000"/>
-            </a:lnSpc>
-            <a:spcBef>
-              <a:spcPct val="0"/>
-            </a:spcBef>
-            <a:spcAft>
-              <a:spcPct val="35000"/>
-            </a:spcAft>
-          </a:pPr>
-          <a:r>
-            <a:rPr lang="en-GB" sz="1200" kern="1200" dirty="0" smtClean="0"/>
-            <a:t>CO</a:t>
-          </a:r>
-          <a:r>
-            <a:rPr lang="en-GB" sz="1200" kern="1200" baseline="-25000" dirty="0" smtClean="0"/>
-            <a:t>2</a:t>
-          </a:r>
-        </a:p>
-      </dsp:txBody>
-      <dsp:txXfrm>
-        <a:off x="0" y="1069890"/>
-        <a:ext cx="1354183" cy="267415"/>
-      </dsp:txXfrm>
-    </dsp:sp>
-    <dsp:sp modelId="{F95E51AA-825F-49B7-A2EE-D5A68FF57A5A}">
-      <dsp:nvSpPr>
-        <dsp:cNvPr id="0" name=""/>
-        <dsp:cNvSpPr/>
-      </dsp:nvSpPr>
-      <dsp:spPr>
-        <a:xfrm>
-          <a:off x="0" y="1337305"/>
-          <a:ext cx="1354183" cy="0"/>
-        </a:xfrm>
-        <a:prstGeom prst="line">
-          <a:avLst/>
-        </a:prstGeom>
-        <a:solidFill>
-          <a:schemeClr val="accent1">
-            <a:hueOff val="0"/>
-            <a:satOff val="0"/>
-            <a:lumOff val="0"/>
-            <a:alphaOff val="0"/>
-          </a:schemeClr>
-        </a:solidFill>
-        <a:ln w="25400" cap="flat" cmpd="sng" algn="ctr">
-          <a:solidFill>
-            <a:schemeClr val="accent1">
-              <a:hueOff val="0"/>
-              <a:satOff val="0"/>
-              <a:lumOff val="0"/>
-              <a:alphaOff val="0"/>
-            </a:schemeClr>
-          </a:solidFill>
-          <a:prstDash val="solid"/>
-        </a:ln>
-        <a:effectLst/>
-      </dsp:spPr>
-      <dsp:style>
-        <a:lnRef idx="2">
-          <a:scrgbClr r="0" g="0" b="0"/>
-        </a:lnRef>
-        <a:fillRef idx="1">
-          <a:scrgbClr r="0" g="0" b="0"/>
-        </a:fillRef>
-        <a:effectRef idx="0">
-          <a:scrgbClr r="0" g="0" b="0"/>
-        </a:effectRef>
-        <a:fontRef idx="minor">
-          <a:schemeClr val="lt1"/>
-        </a:fontRef>
-      </dsp:style>
-    </dsp:sp>
-    <dsp:sp modelId="{10281058-9C13-4E40-8138-DEE1B55F1E71}">
-      <dsp:nvSpPr>
-        <dsp:cNvPr id="0" name=""/>
-        <dsp:cNvSpPr/>
-      </dsp:nvSpPr>
-      <dsp:spPr>
-        <a:xfrm>
-          <a:off x="0" y="1337305"/>
-          <a:ext cx="1354183" cy="267415"/>
-        </a:xfrm>
-        <a:prstGeom prst="rect">
-          <a:avLst/>
-        </a:prstGeom>
-        <a:noFill/>
-        <a:ln>
-          <a:noFill/>
-        </a:ln>
-        <a:effectLst/>
-      </dsp:spPr>
-      <dsp:style>
-        <a:lnRef idx="0">
-          <a:scrgbClr r="0" g="0" b="0"/>
-        </a:lnRef>
-        <a:fillRef idx="0">
-          <a:scrgbClr r="0" g="0" b="0"/>
-        </a:fillRef>
-        <a:effectRef idx="0">
-          <a:scrgbClr r="0" g="0" b="0"/>
-        </a:effectRef>
-        <a:fontRef idx="minor"/>
-      </dsp:style>
-      <dsp:txBody>
-        <a:bodyPr spcFirstLastPara="0" vert="horz" wrap="square" lIns="45720" tIns="45720" rIns="45720" bIns="45720" numCol="1" spcCol="1270" anchor="t" anchorCtr="0">
-          <a:noAutofit/>
-        </a:bodyPr>
-        <a:lstStyle/>
-        <a:p>
-          <a:pPr lvl="0" algn="l" defTabSz="533400">
-            <a:lnSpc>
-              <a:spcPct val="90000"/>
-            </a:lnSpc>
-            <a:spcBef>
-              <a:spcPct val="0"/>
-            </a:spcBef>
-            <a:spcAft>
-              <a:spcPct val="35000"/>
-            </a:spcAft>
-          </a:pPr>
-          <a:r>
-            <a:rPr lang="en-GB" sz="1200" kern="1200" baseline="-25000" dirty="0" smtClean="0"/>
-            <a:t>…</a:t>
-          </a:r>
-        </a:p>
-      </dsp:txBody>
-      <dsp:txXfrm>
-        <a:off x="0" y="1337305"/>
-        <a:ext cx="1354183" cy="267415"/>
-      </dsp:txXfrm>
-    </dsp:sp>
-    <dsp:sp modelId="{0A629F62-9828-42EE-80FE-80D77846B07B}">
-      <dsp:nvSpPr>
-        <dsp:cNvPr id="0" name=""/>
-        <dsp:cNvSpPr/>
-      </dsp:nvSpPr>
-      <dsp:spPr>
-        <a:xfrm>
-          <a:off x="0" y="1604721"/>
-          <a:ext cx="1354183" cy="0"/>
-        </a:xfrm>
-        <a:prstGeom prst="line">
-          <a:avLst/>
-        </a:prstGeom>
-        <a:solidFill>
-          <a:schemeClr val="accent1">
-            <a:hueOff val="0"/>
-            <a:satOff val="0"/>
-            <a:lumOff val="0"/>
-            <a:alphaOff val="0"/>
-          </a:schemeClr>
-        </a:solidFill>
-        <a:ln w="25400" cap="flat" cmpd="sng" algn="ctr">
-          <a:solidFill>
-            <a:schemeClr val="accent1">
-              <a:hueOff val="0"/>
-              <a:satOff val="0"/>
-              <a:lumOff val="0"/>
-              <a:alphaOff val="0"/>
-            </a:schemeClr>
-          </a:solidFill>
-          <a:prstDash val="solid"/>
-        </a:ln>
-        <a:effectLst/>
-      </dsp:spPr>
-      <dsp:style>
-        <a:lnRef idx="2">
-          <a:scrgbClr r="0" g="0" b="0"/>
-        </a:lnRef>
-        <a:fillRef idx="1">
-          <a:scrgbClr r="0" g="0" b="0"/>
-        </a:fillRef>
-        <a:effectRef idx="0">
-          <a:scrgbClr r="0" g="0" b="0"/>
-        </a:effectRef>
-        <a:fontRef idx="minor">
-          <a:schemeClr val="lt1"/>
-        </a:fontRef>
-      </dsp:style>
-    </dsp:sp>
-    <dsp:sp modelId="{642D9065-24BD-490E-ACB9-43EA48A5275E}">
-      <dsp:nvSpPr>
-        <dsp:cNvPr id="0" name=""/>
-        <dsp:cNvSpPr/>
-      </dsp:nvSpPr>
-      <dsp:spPr>
-        <a:xfrm>
-          <a:off x="0" y="1604721"/>
-          <a:ext cx="1354183" cy="267415"/>
-        </a:xfrm>
-        <a:prstGeom prst="rect">
-          <a:avLst/>
-        </a:prstGeom>
-        <a:noFill/>
-        <a:ln>
-          <a:noFill/>
-        </a:ln>
-        <a:effectLst/>
-      </dsp:spPr>
-      <dsp:style>
-        <a:lnRef idx="0">
-          <a:scrgbClr r="0" g="0" b="0"/>
-        </a:lnRef>
-        <a:fillRef idx="0">
-          <a:scrgbClr r="0" g="0" b="0"/>
-        </a:fillRef>
-        <a:effectRef idx="0">
-          <a:scrgbClr r="0" g="0" b="0"/>
-        </a:effectRef>
-        <a:fontRef idx="minor"/>
-      </dsp:style>
-      <dsp:txBody>
-        <a:bodyPr spcFirstLastPara="0" vert="horz" wrap="square" lIns="45720" tIns="45720" rIns="45720" bIns="45720" numCol="1" spcCol="1270" anchor="t" anchorCtr="0">
-          <a:noAutofit/>
-        </a:bodyPr>
-        <a:lstStyle/>
-        <a:p>
-          <a:pPr lvl="0" algn="l" defTabSz="533400">
-            <a:lnSpc>
-              <a:spcPct val="90000"/>
-            </a:lnSpc>
-            <a:spcBef>
-              <a:spcPct val="0"/>
-            </a:spcBef>
-            <a:spcAft>
-              <a:spcPct val="35000"/>
-            </a:spcAft>
-          </a:pPr>
-          <a:r>
-            <a:rPr lang="en-GB" sz="1200" kern="1200" dirty="0" smtClean="0"/>
-            <a:t>Ethanol</a:t>
-          </a:r>
-        </a:p>
-      </dsp:txBody>
-      <dsp:txXfrm>
-        <a:off x="0" y="1604721"/>
-        <a:ext cx="1354183" cy="267415"/>
-      </dsp:txXfrm>
-    </dsp:sp>
   </dsp:spTree>
 </dsp:drawing>
 </file>
@@ -16472,7 +13846,7 @@
           <a:p>
             <a:fld id="{65607776-32A9-4E15-B814-B319972CFFFE}" type="datetimeFigureOut">
               <a:rPr lang="nl-NL" smtClean="0"/>
-              <a:t>20-10-2014</a:t>
+              <a:t>4-11-2014</a:t>
             </a:fld>
             <a:endParaRPr lang="nl-NL"/>
           </a:p>
@@ -17306,7 +14680,21 @@
             </a:r>
             <a:r>
               <a:rPr lang="en-GB" baseline="0" dirty="0" smtClean="0"/>
-              <a:t> -&gt; signals</a:t>
+              <a:t> -&gt; </a:t>
+            </a:r>
+            <a:r>
+              <a:rPr lang="en-GB" baseline="0" dirty="0" smtClean="0"/>
+              <a:t>signals</a:t>
+            </a:r>
+          </a:p>
+          <a:p>
+            <a:r>
+              <a:rPr lang="nl-NL" smtClean="0"/>
+              <a:t>With compliment</a:t>
+            </a:r>
+            <a:r>
+              <a:rPr lang="nl-NL" baseline="0" smtClean="0"/>
+              <a:t>s to Zhe Hou and Adonis for making this!</a:t>
             </a:r>
             <a:endParaRPr lang="nl-NL" dirty="0"/>
           </a:p>
@@ -18232,7 +15620,7 @@
           <a:p>
             <a:fld id="{4088EF54-C641-44F0-83F7-2E2A8BF04AC9}" type="datetimeFigureOut">
               <a:rPr lang="nl-NL" smtClean="0"/>
-              <a:t>20-10-2014</a:t>
+              <a:t>4-11-2014</a:t>
             </a:fld>
             <a:endParaRPr lang="nl-NL"/>
           </a:p>
@@ -18865,7 +16253,7 @@
           <a:p>
             <a:fld id="{4088EF54-C641-44F0-83F7-2E2A8BF04AC9}" type="datetimeFigureOut">
               <a:rPr lang="nl-NL" smtClean="0"/>
-              <a:t>20-10-2014</a:t>
+              <a:t>4-11-2014</a:t>
             </a:fld>
             <a:endParaRPr lang="nl-NL"/>
           </a:p>
@@ -19142,7 +16530,7 @@
           <a:p>
             <a:fld id="{4088EF54-C641-44F0-83F7-2E2A8BF04AC9}" type="datetimeFigureOut">
               <a:rPr lang="nl-NL" smtClean="0"/>
-              <a:t>20-10-2014</a:t>
+              <a:t>4-11-2014</a:t>
             </a:fld>
             <a:endParaRPr lang="nl-NL"/>
           </a:p>
@@ -19307,7 +16695,7 @@
           <a:p>
             <a:fld id="{4088EF54-C641-44F0-83F7-2E2A8BF04AC9}" type="datetimeFigureOut">
               <a:rPr lang="nl-NL" smtClean="0"/>
-              <a:t>20-10-2014</a:t>
+              <a:t>4-11-2014</a:t>
             </a:fld>
             <a:endParaRPr lang="nl-NL"/>
           </a:p>
@@ -19488,7 +16876,7 @@
           <a:p>
             <a:fld id="{4088EF54-C641-44F0-83F7-2E2A8BF04AC9}" type="datetimeFigureOut">
               <a:rPr lang="nl-NL" smtClean="0"/>
-              <a:t>20-10-2014</a:t>
+              <a:t>4-11-2014</a:t>
             </a:fld>
             <a:endParaRPr lang="nl-NL"/>
           </a:p>
@@ -20133,7 +17521,7 @@
           <a:p>
             <a:fld id="{4088EF54-C641-44F0-83F7-2E2A8BF04AC9}" type="datetimeFigureOut">
               <a:rPr lang="nl-NL" smtClean="0"/>
-              <a:t>20-10-2014</a:t>
+              <a:t>4-11-2014</a:t>
             </a:fld>
             <a:endParaRPr lang="nl-NL"/>
           </a:p>
@@ -20559,7 +17947,7 @@
           <a:p>
             <a:fld id="{4088EF54-C641-44F0-83F7-2E2A8BF04AC9}" type="datetimeFigureOut">
               <a:rPr lang="nl-NL" smtClean="0"/>
-              <a:t>20-10-2014</a:t>
+              <a:t>4-11-2014</a:t>
             </a:fld>
             <a:endParaRPr lang="nl-NL"/>
           </a:p>
@@ -20672,7 +18060,7 @@
           <a:p>
             <a:fld id="{4088EF54-C641-44F0-83F7-2E2A8BF04AC9}" type="datetimeFigureOut">
               <a:rPr lang="nl-NL" smtClean="0"/>
-              <a:t>20-10-2014</a:t>
+              <a:t>4-11-2014</a:t>
             </a:fld>
             <a:endParaRPr lang="nl-NL"/>
           </a:p>
@@ -20853,7 +18241,7 @@
           <a:p>
             <a:fld id="{4088EF54-C641-44F0-83F7-2E2A8BF04AC9}" type="datetimeFigureOut">
               <a:rPr lang="nl-NL" smtClean="0"/>
-              <a:t>20-10-2014</a:t>
+              <a:t>4-11-2014</a:t>
             </a:fld>
             <a:endParaRPr lang="nl-NL"/>
           </a:p>
@@ -21119,7 +18507,7 @@
           <a:p>
             <a:fld id="{4088EF54-C641-44F0-83F7-2E2A8BF04AC9}" type="datetimeFigureOut">
               <a:rPr lang="nl-NL" smtClean="0"/>
-              <a:t>20-10-2014</a:t>
+              <a:t>4-11-2014</a:t>
             </a:fld>
             <a:endParaRPr lang="nl-NL"/>
           </a:p>
@@ -21589,7 +18977,7 @@
           <a:p>
             <a:fld id="{4088EF54-C641-44F0-83F7-2E2A8BF04AC9}" type="datetimeFigureOut">
               <a:rPr lang="nl-NL" smtClean="0"/>
-              <a:t>20-10-2014</a:t>
+              <a:t>4-11-2014</a:t>
             </a:fld>
             <a:endParaRPr lang="nl-NL"/>
           </a:p>
@@ -22149,7 +19537,7 @@
           <a:p>
             <a:fld id="{4088EF54-C641-44F0-83F7-2E2A8BF04AC9}" type="datetimeFigureOut">
               <a:rPr lang="nl-NL" smtClean="0"/>
-              <a:t>20-10-2014</a:t>
+              <a:t>4-11-2014</a:t>
             </a:fld>
             <a:endParaRPr lang="nl-NL"/>
           </a:p>
@@ -26543,7 +23931,7 @@
                         <m:sSubPr>
                           <m:ctrlPr>
                             <a:rPr lang="nl-NL" i="1" smtClean="0">
-                              <a:latin typeface="Cambria Math"/>
+                              <a:latin typeface="Cambria Math" panose="02040503050406030204" pitchFamily="18" charset="0"/>
                             </a:rPr>
                           </m:ctrlPr>
                         </m:sSubPr>
@@ -26568,7 +23956,7 @@
                         <m:dPr>
                           <m:ctrlPr>
                             <a:rPr lang="nl-NL" i="1">
-                              <a:latin typeface="Cambria Math"/>
+                              <a:latin typeface="Cambria Math" panose="02040503050406030204" pitchFamily="18" charset="0"/>
                               <a:ea typeface="Cambria Math"/>
                             </a:rPr>
                           </m:ctrlPr>
@@ -26595,7 +23983,7 @@
                           <m:chr m:val="∑"/>
                           <m:ctrlPr>
                             <a:rPr lang="en-GB" b="0" i="1" smtClean="0">
-                              <a:latin typeface="Cambria Math"/>
+                              <a:latin typeface="Cambria Math" panose="02040503050406030204" pitchFamily="18" charset="0"/>
                               <a:ea typeface="Cambria Math"/>
                             </a:rPr>
                           </m:ctrlPr>
@@ -26647,7 +24035,7 @@
                             <m:sSubPr>
                               <m:ctrlPr>
                                 <a:rPr lang="en-GB" b="0" i="1" smtClean="0">
-                                  <a:latin typeface="Cambria Math"/>
+                                  <a:latin typeface="Cambria Math" panose="02040503050406030204" pitchFamily="18" charset="0"/>
                                   <a:ea typeface="Cambria Math"/>
                                 </a:rPr>
                               </m:ctrlPr>
@@ -26675,7 +24063,7 @@
                             <m:dPr>
                               <m:ctrlPr>
                                 <a:rPr lang="en-GB" i="1">
-                                  <a:latin typeface="Cambria Math"/>
+                                  <a:latin typeface="Cambria Math" panose="02040503050406030204" pitchFamily="18" charset="0"/>
                                   <a:ea typeface="Cambria Math"/>
                                 </a:rPr>
                               </m:ctrlPr>
@@ -26694,7 +24082,7 @@
                             <m:sSubPr>
                               <m:ctrlPr>
                                 <a:rPr lang="en-GB" i="1" smtClean="0">
-                                  <a:latin typeface="Cambria Math"/>
+                                  <a:latin typeface="Cambria Math" panose="02040503050406030204" pitchFamily="18" charset="0"/>
                                   <a:ea typeface="Cambria Math"/>
                                 </a:rPr>
                               </m:ctrlPr>
@@ -26752,7 +24140,7 @@
                           <m:chr m:val="∑"/>
                           <m:ctrlPr>
                             <a:rPr lang="en-GB" i="1">
-                              <a:latin typeface="Cambria Math"/>
+                              <a:latin typeface="Cambria Math" panose="02040503050406030204" pitchFamily="18" charset="0"/>
                               <a:ea typeface="Cambria Math"/>
                             </a:rPr>
                           </m:ctrlPr>
@@ -26804,7 +24192,7 @@
                             <m:sSubPr>
                               <m:ctrlPr>
                                 <a:rPr lang="en-GB" i="1">
-                                  <a:latin typeface="Cambria Math"/>
+                                  <a:latin typeface="Cambria Math" panose="02040503050406030204" pitchFamily="18" charset="0"/>
                                   <a:ea typeface="Cambria Math"/>
                                 </a:rPr>
                               </m:ctrlPr>
@@ -26936,7 +24324,7 @@
                           <m:chr m:val="∑"/>
                           <m:ctrlPr>
                             <a:rPr lang="en-GB" i="1" smtClean="0">
-                              <a:latin typeface="Cambria Math"/>
+                              <a:latin typeface="Cambria Math" panose="02040503050406030204" pitchFamily="18" charset="0"/>
                               <a:ea typeface="Cambria Math"/>
                             </a:rPr>
                           </m:ctrlPr>
@@ -26988,7 +24376,7 @@
                             <m:sSupPr>
                               <m:ctrlPr>
                                 <a:rPr lang="en-GB" i="1" smtClean="0">
-                                  <a:latin typeface="Cambria Math"/>
+                                  <a:latin typeface="Cambria Math" panose="02040503050406030204" pitchFamily="18" charset="0"/>
                                   <a:ea typeface="Cambria Math"/>
                                 </a:rPr>
                               </m:ctrlPr>
@@ -26998,7 +24386,7 @@
                                 <m:sSubPr>
                                   <m:ctrlPr>
                                     <a:rPr lang="en-GB" i="1">
-                                      <a:latin typeface="Cambria Math"/>
+                                      <a:latin typeface="Cambria Math" panose="02040503050406030204" pitchFamily="18" charset="0"/>
                                       <a:ea typeface="Cambria Math"/>
                                     </a:rPr>
                                   </m:ctrlPr>
@@ -29525,7 +26913,7 @@
                           <m:sSubPr>
                             <m:ctrlPr>
                               <a:rPr lang="nl-NL" i="1" smtClean="0">
-                                <a:latin typeface="Cambria Math"/>
+                                <a:latin typeface="Cambria Math" panose="02040503050406030204" pitchFamily="18" charset="0"/>
                               </a:rPr>
                             </m:ctrlPr>
                           </m:sSubPr>
@@ -29550,7 +26938,7 @@
                           <m:dPr>
                             <m:ctrlPr>
                               <a:rPr lang="en-GB" b="0" i="1" smtClean="0">
-                                <a:latin typeface="Cambria Math"/>
+                                <a:latin typeface="Cambria Math" panose="02040503050406030204" pitchFamily="18" charset="0"/>
                               </a:rPr>
                             </m:ctrlPr>
                           </m:dPr>
@@ -29568,7 +26956,7 @@
                           <m:sSubPr>
                             <m:ctrlPr>
                               <a:rPr lang="nl-NL" i="1">
-                                <a:latin typeface="Cambria Math"/>
+                                <a:latin typeface="Cambria Math" panose="02040503050406030204" pitchFamily="18" charset="0"/>
                               </a:rPr>
                             </m:ctrlPr>
                           </m:sSubPr>
@@ -29599,7 +26987,7 @@
                           <m:sSubPr>
                             <m:ctrlPr>
                               <a:rPr lang="nl-NL" i="1">
-                                <a:latin typeface="Cambria Math"/>
+                                <a:latin typeface="Cambria Math" panose="02040503050406030204" pitchFamily="18" charset="0"/>
                               </a:rPr>
                             </m:ctrlPr>
                           </m:sSubPr>
@@ -29624,7 +27012,7 @@
                           <m:dPr>
                             <m:ctrlPr>
                               <a:rPr lang="nl-NL" i="1" smtClean="0">
-                                <a:latin typeface="Cambria Math"/>
+                                <a:latin typeface="Cambria Math" panose="02040503050406030204" pitchFamily="18" charset="0"/>
                               </a:rPr>
                             </m:ctrlPr>
                           </m:dPr>
@@ -29720,7 +27108,7 @@
                           <m:sSubPr>
                             <m:ctrlPr>
                               <a:rPr lang="nl-NL" i="1" smtClean="0">
-                                <a:latin typeface="Cambria Math"/>
+                                <a:latin typeface="Cambria Math" panose="02040503050406030204" pitchFamily="18" charset="0"/>
                               </a:rPr>
                             </m:ctrlPr>
                           </m:sSubPr>
@@ -29745,7 +27133,7 @@
                           <m:dPr>
                             <m:ctrlPr>
                               <a:rPr lang="en-GB" b="0" i="1" smtClean="0">
-                                <a:latin typeface="Cambria Math"/>
+                                <a:latin typeface="Cambria Math" panose="02040503050406030204" pitchFamily="18" charset="0"/>
                               </a:rPr>
                             </m:ctrlPr>
                           </m:dPr>
@@ -29763,7 +27151,7 @@
                           <m:sSubPr>
                             <m:ctrlPr>
                               <a:rPr lang="nl-NL" i="1">
-                                <a:latin typeface="Cambria Math"/>
+                                <a:latin typeface="Cambria Math" panose="02040503050406030204" pitchFamily="18" charset="0"/>
                               </a:rPr>
                             </m:ctrlPr>
                           </m:sSubPr>
@@ -29837,8 +27225,8 @@
             </p:sp>
           </mc:Fallback>
         </mc:AlternateContent>
-        <mc:AlternateContent xmlns:mc="http://schemas.openxmlformats.org/markup-compatibility/2006">
-          <mc:Choice xmlns:a14="http://schemas.microsoft.com/office/drawing/2010/main" Requires="a14">
+        <mc:AlternateContent xmlns:mc="http://schemas.openxmlformats.org/markup-compatibility/2006" xmlns:a14="http://schemas.microsoft.com/office/drawing/2010/main">
+          <mc:Choice Requires="a14">
             <p:sp>
               <p:nvSpPr>
                 <p:cNvPr id="16" name="TextBox 15"/>
@@ -29872,7 +27260,7 @@
                           <m:sSubPr>
                             <m:ctrlPr>
                               <a:rPr lang="nl-NL" i="1" smtClean="0">
-                                <a:latin typeface="Cambria Math"/>
+                                <a:latin typeface="Cambria Math" panose="02040503050406030204" pitchFamily="18" charset="0"/>
                               </a:rPr>
                             </m:ctrlPr>
                           </m:sSubPr>
@@ -29897,7 +27285,7 @@
                           <m:dPr>
                             <m:ctrlPr>
                               <a:rPr lang="en-GB" b="0" i="1" smtClean="0">
-                                <a:latin typeface="Cambria Math"/>
+                                <a:latin typeface="Cambria Math" panose="02040503050406030204" pitchFamily="18" charset="0"/>
                               </a:rPr>
                             </m:ctrlPr>
                           </m:dPr>
@@ -29915,7 +27303,7 @@
                           <m:sSubPr>
                             <m:ctrlPr>
                               <a:rPr lang="nl-NL" i="1">
-                                <a:latin typeface="Cambria Math"/>
+                                <a:latin typeface="Cambria Math" panose="02040503050406030204" pitchFamily="18" charset="0"/>
                               </a:rPr>
                             </m:ctrlPr>
                           </m:sSubPr>
@@ -29950,7 +27338,7 @@
               </p:txBody>
             </p:sp>
           </mc:Choice>
-          <mc:Fallback>
+          <mc:Fallback xmlns="">
             <p:sp>
               <p:nvSpPr>
                 <p:cNvPr id="16" name="TextBox 15"/>
@@ -29989,8 +27377,8 @@
             </p:sp>
           </mc:Fallback>
         </mc:AlternateContent>
-        <mc:AlternateContent xmlns:mc="http://schemas.openxmlformats.org/markup-compatibility/2006">
-          <mc:Choice xmlns:a14="http://schemas.microsoft.com/office/drawing/2010/main" Requires="a14">
+        <mc:AlternateContent xmlns:mc="http://schemas.openxmlformats.org/markup-compatibility/2006" xmlns:a14="http://schemas.microsoft.com/office/drawing/2010/main">
+          <mc:Choice Requires="a14">
             <p:sp>
               <p:nvSpPr>
                 <p:cNvPr id="17" name="TextBox 16"/>
@@ -30024,7 +27412,7 @@
                           <m:sSubPr>
                             <m:ctrlPr>
                               <a:rPr lang="nl-NL" i="1" smtClean="0">
-                                <a:latin typeface="Cambria Math"/>
+                                <a:latin typeface="Cambria Math" panose="02040503050406030204" pitchFamily="18" charset="0"/>
                               </a:rPr>
                             </m:ctrlPr>
                           </m:sSubPr>
@@ -30049,7 +27437,7 @@
                           <m:dPr>
                             <m:ctrlPr>
                               <a:rPr lang="en-GB" b="0" i="1" smtClean="0">
-                                <a:latin typeface="Cambria Math"/>
+                                <a:latin typeface="Cambria Math" panose="02040503050406030204" pitchFamily="18" charset="0"/>
                               </a:rPr>
                             </m:ctrlPr>
                           </m:dPr>
@@ -30067,7 +27455,7 @@
                           <m:sSubPr>
                             <m:ctrlPr>
                               <a:rPr lang="nl-NL" i="1">
-                                <a:latin typeface="Cambria Math"/>
+                                <a:latin typeface="Cambria Math" panose="02040503050406030204" pitchFamily="18" charset="0"/>
                               </a:rPr>
                             </m:ctrlPr>
                           </m:sSubPr>
@@ -30102,7 +27490,7 @@
               </p:txBody>
             </p:sp>
           </mc:Choice>
-          <mc:Fallback>
+          <mc:Fallback xmlns="">
             <p:sp>
               <p:nvSpPr>
                 <p:cNvPr id="17" name="TextBox 16"/>
@@ -30320,7 +27708,7 @@
                       <m:sSubPr>
                         <m:ctrlPr>
                           <a:rPr lang="nl-NL" i="1" smtClean="0">
-                            <a:latin typeface="Cambria Math"/>
+                            <a:latin typeface="Cambria Math" panose="02040503050406030204" pitchFamily="18" charset="0"/>
                           </a:rPr>
                         </m:ctrlPr>
                       </m:sSubPr>
@@ -30345,7 +27733,7 @@
                       <m:dPr>
                         <m:ctrlPr>
                           <a:rPr lang="nl-NL" i="1">
-                            <a:latin typeface="Cambria Math"/>
+                            <a:latin typeface="Cambria Math" panose="02040503050406030204" pitchFamily="18" charset="0"/>
                             <a:ea typeface="Cambria Math"/>
                           </a:rPr>
                         </m:ctrlPr>
@@ -30372,7 +27760,7 @@
                       <m:sSubPr>
                         <m:ctrlPr>
                           <a:rPr lang="nl-NL" i="1">
-                            <a:latin typeface="Cambria Math"/>
+                            <a:latin typeface="Cambria Math" panose="02040503050406030204" pitchFamily="18" charset="0"/>
                           </a:rPr>
                         </m:ctrlPr>
                       </m:sSubPr>
@@ -30397,7 +27785,7 @@
                       <m:dPr>
                         <m:ctrlPr>
                           <a:rPr lang="nl-NL" i="1">
-                            <a:latin typeface="Cambria Math"/>
+                            <a:latin typeface="Cambria Math" panose="02040503050406030204" pitchFamily="18" charset="0"/>
                             <a:ea typeface="Cambria Math"/>
                           </a:rPr>
                         </m:ctrlPr>
@@ -30423,7 +27811,7 @@
                       <m:sSupPr>
                         <m:ctrlPr>
                           <a:rPr lang="nl-NL" i="1">
-                            <a:latin typeface="Cambria Math"/>
+                            <a:latin typeface="Cambria Math" panose="02040503050406030204" pitchFamily="18" charset="0"/>
                           </a:rPr>
                         </m:ctrlPr>
                       </m:sSupPr>
@@ -30452,7 +27840,7 @@
                           <m:dPr>
                             <m:ctrlPr>
                               <a:rPr lang="nl-NL" i="1">
-                                <a:latin typeface="Cambria Math"/>
+                                <a:latin typeface="Cambria Math" panose="02040503050406030204" pitchFamily="18" charset="0"/>
                                 <a:ea typeface="Cambria Math"/>
                               </a:rPr>
                             </m:ctrlPr>
@@ -30794,7 +28182,7 @@
                           <m:sSubPr>
                             <m:ctrlPr>
                               <a:rPr lang="nl-NL" i="1" smtClean="0">
-                                <a:latin typeface="Cambria Math"/>
+                                <a:latin typeface="Cambria Math" panose="02040503050406030204" pitchFamily="18" charset="0"/>
                               </a:rPr>
                             </m:ctrlPr>
                           </m:sSubPr>
@@ -30819,7 +28207,7 @@
                           <m:dPr>
                             <m:ctrlPr>
                               <a:rPr lang="en-GB" b="0" i="1" smtClean="0">
-                                <a:latin typeface="Cambria Math"/>
+                                <a:latin typeface="Cambria Math" panose="02040503050406030204" pitchFamily="18" charset="0"/>
                               </a:rPr>
                             </m:ctrlPr>
                           </m:dPr>
@@ -30837,7 +28225,7 @@
                           <m:sSubPr>
                             <m:ctrlPr>
                               <a:rPr lang="nl-NL" i="1">
-                                <a:latin typeface="Cambria Math"/>
+                                <a:latin typeface="Cambria Math" panose="02040503050406030204" pitchFamily="18" charset="0"/>
                               </a:rPr>
                             </m:ctrlPr>
                           </m:sSubPr>
@@ -30868,7 +28256,7 @@
                           <m:sSubPr>
                             <m:ctrlPr>
                               <a:rPr lang="nl-NL" i="1">
-                                <a:latin typeface="Cambria Math"/>
+                                <a:latin typeface="Cambria Math" panose="02040503050406030204" pitchFamily="18" charset="0"/>
                               </a:rPr>
                             </m:ctrlPr>
                           </m:sSubPr>
@@ -30893,7 +28281,7 @@
                           <m:dPr>
                             <m:ctrlPr>
                               <a:rPr lang="nl-NL" i="1" smtClean="0">
-                                <a:latin typeface="Cambria Math"/>
+                                <a:latin typeface="Cambria Math" panose="02040503050406030204" pitchFamily="18" charset="0"/>
                               </a:rPr>
                             </m:ctrlPr>
                           </m:dPr>
@@ -30989,7 +28377,7 @@
                           <m:sSubPr>
                             <m:ctrlPr>
                               <a:rPr lang="nl-NL" i="1" smtClean="0">
-                                <a:latin typeface="Cambria Math"/>
+                                <a:latin typeface="Cambria Math" panose="02040503050406030204" pitchFamily="18" charset="0"/>
                               </a:rPr>
                             </m:ctrlPr>
                           </m:sSubPr>
@@ -31014,7 +28402,7 @@
                           <m:dPr>
                             <m:ctrlPr>
                               <a:rPr lang="en-GB" b="0" i="1" smtClean="0">
-                                <a:latin typeface="Cambria Math"/>
+                                <a:latin typeface="Cambria Math" panose="02040503050406030204" pitchFamily="18" charset="0"/>
                               </a:rPr>
                             </m:ctrlPr>
                           </m:dPr>
@@ -31032,7 +28420,7 @@
                           <m:sSubPr>
                             <m:ctrlPr>
                               <a:rPr lang="nl-NL" i="1">
-                                <a:latin typeface="Cambria Math"/>
+                                <a:latin typeface="Cambria Math" panose="02040503050406030204" pitchFamily="18" charset="0"/>
                               </a:rPr>
                             </m:ctrlPr>
                           </m:sSubPr>
@@ -31106,8 +28494,8 @@
             </p:sp>
           </mc:Fallback>
         </mc:AlternateContent>
-        <mc:AlternateContent xmlns:mc="http://schemas.openxmlformats.org/markup-compatibility/2006">
-          <mc:Choice xmlns:a14="http://schemas.microsoft.com/office/drawing/2010/main" Requires="a14">
+        <mc:AlternateContent xmlns:mc="http://schemas.openxmlformats.org/markup-compatibility/2006" xmlns:a14="http://schemas.microsoft.com/office/drawing/2010/main">
+          <mc:Choice Requires="a14">
             <p:sp>
               <p:nvSpPr>
                 <p:cNvPr id="18" name="TextBox 17"/>
@@ -31141,7 +28529,7 @@
                           <m:sSubPr>
                             <m:ctrlPr>
                               <a:rPr lang="nl-NL" i="1" smtClean="0">
-                                <a:latin typeface="Cambria Math"/>
+                                <a:latin typeface="Cambria Math" panose="02040503050406030204" pitchFamily="18" charset="0"/>
                               </a:rPr>
                             </m:ctrlPr>
                           </m:sSubPr>
@@ -31166,7 +28554,7 @@
                           <m:dPr>
                             <m:ctrlPr>
                               <a:rPr lang="en-GB" b="0" i="1" smtClean="0">
-                                <a:latin typeface="Cambria Math"/>
+                                <a:latin typeface="Cambria Math" panose="02040503050406030204" pitchFamily="18" charset="0"/>
                               </a:rPr>
                             </m:ctrlPr>
                           </m:dPr>
@@ -31184,7 +28572,7 @@
                           <m:sSubPr>
                             <m:ctrlPr>
                               <a:rPr lang="nl-NL" i="1">
-                                <a:latin typeface="Cambria Math"/>
+                                <a:latin typeface="Cambria Math" panose="02040503050406030204" pitchFamily="18" charset="0"/>
                               </a:rPr>
                             </m:ctrlPr>
                           </m:sSubPr>
@@ -31219,7 +28607,7 @@
               </p:txBody>
             </p:sp>
           </mc:Choice>
-          <mc:Fallback>
+          <mc:Fallback xmlns="">
             <p:sp>
               <p:nvSpPr>
                 <p:cNvPr id="18" name="TextBox 17"/>
@@ -31258,8 +28646,8 @@
             </p:sp>
           </mc:Fallback>
         </mc:AlternateContent>
-        <mc:AlternateContent xmlns:mc="http://schemas.openxmlformats.org/markup-compatibility/2006">
-          <mc:Choice xmlns:a14="http://schemas.microsoft.com/office/drawing/2010/main" Requires="a14">
+        <mc:AlternateContent xmlns:mc="http://schemas.openxmlformats.org/markup-compatibility/2006" xmlns:a14="http://schemas.microsoft.com/office/drawing/2010/main">
+          <mc:Choice Requires="a14">
             <p:sp>
               <p:nvSpPr>
                 <p:cNvPr id="19" name="TextBox 18"/>
@@ -31293,7 +28681,7 @@
                           <m:sSubPr>
                             <m:ctrlPr>
                               <a:rPr lang="nl-NL" i="1" smtClean="0">
-                                <a:latin typeface="Cambria Math"/>
+                                <a:latin typeface="Cambria Math" panose="02040503050406030204" pitchFamily="18" charset="0"/>
                               </a:rPr>
                             </m:ctrlPr>
                           </m:sSubPr>
@@ -31318,7 +28706,7 @@
                           <m:dPr>
                             <m:ctrlPr>
                               <a:rPr lang="en-GB" b="0" i="1" smtClean="0">
-                                <a:latin typeface="Cambria Math"/>
+                                <a:latin typeface="Cambria Math" panose="02040503050406030204" pitchFamily="18" charset="0"/>
                               </a:rPr>
                             </m:ctrlPr>
                           </m:dPr>
@@ -31336,7 +28724,7 @@
                           <m:sSubPr>
                             <m:ctrlPr>
                               <a:rPr lang="nl-NL" i="1">
-                                <a:latin typeface="Cambria Math"/>
+                                <a:latin typeface="Cambria Math" panose="02040503050406030204" pitchFamily="18" charset="0"/>
                               </a:rPr>
                             </m:ctrlPr>
                           </m:sSubPr>
@@ -31371,7 +28759,7 @@
               </p:txBody>
             </p:sp>
           </mc:Choice>
-          <mc:Fallback>
+          <mc:Fallback xmlns="">
             <p:sp>
               <p:nvSpPr>
                 <p:cNvPr id="19" name="TextBox 18"/>
@@ -31526,7 +28914,7 @@
                         <m:sSubPr>
                           <m:ctrlPr>
                             <a:rPr lang="nl-NL" i="1" smtClean="0">
-                              <a:latin typeface="Cambria Math"/>
+                              <a:latin typeface="Cambria Math" panose="02040503050406030204" pitchFamily="18" charset="0"/>
                             </a:rPr>
                           </m:ctrlPr>
                         </m:sSubPr>
@@ -31551,7 +28939,7 @@
                         <m:dPr>
                           <m:ctrlPr>
                             <a:rPr lang="nl-NL" i="1">
-                              <a:latin typeface="Cambria Math"/>
+                              <a:latin typeface="Cambria Math" panose="02040503050406030204" pitchFamily="18" charset="0"/>
                             </a:rPr>
                           </m:ctrlPr>
                         </m:dPr>
@@ -31569,7 +28957,7 @@
                         <m:fPr>
                           <m:ctrlPr>
                             <a:rPr lang="nl-NL" i="1">
-                              <a:latin typeface="Cambria Math"/>
+                              <a:latin typeface="Cambria Math" panose="02040503050406030204" pitchFamily="18" charset="0"/>
                             </a:rPr>
                           </m:ctrlPr>
                         </m:fPr>
@@ -31578,7 +28966,7 @@
                             <m:sSubPr>
                               <m:ctrlPr>
                                 <a:rPr lang="nl-NL" i="1">
-                                  <a:latin typeface="Cambria Math"/>
+                                  <a:latin typeface="Cambria Math" panose="02040503050406030204" pitchFamily="18" charset="0"/>
                                 </a:rPr>
                               </m:ctrlPr>
                             </m:sSubPr>
@@ -31611,7 +28999,7 @@
                             <m:sSubPr>
                               <m:ctrlPr>
                                 <a:rPr lang="nl-NL" i="1">
-                                  <a:latin typeface="Cambria Math"/>
+                                  <a:latin typeface="Cambria Math" panose="02040503050406030204" pitchFamily="18" charset="0"/>
                                 </a:rPr>
                               </m:ctrlPr>
                             </m:sSubPr>
@@ -31657,7 +29045,7 @@
                         <m:sSubPr>
                           <m:ctrlPr>
                             <a:rPr lang="en-GB" i="1">
-                              <a:latin typeface="Cambria Math"/>
+                              <a:latin typeface="Cambria Math" panose="02040503050406030204" pitchFamily="18" charset="0"/>
                             </a:rPr>
                           </m:ctrlPr>
                         </m:sSubPr>
@@ -31682,7 +29070,7 @@
                         <m:dPr>
                           <m:ctrlPr>
                             <a:rPr lang="nl-NL" i="1">
-                              <a:latin typeface="Cambria Math"/>
+                              <a:latin typeface="Cambria Math" panose="02040503050406030204" pitchFamily="18" charset="0"/>
                             </a:rPr>
                           </m:ctrlPr>
                         </m:dPr>
@@ -31778,7 +29166,7 @@
                         <m:fPr>
                           <m:ctrlPr>
                             <a:rPr lang="nl-NL" i="1" smtClean="0">
-                              <a:latin typeface="Cambria Math"/>
+                              <a:latin typeface="Cambria Math" panose="02040503050406030204" pitchFamily="18" charset="0"/>
                             </a:rPr>
                           </m:ctrlPr>
                         </m:fPr>
@@ -31787,7 +29175,7 @@
                             <m:sSubPr>
                               <m:ctrlPr>
                                 <a:rPr lang="nl-NL" i="1">
-                                  <a:latin typeface="Cambria Math"/>
+                                  <a:latin typeface="Cambria Math" panose="02040503050406030204" pitchFamily="18" charset="0"/>
                                 </a:rPr>
                               </m:ctrlPr>
                             </m:sSubPr>
@@ -31820,7 +29208,7 @@
                             <m:sSubPr>
                               <m:ctrlPr>
                                 <a:rPr lang="nl-NL" i="1">
-                                  <a:latin typeface="Cambria Math"/>
+                                  <a:latin typeface="Cambria Math" panose="02040503050406030204" pitchFamily="18" charset="0"/>
                                 </a:rPr>
                               </m:ctrlPr>
                             </m:sSubPr>
@@ -31866,7 +29254,7 @@
                         <m:sSubPr>
                           <m:ctrlPr>
                             <a:rPr lang="en-GB" i="1">
-                              <a:latin typeface="Cambria Math"/>
+                              <a:latin typeface="Cambria Math" panose="02040503050406030204" pitchFamily="18" charset="0"/>
                             </a:rPr>
                           </m:ctrlPr>
                         </m:sSubPr>
@@ -31975,7 +29363,7 @@
                         <m:dPr>
                           <m:ctrlPr>
                             <a:rPr lang="nl-NL" i="1">
-                              <a:latin typeface="Cambria Math"/>
+                              <a:latin typeface="Cambria Math" panose="02040503050406030204" pitchFamily="18" charset="0"/>
                               <a:ea typeface="Cambria Math"/>
                             </a:rPr>
                           </m:ctrlPr>
@@ -32001,7 +29389,7 @@
                         <m:sSubPr>
                           <m:ctrlPr>
                             <a:rPr lang="en-GB" b="0" i="1" smtClean="0">
-                              <a:latin typeface="Cambria Math"/>
+                              <a:latin typeface="Cambria Math" panose="02040503050406030204" pitchFamily="18" charset="0"/>
                               <a:ea typeface="Cambria Math"/>
                             </a:rPr>
                           </m:ctrlPr>
@@ -32029,7 +29417,7 @@
                         <m:dPr>
                           <m:ctrlPr>
                             <a:rPr lang="en-GB" b="0" i="1" smtClean="0">
-                              <a:latin typeface="Cambria Math"/>
+                              <a:latin typeface="Cambria Math" panose="02040503050406030204" pitchFamily="18" charset="0"/>
                               <a:ea typeface="Cambria Math"/>
                             </a:rPr>
                           </m:ctrlPr>
@@ -32039,7 +29427,7 @@
                             <m:fPr>
                               <m:ctrlPr>
                                 <a:rPr lang="en-GB" b="0" i="1" smtClean="0">
-                                  <a:latin typeface="Cambria Math"/>
+                                  <a:latin typeface="Cambria Math" panose="02040503050406030204" pitchFamily="18" charset="0"/>
                                   <a:ea typeface="Cambria Math"/>
                                 </a:rPr>
                               </m:ctrlPr>
@@ -32049,7 +29437,7 @@
                                 <m:sSubPr>
                                   <m:ctrlPr>
                                     <a:rPr lang="nl-NL" i="1">
-                                      <a:latin typeface="Cambria Math"/>
+                                      <a:latin typeface="Cambria Math" panose="02040503050406030204" pitchFamily="18" charset="0"/>
                                     </a:rPr>
                                   </m:ctrlPr>
                                 </m:sSubPr>
@@ -32074,7 +29462,7 @@
                                 <m:dPr>
                                   <m:ctrlPr>
                                     <a:rPr lang="nl-NL" i="1">
-                                      <a:latin typeface="Cambria Math"/>
+                                      <a:latin typeface="Cambria Math" panose="02040503050406030204" pitchFamily="18" charset="0"/>
                                       <a:ea typeface="Cambria Math"/>
                                     </a:rPr>
                                   </m:ctrlPr>
@@ -32095,7 +29483,7 @@
                                 <m:sSubPr>
                                   <m:ctrlPr>
                                     <a:rPr lang="nl-NL" i="1">
-                                      <a:latin typeface="Cambria Math"/>
+                                      <a:latin typeface="Cambria Math" panose="02040503050406030204" pitchFamily="18" charset="0"/>
                                     </a:rPr>
                                   </m:ctrlPr>
                                 </m:sSubPr>
@@ -32120,7 +29508,7 @@
                                 <m:dPr>
                                   <m:ctrlPr>
                                     <a:rPr lang="nl-NL" i="1">
-                                      <a:latin typeface="Cambria Math"/>
+                                      <a:latin typeface="Cambria Math" panose="02040503050406030204" pitchFamily="18" charset="0"/>
                                       <a:ea typeface="Cambria Math"/>
                                     </a:rPr>
                                   </m:ctrlPr>
@@ -32150,7 +29538,7 @@
                         <m:sSubPr>
                           <m:ctrlPr>
                             <a:rPr lang="en-GB" i="1">
-                              <a:latin typeface="Cambria Math"/>
+                              <a:latin typeface="Cambria Math" panose="02040503050406030204" pitchFamily="18" charset="0"/>
                               <a:ea typeface="Cambria Math"/>
                             </a:rPr>
                           </m:ctrlPr>
@@ -32178,7 +29566,7 @@
                         <m:dPr>
                           <m:ctrlPr>
                             <a:rPr lang="en-GB" i="1">
-                              <a:latin typeface="Cambria Math"/>
+                              <a:latin typeface="Cambria Math" panose="02040503050406030204" pitchFamily="18" charset="0"/>
                               <a:ea typeface="Cambria Math"/>
                             </a:rPr>
                           </m:ctrlPr>
@@ -32188,7 +29576,7 @@
                             <m:sSubPr>
                               <m:ctrlPr>
                                 <a:rPr lang="en-GB" i="1" smtClean="0">
-                                  <a:latin typeface="Cambria Math"/>
+                                  <a:latin typeface="Cambria Math" panose="02040503050406030204" pitchFamily="18" charset="0"/>
                                   <a:ea typeface="Cambria Math"/>
                                 </a:rPr>
                               </m:ctrlPr>
@@ -32216,7 +29604,7 @@
                             <m:dPr>
                               <m:ctrlPr>
                                 <a:rPr lang="en-GB" i="1" smtClean="0">
-                                  <a:latin typeface="Cambria Math"/>
+                                  <a:latin typeface="Cambria Math" panose="02040503050406030204" pitchFamily="18" charset="0"/>
                                   <a:ea typeface="Cambria Math"/>
                                 </a:rPr>
                               </m:ctrlPr>
@@ -32411,7 +29799,7 @@
                         <m:dPr>
                           <m:ctrlPr>
                             <a:rPr lang="nl-NL" i="1">
-                              <a:latin typeface="Cambria Math"/>
+                              <a:latin typeface="Cambria Math" panose="02040503050406030204" pitchFamily="18" charset="0"/>
                               <a:ea typeface="Cambria Math"/>
                             </a:rPr>
                           </m:ctrlPr>
@@ -32444,7 +29832,7 @@
                         <m:dPr>
                           <m:ctrlPr>
                             <a:rPr lang="en-GB" b="0" i="1" smtClean="0">
-                              <a:latin typeface="Cambria Math"/>
+                              <a:latin typeface="Cambria Math" panose="02040503050406030204" pitchFamily="18" charset="0"/>
                               <a:ea typeface="Cambria Math"/>
                             </a:rPr>
                           </m:ctrlPr>
@@ -32592,7 +29980,7 @@
                         <m:dPr>
                           <m:ctrlPr>
                             <a:rPr lang="en-GB" b="0" i="1" smtClean="0">
-                              <a:latin typeface="Cambria Math"/>
+                              <a:latin typeface="Cambria Math" panose="02040503050406030204" pitchFamily="18" charset="0"/>
                               <a:ea typeface="Cambria Math"/>
                             </a:rPr>
                           </m:ctrlPr>
@@ -33259,9 +30647,6 @@
                     <p:cTn id="3" fill="hold">
                       <p:stCondLst>
                         <p:cond delay="indefinite"/>
-                        <p:cond evt="onBegin" delay="0">
-                          <p:tn val="2"/>
-                        </p:cond>
                       </p:stCondLst>
                       <p:childTnLst>
                         <p:par>
@@ -33271,7 +30656,7 @@
                             </p:stCondLst>
                             <p:childTnLst>
                               <p:par>
-                                <p:cTn id="5" presetID="1" presetClass="entr" presetSubtype="0" fill="hold" nodeType="withEffect">
+                                <p:cTn id="5" presetID="1" presetClass="entr" presetSubtype="0" fill="hold" nodeType="clickEffect">
                                   <p:stCondLst>
                                     <p:cond delay="0"/>
                                   </p:stCondLst>
@@ -33285,6 +30670,33 @@
                                         </p:cTn>
                                         <p:tgtEl>
                                           <p:spTgt spid="14"/>
+                                        </p:tgtEl>
+                                        <p:attrNameLst>
+                                          <p:attrName>style.visibility</p:attrName>
+                                        </p:attrNameLst>
+                                      </p:cBhvr>
+                                      <p:to>
+                                        <p:strVal val="visible"/>
+                                      </p:to>
+                                    </p:set>
+                                  </p:childTnLst>
+                                </p:cTn>
+                              </p:par>
+                              <p:par>
+                                <p:cTn id="7" presetID="1" presetClass="entr" presetSubtype="0" fill="hold" nodeType="withEffect">
+                                  <p:stCondLst>
+                                    <p:cond delay="0"/>
+                                  </p:stCondLst>
+                                  <p:childTnLst>
+                                    <p:set>
+                                      <p:cBhvr>
+                                        <p:cTn id="8" dur="1" fill="hold">
+                                          <p:stCondLst>
+                                            <p:cond delay="0"/>
+                                          </p:stCondLst>
+                                        </p:cTn>
+                                        <p:tgtEl>
+                                          <p:spTgt spid="1028"/>
                                         </p:tgtEl>
                                         <p:attrNameLst>
                                           <p:attrName>style.visibility</p:attrName>

</xml_diff>

<commit_message>
Wrote method on concentration determination, and expanded upon the to do list in the presentation outline. Also moved files around to get them structure similar to the chapter planning.
</commit_message>
<xml_diff>
--- a/Cascading thesis/Presentation/Halfway presentation.pptx
+++ b/Cascading thesis/Presentation/Halfway presentation.pptx
@@ -178,7 +178,6 @@
           </a:p>
         </c:rich>
       </c:tx>
-      <c:layout/>
       <c:overlay val="0"/>
     </c:title>
     <c:autoTitleDeleted val="0"/>
@@ -522,11 +521,11 @@
           <c:showBubbleSize val="0"/>
         </c:dLbls>
         <c:gapWidth val="150"/>
-        <c:axId val="-1331302576"/>
-        <c:axId val="-1331314000"/>
+        <c:axId val="997800576"/>
+        <c:axId val="997801120"/>
       </c:barChart>
       <c:catAx>
-        <c:axId val="-1331302576"/>
+        <c:axId val="997800576"/>
         <c:scaling>
           <c:orientation val="minMax"/>
         </c:scaling>
@@ -536,7 +535,7 @@
         <c:majorTickMark val="out"/>
         <c:minorTickMark val="none"/>
         <c:tickLblPos val="nextTo"/>
-        <c:crossAx val="-1331314000"/>
+        <c:crossAx val="997801120"/>
         <c:crossesAt val="1.0000000000000002E-2"/>
         <c:auto val="1"/>
         <c:lblAlgn val="ctr"/>
@@ -544,7 +543,7 @@
         <c:noMultiLvlLbl val="0"/>
       </c:catAx>
       <c:valAx>
-        <c:axId val="-1331314000"/>
+        <c:axId val="997801120"/>
         <c:scaling>
           <c:logBase val="10"/>
           <c:orientation val="minMax"/>
@@ -556,7 +555,7 @@
         <c:majorTickMark val="out"/>
         <c:minorTickMark val="none"/>
         <c:tickLblPos val="nextTo"/>
-        <c:crossAx val="-1331302576"/>
+        <c:crossAx val="997800576"/>
         <c:crosses val="autoZero"/>
         <c:crossBetween val="between"/>
       </c:valAx>
@@ -6261,6 +6260,776 @@
       <dsp:cNvGrpSpPr/>
     </dsp:nvGrpSpPr>
     <dsp:grpSpPr/>
+    <dsp:sp modelId="{24488344-03B9-4938-8268-6A2816D722F0}">
+      <dsp:nvSpPr>
+        <dsp:cNvPr id="0" name=""/>
+        <dsp:cNvSpPr/>
+      </dsp:nvSpPr>
+      <dsp:spPr>
+        <a:xfrm>
+          <a:off x="0" y="228"/>
+          <a:ext cx="1354183" cy="0"/>
+        </a:xfrm>
+        <a:prstGeom prst="line">
+          <a:avLst/>
+        </a:prstGeom>
+        <a:solidFill>
+          <a:schemeClr val="accent1">
+            <a:hueOff val="0"/>
+            <a:satOff val="0"/>
+            <a:lumOff val="0"/>
+            <a:alphaOff val="0"/>
+          </a:schemeClr>
+        </a:solidFill>
+        <a:ln w="25400" cap="flat" cmpd="sng" algn="ctr">
+          <a:solidFill>
+            <a:schemeClr val="accent1">
+              <a:hueOff val="0"/>
+              <a:satOff val="0"/>
+              <a:lumOff val="0"/>
+              <a:alphaOff val="0"/>
+            </a:schemeClr>
+          </a:solidFill>
+          <a:prstDash val="solid"/>
+        </a:ln>
+        <a:effectLst/>
+      </dsp:spPr>
+      <dsp:style>
+        <a:lnRef idx="2">
+          <a:scrgbClr r="0" g="0" b="0"/>
+        </a:lnRef>
+        <a:fillRef idx="1">
+          <a:scrgbClr r="0" g="0" b="0"/>
+        </a:fillRef>
+        <a:effectRef idx="0">
+          <a:scrgbClr r="0" g="0" b="0"/>
+        </a:effectRef>
+        <a:fontRef idx="minor">
+          <a:schemeClr val="lt1"/>
+        </a:fontRef>
+      </dsp:style>
+    </dsp:sp>
+    <dsp:sp modelId="{D778619D-D5FF-46A3-8581-B8F8902A789A}">
+      <dsp:nvSpPr>
+        <dsp:cNvPr id="0" name=""/>
+        <dsp:cNvSpPr/>
+      </dsp:nvSpPr>
+      <dsp:spPr>
+        <a:xfrm>
+          <a:off x="0" y="228"/>
+          <a:ext cx="1354183" cy="267415"/>
+        </a:xfrm>
+        <a:prstGeom prst="rect">
+          <a:avLst/>
+        </a:prstGeom>
+        <a:noFill/>
+        <a:ln>
+          <a:noFill/>
+        </a:ln>
+        <a:effectLst/>
+      </dsp:spPr>
+      <dsp:style>
+        <a:lnRef idx="0">
+          <a:scrgbClr r="0" g="0" b="0"/>
+        </a:lnRef>
+        <a:fillRef idx="0">
+          <a:scrgbClr r="0" g="0" b="0"/>
+        </a:fillRef>
+        <a:effectRef idx="0">
+          <a:scrgbClr r="0" g="0" b="0"/>
+        </a:effectRef>
+        <a:fontRef idx="minor"/>
+      </dsp:style>
+      <dsp:txBody>
+        <a:bodyPr spcFirstLastPara="0" vert="horz" wrap="square" lIns="45720" tIns="45720" rIns="45720" bIns="45720" numCol="1" spcCol="1270" anchor="t" anchorCtr="0">
+          <a:noAutofit/>
+        </a:bodyPr>
+        <a:lstStyle/>
+        <a:p>
+          <a:pPr lvl="0" algn="l" defTabSz="533400">
+            <a:lnSpc>
+              <a:spcPct val="90000"/>
+            </a:lnSpc>
+            <a:spcBef>
+              <a:spcPct val="0"/>
+            </a:spcBef>
+            <a:spcAft>
+              <a:spcPct val="35000"/>
+            </a:spcAft>
+          </a:pPr>
+          <a:r>
+            <a:rPr lang="en-GB" sz="1200" kern="1200" dirty="0" smtClean="0"/>
+            <a:t>Molecule 32</a:t>
+          </a:r>
+          <a:endParaRPr lang="nl-NL" sz="1200" kern="1200" dirty="0"/>
+        </a:p>
+      </dsp:txBody>
+      <dsp:txXfrm>
+        <a:off x="0" y="228"/>
+        <a:ext cx="1354183" cy="267415"/>
+      </dsp:txXfrm>
+    </dsp:sp>
+    <dsp:sp modelId="{6073C3BF-591B-4F23-A6DC-EEA692BF150E}">
+      <dsp:nvSpPr>
+        <dsp:cNvPr id="0" name=""/>
+        <dsp:cNvSpPr/>
+      </dsp:nvSpPr>
+      <dsp:spPr>
+        <a:xfrm>
+          <a:off x="0" y="267643"/>
+          <a:ext cx="1354183" cy="0"/>
+        </a:xfrm>
+        <a:prstGeom prst="line">
+          <a:avLst/>
+        </a:prstGeom>
+        <a:solidFill>
+          <a:schemeClr val="accent1">
+            <a:hueOff val="0"/>
+            <a:satOff val="0"/>
+            <a:lumOff val="0"/>
+            <a:alphaOff val="0"/>
+          </a:schemeClr>
+        </a:solidFill>
+        <a:ln w="25400" cap="flat" cmpd="sng" algn="ctr">
+          <a:solidFill>
+            <a:schemeClr val="accent1">
+              <a:hueOff val="0"/>
+              <a:satOff val="0"/>
+              <a:lumOff val="0"/>
+              <a:alphaOff val="0"/>
+            </a:schemeClr>
+          </a:solidFill>
+          <a:prstDash val="solid"/>
+        </a:ln>
+        <a:effectLst/>
+      </dsp:spPr>
+      <dsp:style>
+        <a:lnRef idx="2">
+          <a:scrgbClr r="0" g="0" b="0"/>
+        </a:lnRef>
+        <a:fillRef idx="1">
+          <a:scrgbClr r="0" g="0" b="0"/>
+        </a:fillRef>
+        <a:effectRef idx="0">
+          <a:scrgbClr r="0" g="0" b="0"/>
+        </a:effectRef>
+        <a:fontRef idx="minor">
+          <a:schemeClr val="lt1"/>
+        </a:fontRef>
+      </dsp:style>
+    </dsp:sp>
+    <dsp:sp modelId="{6A717171-A44D-4353-9F36-4B4321A28F32}">
+      <dsp:nvSpPr>
+        <dsp:cNvPr id="0" name=""/>
+        <dsp:cNvSpPr/>
+      </dsp:nvSpPr>
+      <dsp:spPr>
+        <a:xfrm>
+          <a:off x="0" y="267643"/>
+          <a:ext cx="1354183" cy="267415"/>
+        </a:xfrm>
+        <a:prstGeom prst="rect">
+          <a:avLst/>
+        </a:prstGeom>
+        <a:noFill/>
+        <a:ln>
+          <a:noFill/>
+        </a:ln>
+        <a:effectLst/>
+      </dsp:spPr>
+      <dsp:style>
+        <a:lnRef idx="0">
+          <a:scrgbClr r="0" g="0" b="0"/>
+        </a:lnRef>
+        <a:fillRef idx="0">
+          <a:scrgbClr r="0" g="0" b="0"/>
+        </a:fillRef>
+        <a:effectRef idx="0">
+          <a:scrgbClr r="0" g="0" b="0"/>
+        </a:effectRef>
+        <a:fontRef idx="minor"/>
+      </dsp:style>
+      <dsp:txBody>
+        <a:bodyPr spcFirstLastPara="0" vert="horz" wrap="square" lIns="45720" tIns="45720" rIns="45720" bIns="45720" numCol="1" spcCol="1270" anchor="t" anchorCtr="0">
+          <a:noAutofit/>
+        </a:bodyPr>
+        <a:lstStyle/>
+        <a:p>
+          <a:pPr lvl="0" algn="l" defTabSz="533400">
+            <a:lnSpc>
+              <a:spcPct val="90000"/>
+            </a:lnSpc>
+            <a:spcBef>
+              <a:spcPct val="0"/>
+            </a:spcBef>
+            <a:spcAft>
+              <a:spcPct val="35000"/>
+            </a:spcAft>
+          </a:pPr>
+          <a:r>
+            <a:rPr lang="en-GB" sz="1200" kern="1200" dirty="0" smtClean="0"/>
+            <a:t>Molecule 192</a:t>
+          </a:r>
+          <a:endParaRPr lang="nl-NL" sz="1200" kern="1200" dirty="0"/>
+        </a:p>
+      </dsp:txBody>
+      <dsp:txXfrm>
+        <a:off x="0" y="267643"/>
+        <a:ext cx="1354183" cy="267415"/>
+      </dsp:txXfrm>
+    </dsp:sp>
+    <dsp:sp modelId="{7762E45A-D92B-4217-AAEB-09D39F4615D0}">
+      <dsp:nvSpPr>
+        <dsp:cNvPr id="0" name=""/>
+        <dsp:cNvSpPr/>
+      </dsp:nvSpPr>
+      <dsp:spPr>
+        <a:xfrm>
+          <a:off x="0" y="535059"/>
+          <a:ext cx="1354183" cy="0"/>
+        </a:xfrm>
+        <a:prstGeom prst="line">
+          <a:avLst/>
+        </a:prstGeom>
+        <a:solidFill>
+          <a:schemeClr val="accent1">
+            <a:hueOff val="0"/>
+            <a:satOff val="0"/>
+            <a:lumOff val="0"/>
+            <a:alphaOff val="0"/>
+          </a:schemeClr>
+        </a:solidFill>
+        <a:ln w="25400" cap="flat" cmpd="sng" algn="ctr">
+          <a:solidFill>
+            <a:schemeClr val="accent1">
+              <a:hueOff val="0"/>
+              <a:satOff val="0"/>
+              <a:lumOff val="0"/>
+              <a:alphaOff val="0"/>
+            </a:schemeClr>
+          </a:solidFill>
+          <a:prstDash val="solid"/>
+        </a:ln>
+        <a:effectLst/>
+      </dsp:spPr>
+      <dsp:style>
+        <a:lnRef idx="2">
+          <a:scrgbClr r="0" g="0" b="0"/>
+        </a:lnRef>
+        <a:fillRef idx="1">
+          <a:scrgbClr r="0" g="0" b="0"/>
+        </a:fillRef>
+        <a:effectRef idx="0">
+          <a:scrgbClr r="0" g="0" b="0"/>
+        </a:effectRef>
+        <a:fontRef idx="minor">
+          <a:schemeClr val="lt1"/>
+        </a:fontRef>
+      </dsp:style>
+    </dsp:sp>
+    <dsp:sp modelId="{26EE5A52-A089-41C3-9ABB-B002C72BB09D}">
+      <dsp:nvSpPr>
+        <dsp:cNvPr id="0" name=""/>
+        <dsp:cNvSpPr/>
+      </dsp:nvSpPr>
+      <dsp:spPr>
+        <a:xfrm>
+          <a:off x="0" y="535059"/>
+          <a:ext cx="1354183" cy="267415"/>
+        </a:xfrm>
+        <a:prstGeom prst="rect">
+          <a:avLst/>
+        </a:prstGeom>
+        <a:noFill/>
+        <a:ln>
+          <a:noFill/>
+        </a:ln>
+        <a:effectLst/>
+      </dsp:spPr>
+      <dsp:style>
+        <a:lnRef idx="0">
+          <a:scrgbClr r="0" g="0" b="0"/>
+        </a:lnRef>
+        <a:fillRef idx="0">
+          <a:scrgbClr r="0" g="0" b="0"/>
+        </a:fillRef>
+        <a:effectRef idx="0">
+          <a:scrgbClr r="0" g="0" b="0"/>
+        </a:effectRef>
+        <a:fontRef idx="minor"/>
+      </dsp:style>
+      <dsp:txBody>
+        <a:bodyPr spcFirstLastPara="0" vert="horz" wrap="square" lIns="45720" tIns="45720" rIns="45720" bIns="45720" numCol="1" spcCol="1270" anchor="t" anchorCtr="0">
+          <a:noAutofit/>
+        </a:bodyPr>
+        <a:lstStyle/>
+        <a:p>
+          <a:pPr lvl="0" algn="l" defTabSz="533400">
+            <a:lnSpc>
+              <a:spcPct val="90000"/>
+            </a:lnSpc>
+            <a:spcBef>
+              <a:spcPct val="0"/>
+            </a:spcBef>
+            <a:spcAft>
+              <a:spcPct val="35000"/>
+            </a:spcAft>
+          </a:pPr>
+          <a:r>
+            <a:rPr lang="en-GB" sz="1200" kern="1200" dirty="0" smtClean="0"/>
+            <a:t>Molecule 230</a:t>
+          </a:r>
+        </a:p>
+      </dsp:txBody>
+      <dsp:txXfrm>
+        <a:off x="0" y="535059"/>
+        <a:ext cx="1354183" cy="267415"/>
+      </dsp:txXfrm>
+    </dsp:sp>
+    <dsp:sp modelId="{96D669F9-91F0-438D-8BF6-1FF0D9BC90DC}">
+      <dsp:nvSpPr>
+        <dsp:cNvPr id="0" name=""/>
+        <dsp:cNvSpPr/>
+      </dsp:nvSpPr>
+      <dsp:spPr>
+        <a:xfrm>
+          <a:off x="0" y="802474"/>
+          <a:ext cx="1354183" cy="0"/>
+        </a:xfrm>
+        <a:prstGeom prst="line">
+          <a:avLst/>
+        </a:prstGeom>
+        <a:solidFill>
+          <a:schemeClr val="accent1">
+            <a:hueOff val="0"/>
+            <a:satOff val="0"/>
+            <a:lumOff val="0"/>
+            <a:alphaOff val="0"/>
+          </a:schemeClr>
+        </a:solidFill>
+        <a:ln w="25400" cap="flat" cmpd="sng" algn="ctr">
+          <a:solidFill>
+            <a:schemeClr val="accent1">
+              <a:hueOff val="0"/>
+              <a:satOff val="0"/>
+              <a:lumOff val="0"/>
+              <a:alphaOff val="0"/>
+            </a:schemeClr>
+          </a:solidFill>
+          <a:prstDash val="solid"/>
+        </a:ln>
+        <a:effectLst/>
+      </dsp:spPr>
+      <dsp:style>
+        <a:lnRef idx="2">
+          <a:scrgbClr r="0" g="0" b="0"/>
+        </a:lnRef>
+        <a:fillRef idx="1">
+          <a:scrgbClr r="0" g="0" b="0"/>
+        </a:fillRef>
+        <a:effectRef idx="0">
+          <a:scrgbClr r="0" g="0" b="0"/>
+        </a:effectRef>
+        <a:fontRef idx="minor">
+          <a:schemeClr val="lt1"/>
+        </a:fontRef>
+      </dsp:style>
+    </dsp:sp>
+    <dsp:sp modelId="{2EED3635-6D7F-45AE-A400-312687E452CB}">
+      <dsp:nvSpPr>
+        <dsp:cNvPr id="0" name=""/>
+        <dsp:cNvSpPr/>
+      </dsp:nvSpPr>
+      <dsp:spPr>
+        <a:xfrm>
+          <a:off x="0" y="802474"/>
+          <a:ext cx="1354183" cy="267415"/>
+        </a:xfrm>
+        <a:prstGeom prst="rect">
+          <a:avLst/>
+        </a:prstGeom>
+        <a:noFill/>
+        <a:ln>
+          <a:noFill/>
+        </a:ln>
+        <a:effectLst/>
+      </dsp:spPr>
+      <dsp:style>
+        <a:lnRef idx="0">
+          <a:scrgbClr r="0" g="0" b="0"/>
+        </a:lnRef>
+        <a:fillRef idx="0">
+          <a:scrgbClr r="0" g="0" b="0"/>
+        </a:fillRef>
+        <a:effectRef idx="0">
+          <a:scrgbClr r="0" g="0" b="0"/>
+        </a:effectRef>
+        <a:fontRef idx="minor"/>
+      </dsp:style>
+      <dsp:txBody>
+        <a:bodyPr spcFirstLastPara="0" vert="horz" wrap="square" lIns="45720" tIns="45720" rIns="45720" bIns="45720" numCol="1" spcCol="1270" anchor="t" anchorCtr="0">
+          <a:noAutofit/>
+        </a:bodyPr>
+        <a:lstStyle/>
+        <a:p>
+          <a:pPr lvl="0" algn="l" defTabSz="533400">
+            <a:lnSpc>
+              <a:spcPct val="90000"/>
+            </a:lnSpc>
+            <a:spcBef>
+              <a:spcPct val="0"/>
+            </a:spcBef>
+            <a:spcAft>
+              <a:spcPct val="35000"/>
+            </a:spcAft>
+          </a:pPr>
+          <a:r>
+            <a:rPr lang="en-GB" sz="1200" kern="1200" dirty="0" smtClean="0"/>
+            <a:t>H</a:t>
+          </a:r>
+          <a:r>
+            <a:rPr lang="en-GB" sz="1200" kern="1200" baseline="-25000" dirty="0" smtClean="0"/>
+            <a:t>2</a:t>
+          </a:r>
+          <a:r>
+            <a:rPr lang="en-GB" sz="1200" kern="1200" dirty="0" smtClean="0"/>
+            <a:t>O</a:t>
+          </a:r>
+        </a:p>
+      </dsp:txBody>
+      <dsp:txXfrm>
+        <a:off x="0" y="802474"/>
+        <a:ext cx="1354183" cy="267415"/>
+      </dsp:txXfrm>
+    </dsp:sp>
+    <dsp:sp modelId="{993AF19B-F4C0-4CCB-B8FD-6845959B2219}">
+      <dsp:nvSpPr>
+        <dsp:cNvPr id="0" name=""/>
+        <dsp:cNvSpPr/>
+      </dsp:nvSpPr>
+      <dsp:spPr>
+        <a:xfrm>
+          <a:off x="0" y="1069890"/>
+          <a:ext cx="1354183" cy="0"/>
+        </a:xfrm>
+        <a:prstGeom prst="line">
+          <a:avLst/>
+        </a:prstGeom>
+        <a:solidFill>
+          <a:schemeClr val="accent1">
+            <a:hueOff val="0"/>
+            <a:satOff val="0"/>
+            <a:lumOff val="0"/>
+            <a:alphaOff val="0"/>
+          </a:schemeClr>
+        </a:solidFill>
+        <a:ln w="25400" cap="flat" cmpd="sng" algn="ctr">
+          <a:solidFill>
+            <a:schemeClr val="accent1">
+              <a:hueOff val="0"/>
+              <a:satOff val="0"/>
+              <a:lumOff val="0"/>
+              <a:alphaOff val="0"/>
+            </a:schemeClr>
+          </a:solidFill>
+          <a:prstDash val="solid"/>
+        </a:ln>
+        <a:effectLst/>
+      </dsp:spPr>
+      <dsp:style>
+        <a:lnRef idx="2">
+          <a:scrgbClr r="0" g="0" b="0"/>
+        </a:lnRef>
+        <a:fillRef idx="1">
+          <a:scrgbClr r="0" g="0" b="0"/>
+        </a:fillRef>
+        <a:effectRef idx="0">
+          <a:scrgbClr r="0" g="0" b="0"/>
+        </a:effectRef>
+        <a:fontRef idx="minor">
+          <a:schemeClr val="lt1"/>
+        </a:fontRef>
+      </dsp:style>
+    </dsp:sp>
+    <dsp:sp modelId="{4835CB2F-D4E1-4DB7-8518-6B7E8BCAEE24}">
+      <dsp:nvSpPr>
+        <dsp:cNvPr id="0" name=""/>
+        <dsp:cNvSpPr/>
+      </dsp:nvSpPr>
+      <dsp:spPr>
+        <a:xfrm>
+          <a:off x="0" y="1069890"/>
+          <a:ext cx="1354183" cy="267415"/>
+        </a:xfrm>
+        <a:prstGeom prst="rect">
+          <a:avLst/>
+        </a:prstGeom>
+        <a:noFill/>
+        <a:ln>
+          <a:noFill/>
+        </a:ln>
+        <a:effectLst/>
+      </dsp:spPr>
+      <dsp:style>
+        <a:lnRef idx="0">
+          <a:scrgbClr r="0" g="0" b="0"/>
+        </a:lnRef>
+        <a:fillRef idx="0">
+          <a:scrgbClr r="0" g="0" b="0"/>
+        </a:fillRef>
+        <a:effectRef idx="0">
+          <a:scrgbClr r="0" g="0" b="0"/>
+        </a:effectRef>
+        <a:fontRef idx="minor"/>
+      </dsp:style>
+      <dsp:txBody>
+        <a:bodyPr spcFirstLastPara="0" vert="horz" wrap="square" lIns="45720" tIns="45720" rIns="45720" bIns="45720" numCol="1" spcCol="1270" anchor="t" anchorCtr="0">
+          <a:noAutofit/>
+        </a:bodyPr>
+        <a:lstStyle/>
+        <a:p>
+          <a:pPr lvl="0" algn="l" defTabSz="533400">
+            <a:lnSpc>
+              <a:spcPct val="90000"/>
+            </a:lnSpc>
+            <a:spcBef>
+              <a:spcPct val="0"/>
+            </a:spcBef>
+            <a:spcAft>
+              <a:spcPct val="35000"/>
+            </a:spcAft>
+          </a:pPr>
+          <a:r>
+            <a:rPr lang="en-GB" sz="1200" kern="1200" dirty="0" smtClean="0"/>
+            <a:t>CO</a:t>
+          </a:r>
+          <a:r>
+            <a:rPr lang="en-GB" sz="1200" kern="1200" baseline="-25000" dirty="0" smtClean="0"/>
+            <a:t>2</a:t>
+          </a:r>
+        </a:p>
+      </dsp:txBody>
+      <dsp:txXfrm>
+        <a:off x="0" y="1069890"/>
+        <a:ext cx="1354183" cy="267415"/>
+      </dsp:txXfrm>
+    </dsp:sp>
+    <dsp:sp modelId="{F95E51AA-825F-49B7-A2EE-D5A68FF57A5A}">
+      <dsp:nvSpPr>
+        <dsp:cNvPr id="0" name=""/>
+        <dsp:cNvSpPr/>
+      </dsp:nvSpPr>
+      <dsp:spPr>
+        <a:xfrm>
+          <a:off x="0" y="1337305"/>
+          <a:ext cx="1354183" cy="0"/>
+        </a:xfrm>
+        <a:prstGeom prst="line">
+          <a:avLst/>
+        </a:prstGeom>
+        <a:solidFill>
+          <a:schemeClr val="accent1">
+            <a:hueOff val="0"/>
+            <a:satOff val="0"/>
+            <a:lumOff val="0"/>
+            <a:alphaOff val="0"/>
+          </a:schemeClr>
+        </a:solidFill>
+        <a:ln w="25400" cap="flat" cmpd="sng" algn="ctr">
+          <a:solidFill>
+            <a:schemeClr val="accent1">
+              <a:hueOff val="0"/>
+              <a:satOff val="0"/>
+              <a:lumOff val="0"/>
+              <a:alphaOff val="0"/>
+            </a:schemeClr>
+          </a:solidFill>
+          <a:prstDash val="solid"/>
+        </a:ln>
+        <a:effectLst/>
+      </dsp:spPr>
+      <dsp:style>
+        <a:lnRef idx="2">
+          <a:scrgbClr r="0" g="0" b="0"/>
+        </a:lnRef>
+        <a:fillRef idx="1">
+          <a:scrgbClr r="0" g="0" b="0"/>
+        </a:fillRef>
+        <a:effectRef idx="0">
+          <a:scrgbClr r="0" g="0" b="0"/>
+        </a:effectRef>
+        <a:fontRef idx="minor">
+          <a:schemeClr val="lt1"/>
+        </a:fontRef>
+      </dsp:style>
+    </dsp:sp>
+    <dsp:sp modelId="{10281058-9C13-4E40-8138-DEE1B55F1E71}">
+      <dsp:nvSpPr>
+        <dsp:cNvPr id="0" name=""/>
+        <dsp:cNvSpPr/>
+      </dsp:nvSpPr>
+      <dsp:spPr>
+        <a:xfrm>
+          <a:off x="0" y="1337305"/>
+          <a:ext cx="1354183" cy="267415"/>
+        </a:xfrm>
+        <a:prstGeom prst="rect">
+          <a:avLst/>
+        </a:prstGeom>
+        <a:noFill/>
+        <a:ln>
+          <a:noFill/>
+        </a:ln>
+        <a:effectLst/>
+      </dsp:spPr>
+      <dsp:style>
+        <a:lnRef idx="0">
+          <a:scrgbClr r="0" g="0" b="0"/>
+        </a:lnRef>
+        <a:fillRef idx="0">
+          <a:scrgbClr r="0" g="0" b="0"/>
+        </a:fillRef>
+        <a:effectRef idx="0">
+          <a:scrgbClr r="0" g="0" b="0"/>
+        </a:effectRef>
+        <a:fontRef idx="minor"/>
+      </dsp:style>
+      <dsp:txBody>
+        <a:bodyPr spcFirstLastPara="0" vert="horz" wrap="square" lIns="45720" tIns="45720" rIns="45720" bIns="45720" numCol="1" spcCol="1270" anchor="t" anchorCtr="0">
+          <a:noAutofit/>
+        </a:bodyPr>
+        <a:lstStyle/>
+        <a:p>
+          <a:pPr lvl="0" algn="l" defTabSz="533400">
+            <a:lnSpc>
+              <a:spcPct val="90000"/>
+            </a:lnSpc>
+            <a:spcBef>
+              <a:spcPct val="0"/>
+            </a:spcBef>
+            <a:spcAft>
+              <a:spcPct val="35000"/>
+            </a:spcAft>
+          </a:pPr>
+          <a:r>
+            <a:rPr lang="en-GB" sz="1200" kern="1200" baseline="-25000" dirty="0" smtClean="0"/>
+            <a:t>…</a:t>
+          </a:r>
+        </a:p>
+      </dsp:txBody>
+      <dsp:txXfrm>
+        <a:off x="0" y="1337305"/>
+        <a:ext cx="1354183" cy="267415"/>
+      </dsp:txXfrm>
+    </dsp:sp>
+    <dsp:sp modelId="{0A629F62-9828-42EE-80FE-80D77846B07B}">
+      <dsp:nvSpPr>
+        <dsp:cNvPr id="0" name=""/>
+        <dsp:cNvSpPr/>
+      </dsp:nvSpPr>
+      <dsp:spPr>
+        <a:xfrm>
+          <a:off x="0" y="1604721"/>
+          <a:ext cx="1354183" cy="0"/>
+        </a:xfrm>
+        <a:prstGeom prst="line">
+          <a:avLst/>
+        </a:prstGeom>
+        <a:solidFill>
+          <a:schemeClr val="accent1">
+            <a:hueOff val="0"/>
+            <a:satOff val="0"/>
+            <a:lumOff val="0"/>
+            <a:alphaOff val="0"/>
+          </a:schemeClr>
+        </a:solidFill>
+        <a:ln w="25400" cap="flat" cmpd="sng" algn="ctr">
+          <a:solidFill>
+            <a:schemeClr val="accent1">
+              <a:hueOff val="0"/>
+              <a:satOff val="0"/>
+              <a:lumOff val="0"/>
+              <a:alphaOff val="0"/>
+            </a:schemeClr>
+          </a:solidFill>
+          <a:prstDash val="solid"/>
+        </a:ln>
+        <a:effectLst/>
+      </dsp:spPr>
+      <dsp:style>
+        <a:lnRef idx="2">
+          <a:scrgbClr r="0" g="0" b="0"/>
+        </a:lnRef>
+        <a:fillRef idx="1">
+          <a:scrgbClr r="0" g="0" b="0"/>
+        </a:fillRef>
+        <a:effectRef idx="0">
+          <a:scrgbClr r="0" g="0" b="0"/>
+        </a:effectRef>
+        <a:fontRef idx="minor">
+          <a:schemeClr val="lt1"/>
+        </a:fontRef>
+      </dsp:style>
+    </dsp:sp>
+    <dsp:sp modelId="{642D9065-24BD-490E-ACB9-43EA48A5275E}">
+      <dsp:nvSpPr>
+        <dsp:cNvPr id="0" name=""/>
+        <dsp:cNvSpPr/>
+      </dsp:nvSpPr>
+      <dsp:spPr>
+        <a:xfrm>
+          <a:off x="0" y="1604721"/>
+          <a:ext cx="1354183" cy="267415"/>
+        </a:xfrm>
+        <a:prstGeom prst="rect">
+          <a:avLst/>
+        </a:prstGeom>
+        <a:noFill/>
+        <a:ln>
+          <a:noFill/>
+        </a:ln>
+        <a:effectLst/>
+      </dsp:spPr>
+      <dsp:style>
+        <a:lnRef idx="0">
+          <a:scrgbClr r="0" g="0" b="0"/>
+        </a:lnRef>
+        <a:fillRef idx="0">
+          <a:scrgbClr r="0" g="0" b="0"/>
+        </a:fillRef>
+        <a:effectRef idx="0">
+          <a:scrgbClr r="0" g="0" b="0"/>
+        </a:effectRef>
+        <a:fontRef idx="minor"/>
+      </dsp:style>
+      <dsp:txBody>
+        <a:bodyPr spcFirstLastPara="0" vert="horz" wrap="square" lIns="45720" tIns="45720" rIns="45720" bIns="45720" numCol="1" spcCol="1270" anchor="t" anchorCtr="0">
+          <a:noAutofit/>
+        </a:bodyPr>
+        <a:lstStyle/>
+        <a:p>
+          <a:pPr lvl="0" algn="l" defTabSz="533400">
+            <a:lnSpc>
+              <a:spcPct val="90000"/>
+            </a:lnSpc>
+            <a:spcBef>
+              <a:spcPct val="0"/>
+            </a:spcBef>
+            <a:spcAft>
+              <a:spcPct val="35000"/>
+            </a:spcAft>
+          </a:pPr>
+          <a:r>
+            <a:rPr lang="en-GB" sz="1200" kern="1200" dirty="0" smtClean="0"/>
+            <a:t>Ethanol</a:t>
+          </a:r>
+        </a:p>
+      </dsp:txBody>
+      <dsp:txXfrm>
+        <a:off x="0" y="1604721"/>
+        <a:ext cx="1354183" cy="267415"/>
+      </dsp:txXfrm>
+    </dsp:sp>
   </dsp:spTree>
 </dsp:drawing>
 </file>
@@ -13847,7 +14616,7 @@
           <a:p>
             <a:fld id="{65607776-32A9-4E15-B814-B319972CFFFE}" type="datetimeFigureOut">
               <a:rPr lang="nl-NL" smtClean="0"/>
-              <a:t>4-11-2014</a:t>
+              <a:t>7-1-2015</a:t>
             </a:fld>
             <a:endParaRPr lang="nl-NL"/>
           </a:p>
@@ -14393,7 +15162,19 @@
           <a:p>
             <a:r>
               <a:rPr lang="en-GB" dirty="0" smtClean="0"/>
-              <a:t>Nonlinear least-squares regression</a:t>
+              <a:t>Nonlinear least-squares </a:t>
+            </a:r>
+            <a:r>
+              <a:rPr lang="en-GB" dirty="0" smtClean="0"/>
+              <a:t>regression</a:t>
+            </a:r>
+            <a:r>
+              <a:rPr lang="en-GB" smtClean="0"/>
+              <a:t>.</a:t>
+            </a:r>
+            <a:r>
+              <a:rPr lang="en-GB" baseline="0" smtClean="0"/>
+              <a:t> </a:t>
             </a:r>
             <a:endParaRPr lang="nl-NL" dirty="0"/>
           </a:p>
@@ -14586,19 +15367,7 @@
             </a:r>
             <a:r>
               <a:rPr lang="en-GB" baseline="0" dirty="0" smtClean="0"/>
-              <a:t> is also filtered </a:t>
-            </a:r>
-            <a:r>
-              <a:rPr lang="en-GB" baseline="0" dirty="0" smtClean="0"/>
-              <a:t>when </a:t>
-            </a:r>
-            <a:r>
-              <a:rPr lang="en-GB" baseline="0" dirty="0" smtClean="0"/>
-              <a:t>going into the cavity, which could explain the lower than expected measured H2O</a:t>
-            </a:r>
-            <a:r>
-              <a:rPr lang="en-GB" baseline="0" dirty="0" smtClean="0"/>
-              <a:t>. The breathing masks of the children are cleaned using ethanol, which is a possible explanation for abnormally </a:t>
+              <a:t> is also filtered when going into the cavity, which could explain the lower than expected measured H2O. The breathing masks of the children are cleaned using ethanol, which is a possible explanation for abnormally </a:t>
             </a:r>
             <a:r>
               <a:rPr lang="en-GB" baseline="0" smtClean="0"/>
@@ -15633,7 +16402,7 @@
           <a:p>
             <a:fld id="{4088EF54-C641-44F0-83F7-2E2A8BF04AC9}" type="datetimeFigureOut">
               <a:rPr lang="nl-NL" smtClean="0"/>
-              <a:t>4-11-2014</a:t>
+              <a:t>7-1-2015</a:t>
             </a:fld>
             <a:endParaRPr lang="nl-NL"/>
           </a:p>
@@ -16266,7 +17035,7 @@
           <a:p>
             <a:fld id="{4088EF54-C641-44F0-83F7-2E2A8BF04AC9}" type="datetimeFigureOut">
               <a:rPr lang="nl-NL" smtClean="0"/>
-              <a:t>4-11-2014</a:t>
+              <a:t>7-1-2015</a:t>
             </a:fld>
             <a:endParaRPr lang="nl-NL"/>
           </a:p>
@@ -16543,7 +17312,7 @@
           <a:p>
             <a:fld id="{4088EF54-C641-44F0-83F7-2E2A8BF04AC9}" type="datetimeFigureOut">
               <a:rPr lang="nl-NL" smtClean="0"/>
-              <a:t>4-11-2014</a:t>
+              <a:t>7-1-2015</a:t>
             </a:fld>
             <a:endParaRPr lang="nl-NL"/>
           </a:p>
@@ -16708,7 +17477,7 @@
           <a:p>
             <a:fld id="{4088EF54-C641-44F0-83F7-2E2A8BF04AC9}" type="datetimeFigureOut">
               <a:rPr lang="nl-NL" smtClean="0"/>
-              <a:t>4-11-2014</a:t>
+              <a:t>7-1-2015</a:t>
             </a:fld>
             <a:endParaRPr lang="nl-NL"/>
           </a:p>
@@ -16889,7 +17658,7 @@
           <a:p>
             <a:fld id="{4088EF54-C641-44F0-83F7-2E2A8BF04AC9}" type="datetimeFigureOut">
               <a:rPr lang="nl-NL" smtClean="0"/>
-              <a:t>4-11-2014</a:t>
+              <a:t>7-1-2015</a:t>
             </a:fld>
             <a:endParaRPr lang="nl-NL"/>
           </a:p>
@@ -17534,7 +18303,7 @@
           <a:p>
             <a:fld id="{4088EF54-C641-44F0-83F7-2E2A8BF04AC9}" type="datetimeFigureOut">
               <a:rPr lang="nl-NL" smtClean="0"/>
-              <a:t>4-11-2014</a:t>
+              <a:t>7-1-2015</a:t>
             </a:fld>
             <a:endParaRPr lang="nl-NL"/>
           </a:p>
@@ -17960,7 +18729,7 @@
           <a:p>
             <a:fld id="{4088EF54-C641-44F0-83F7-2E2A8BF04AC9}" type="datetimeFigureOut">
               <a:rPr lang="nl-NL" smtClean="0"/>
-              <a:t>4-11-2014</a:t>
+              <a:t>7-1-2015</a:t>
             </a:fld>
             <a:endParaRPr lang="nl-NL"/>
           </a:p>
@@ -18073,7 +18842,7 @@
           <a:p>
             <a:fld id="{4088EF54-C641-44F0-83F7-2E2A8BF04AC9}" type="datetimeFigureOut">
               <a:rPr lang="nl-NL" smtClean="0"/>
-              <a:t>4-11-2014</a:t>
+              <a:t>7-1-2015</a:t>
             </a:fld>
             <a:endParaRPr lang="nl-NL"/>
           </a:p>
@@ -18254,7 +19023,7 @@
           <a:p>
             <a:fld id="{4088EF54-C641-44F0-83F7-2E2A8BF04AC9}" type="datetimeFigureOut">
               <a:rPr lang="nl-NL" smtClean="0"/>
-              <a:t>4-11-2014</a:t>
+              <a:t>7-1-2015</a:t>
             </a:fld>
             <a:endParaRPr lang="nl-NL"/>
           </a:p>
@@ -18520,7 +19289,7 @@
           <a:p>
             <a:fld id="{4088EF54-C641-44F0-83F7-2E2A8BF04AC9}" type="datetimeFigureOut">
               <a:rPr lang="nl-NL" smtClean="0"/>
-              <a:t>4-11-2014</a:t>
+              <a:t>7-1-2015</a:t>
             </a:fld>
             <a:endParaRPr lang="nl-NL"/>
           </a:p>
@@ -18990,7 +19759,7 @@
           <a:p>
             <a:fld id="{4088EF54-C641-44F0-83F7-2E2A8BF04AC9}" type="datetimeFigureOut">
               <a:rPr lang="nl-NL" smtClean="0"/>
-              <a:t>4-11-2014</a:t>
+              <a:t>7-1-2015</a:t>
             </a:fld>
             <a:endParaRPr lang="nl-NL"/>
           </a:p>
@@ -19550,7 +20319,7 @@
           <a:p>
             <a:fld id="{4088EF54-C641-44F0-83F7-2E2A8BF04AC9}" type="datetimeFigureOut">
               <a:rPr lang="nl-NL" smtClean="0"/>
-              <a:t>4-11-2014</a:t>
+              <a:t>7-1-2015</a:t>
             </a:fld>
             <a:endParaRPr lang="nl-NL"/>
           </a:p>
@@ -23909,8 +24678,8 @@
           </a:p>
         </p:txBody>
       </p:sp>
-      <mc:AlternateContent xmlns:mc="http://schemas.openxmlformats.org/markup-compatibility/2006" xmlns:a14="http://schemas.microsoft.com/office/drawing/2010/main">
-        <mc:Choice Requires="a14">
+      <mc:AlternateContent xmlns:mc="http://schemas.openxmlformats.org/markup-compatibility/2006">
+        <mc:Choice xmlns:a14="http://schemas.microsoft.com/office/drawing/2010/main" Requires="a14">
           <p:sp>
             <p:nvSpPr>
               <p:cNvPr id="18" name="TextBox 17"/>
@@ -23919,8 +24688,8 @@
             </p:nvSpPr>
             <p:spPr>
               <a:xfrm>
-                <a:off x="2267744" y="2492896"/>
-                <a:ext cx="6336704" cy="1153906"/>
+                <a:off x="1992683" y="2478323"/>
+                <a:ext cx="7367654" cy="1153906"/>
               </a:xfrm>
               <a:prstGeom prst="rect">
                 <a:avLst/>
@@ -24143,101 +24912,137 @@
                         <m:t>=</m:t>
                       </m:r>
                       <m:r>
-                        <a:rPr lang="en-GB" b="0" i="1" dirty="0" smtClean="0">
-                          <a:latin typeface="Cambria Math"/>
+                        <a:rPr lang="en-US" b="0" i="1" dirty="0" smtClean="0">
+                          <a:latin typeface="Cambria Math" panose="02040503050406030204" pitchFamily="18" charset="0"/>
                         </a:rPr>
                         <m:t> </m:t>
                       </m:r>
-                      <m:nary>
-                        <m:naryPr>
-                          <m:chr m:val="∑"/>
+                      <m:sSub>
+                        <m:sSubPr>
                           <m:ctrlPr>
                             <a:rPr lang="en-GB" i="1">
                               <a:latin typeface="Cambria Math" panose="02040503050406030204" pitchFamily="18" charset="0"/>
                               <a:ea typeface="Cambria Math"/>
                             </a:rPr>
                           </m:ctrlPr>
-                        </m:naryPr>
+                        </m:sSubPr>
+                        <m:e>
+                          <m:r>
+                            <a:rPr lang="en-GB" i="1">
+                              <a:latin typeface="Cambria Math"/>
+                              <a:ea typeface="Cambria Math"/>
+                            </a:rPr>
+                            <m:t>𝑟</m:t>
+                          </m:r>
+                        </m:e>
                         <m:sub>
                           <m:r>
-                            <m:rPr>
-                              <m:brk m:alnAt="23"/>
-                            </m:rPr>
                             <a:rPr lang="en-GB" i="1">
                               <a:latin typeface="Cambria Math"/>
                               <a:ea typeface="Cambria Math"/>
                             </a:rPr>
                             <m:t>𝑖</m:t>
                           </m:r>
+                        </m:sub>
+                      </m:sSub>
+                      <m:r>
+                        <a:rPr lang="en-US" b="0" i="1" smtClean="0">
+                          <a:latin typeface="Cambria Math" panose="02040503050406030204" pitchFamily="18" charset="0"/>
+                          <a:ea typeface="Cambria Math"/>
+                        </a:rPr>
+                        <m:t>(</m:t>
+                      </m:r>
+                      <m:r>
+                        <a:rPr lang="en-US" b="0" i="1" smtClean="0">
+                          <a:latin typeface="Cambria Math" panose="02040503050406030204" pitchFamily="18" charset="0"/>
+                          <a:ea typeface="Cambria Math" panose="02040503050406030204" pitchFamily="18" charset="0"/>
+                        </a:rPr>
+                        <m:t>𝜐</m:t>
+                      </m:r>
+                      <m:r>
+                        <a:rPr lang="en-US" b="0" i="1" smtClean="0">
+                          <a:latin typeface="Cambria Math" panose="02040503050406030204" pitchFamily="18" charset="0"/>
+                          <a:ea typeface="Cambria Math" panose="02040503050406030204" pitchFamily="18" charset="0"/>
+                        </a:rPr>
+                        <m:t>,</m:t>
+                      </m:r>
+                      <m:sSub>
+                        <m:sSubPr>
+                          <m:ctrlPr>
+                            <a:rPr lang="en-US" b="0" i="1" smtClean="0">
+                              <a:latin typeface="Cambria Math" panose="02040503050406030204" pitchFamily="18" charset="0"/>
+                              <a:ea typeface="Cambria Math" panose="02040503050406030204" pitchFamily="18" charset="0"/>
+                            </a:rPr>
+                          </m:ctrlPr>
+                        </m:sSubPr>
+                        <m:e>
                           <m:r>
-                            <a:rPr lang="en-GB" i="1">
-                              <a:latin typeface="Cambria Math"/>
-                              <a:ea typeface="Cambria Math"/>
+                            <a:rPr lang="en-US" b="0" i="1" smtClean="0">
+                              <a:latin typeface="Cambria Math" panose="02040503050406030204" pitchFamily="18" charset="0"/>
+                              <a:ea typeface="Cambria Math" panose="02040503050406030204" pitchFamily="18" charset="0"/>
                             </a:rPr>
-                            <m:t> =</m:t>
+                            <m:t>𝑐</m:t>
+                          </m:r>
+                        </m:e>
+                        <m:sub>
+                          <m:r>
+                            <a:rPr lang="en-US" b="0" i="1" smtClean="0">
+                              <a:latin typeface="Cambria Math" panose="02040503050406030204" pitchFamily="18" charset="0"/>
+                              <a:ea typeface="Cambria Math" panose="02040503050406030204" pitchFamily="18" charset="0"/>
+                            </a:rPr>
+                            <m:t>𝑚𝑜𝑙𝑒𝑐𝑢𝑙𝑒</m:t>
                           </m:r>
                           <m:r>
-                            <a:rPr lang="en-GB" i="1">
-                              <a:latin typeface="Cambria Math"/>
-                              <a:ea typeface="Cambria Math"/>
+                            <a:rPr lang="en-US" b="0" i="1" smtClean="0">
+                              <a:latin typeface="Cambria Math" panose="02040503050406030204" pitchFamily="18" charset="0"/>
+                              <a:ea typeface="Cambria Math" panose="02040503050406030204" pitchFamily="18" charset="0"/>
                             </a:rPr>
-                            <m:t>𝑀𝑜𝑙𝑒𝑐𝑢𝑙𝑒</m:t>
-                          </m:r>
-                          <m:r>
-                            <a:rPr lang="en-GB" i="1">
-                              <a:latin typeface="Cambria Math"/>
-                              <a:ea typeface="Cambria Math"/>
-                            </a:rPr>
-                            <m:t> 32</m:t>
+                            <m:t>32</m:t>
                           </m:r>
                         </m:sub>
-                        <m:sup>
+                      </m:sSub>
+                      <m:r>
+                        <a:rPr lang="en-US" b="0" i="1" smtClean="0">
+                          <a:latin typeface="Cambria Math" panose="02040503050406030204" pitchFamily="18" charset="0"/>
+                          <a:ea typeface="Cambria Math" panose="02040503050406030204" pitchFamily="18" charset="0"/>
+                        </a:rPr>
+                        <m:t>,…,</m:t>
+                      </m:r>
+                      <m:sSub>
+                        <m:sSubPr>
+                          <m:ctrlPr>
+                            <a:rPr lang="en-US" i="1">
+                              <a:latin typeface="Cambria Math" panose="02040503050406030204" pitchFamily="18" charset="0"/>
+                              <a:ea typeface="Cambria Math" panose="02040503050406030204" pitchFamily="18" charset="0"/>
+                            </a:rPr>
+                          </m:ctrlPr>
+                        </m:sSubPr>
+                        <m:e>
                           <m:r>
-                            <a:rPr lang="en-GB" i="1">
-                              <a:latin typeface="Cambria Math"/>
-                              <a:ea typeface="Cambria Math"/>
+                            <a:rPr lang="en-US" i="1">
+                              <a:latin typeface="Cambria Math" panose="02040503050406030204" pitchFamily="18" charset="0"/>
+                              <a:ea typeface="Cambria Math" panose="02040503050406030204" pitchFamily="18" charset="0"/>
                             </a:rPr>
-                            <m:t>𝐸𝑡h𝑎𝑛𝑜𝑙</m:t>
-                          </m:r>
-                        </m:sup>
-                        <m:e>
-                          <m:sSub>
-                            <m:sSubPr>
-                              <m:ctrlPr>
-                                <a:rPr lang="en-GB" i="1">
-                                  <a:latin typeface="Cambria Math" panose="02040503050406030204" pitchFamily="18" charset="0"/>
-                                  <a:ea typeface="Cambria Math"/>
-                                </a:rPr>
-                              </m:ctrlPr>
-                            </m:sSubPr>
-                            <m:e>
-                              <m:r>
-                                <a:rPr lang="en-GB" i="1">
-                                  <a:latin typeface="Cambria Math"/>
-                                  <a:ea typeface="Cambria Math"/>
-                                </a:rPr>
-                                <m:t>𝑟</m:t>
-                              </m:r>
-                            </m:e>
-                            <m:sub>
-                              <m:r>
-                                <a:rPr lang="en-GB" i="1">
-                                  <a:latin typeface="Cambria Math"/>
-                                  <a:ea typeface="Cambria Math"/>
-                                </a:rPr>
-                                <m:t>𝑖</m:t>
-                              </m:r>
-                            </m:sub>
-                          </m:sSub>
-                          <m:r>
-                            <m:rPr>
-                              <m:nor/>
-                            </m:rPr>
-                            <a:rPr lang="nl-NL" dirty="0"/>
-                            <m:t> </m:t>
+                            <m:t>𝑐</m:t>
                           </m:r>
                         </m:e>
-                      </m:nary>
+                        <m:sub>
+                          <m:r>
+                            <a:rPr lang="en-US" b="0" i="1" smtClean="0">
+                              <a:latin typeface="Cambria Math" panose="02040503050406030204" pitchFamily="18" charset="0"/>
+                              <a:ea typeface="Cambria Math" panose="02040503050406030204" pitchFamily="18" charset="0"/>
+                            </a:rPr>
+                            <m:t>𝑒𝑡h𝑎𝑛𝑜𝑙</m:t>
+                          </m:r>
+                        </m:sub>
+                      </m:sSub>
+                      <m:r>
+                        <a:rPr lang="en-US" b="0" i="1" smtClean="0">
+                          <a:latin typeface="Cambria Math" panose="02040503050406030204" pitchFamily="18" charset="0"/>
+                          <a:ea typeface="Cambria Math" panose="02040503050406030204" pitchFamily="18" charset="0"/>
+                        </a:rPr>
+                        <m:t>)</m:t>
+                      </m:r>
                     </m:oMath>
                   </m:oMathPara>
                 </a14:m>
@@ -24249,7 +25054,7 @@
             </p:txBody>
           </p:sp>
         </mc:Choice>
-        <mc:Fallback xmlns="">
+        <mc:Fallback>
           <p:sp>
             <p:nvSpPr>
               <p:cNvPr id="18" name="TextBox 17"/>
@@ -24260,13 +25065,13 @@
             </p:nvSpPr>
             <p:spPr>
               <a:xfrm>
-                <a:off x="2267744" y="2492896"/>
-                <a:ext cx="6336704" cy="1153906"/>
+                <a:off x="1992683" y="2478323"/>
+                <a:ext cx="7367654" cy="1153906"/>
               </a:xfrm>
               <a:prstGeom prst="rect">
                 <a:avLst/>
               </a:prstGeom>
-              <a:blipFill rotWithShape="1">
+              <a:blipFill rotWithShape="0">
                 <a:blip r:embed="rId8"/>
                 <a:stretch>
                   <a:fillRect/>
@@ -24278,7 +25083,7 @@
               <a:lstStyle/>
               <a:p>
                 <a:r>
-                  <a:rPr lang="nl-NL">
+                  <a:rPr lang="en-US">
                     <a:noFill/>
                   </a:rPr>
                   <a:t> </a:t>
@@ -24288,8 +25093,8 @@
           </p:sp>
         </mc:Fallback>
       </mc:AlternateContent>
-      <mc:AlternateContent xmlns:mc="http://schemas.openxmlformats.org/markup-compatibility/2006" xmlns:a14="http://schemas.microsoft.com/office/drawing/2010/main">
-        <mc:Choice Requires="a14">
+      <mc:AlternateContent xmlns:mc="http://schemas.openxmlformats.org/markup-compatibility/2006">
+        <mc:Choice xmlns:a14="http://schemas.microsoft.com/office/drawing/2010/main" Requires="a14">
           <p:sp>
             <p:nvSpPr>
               <p:cNvPr id="5" name="Rectangle 4"/>
@@ -24298,8 +25103,8 @@
             </p:nvSpPr>
             <p:spPr>
               <a:xfrm>
-                <a:off x="4211960" y="3894657"/>
-                <a:ext cx="2929100" cy="876907"/>
+                <a:off x="1992683" y="5152410"/>
+                <a:ext cx="6935606" cy="875432"/>
               </a:xfrm>
               <a:prstGeom prst="rect">
                 <a:avLst/>
@@ -24326,6 +25131,90 @@
                         <m:t>𝑆</m:t>
                       </m:r>
                       <m:r>
+                        <a:rPr lang="en-US" b="0" i="1" smtClean="0">
+                          <a:latin typeface="Cambria Math" panose="02040503050406030204" pitchFamily="18" charset="0"/>
+                          <a:ea typeface="Cambria Math"/>
+                        </a:rPr>
+                        <m:t>(</m:t>
+                      </m:r>
+                      <m:sSub>
+                        <m:sSubPr>
+                          <m:ctrlPr>
+                            <a:rPr lang="en-US" i="1">
+                              <a:latin typeface="Cambria Math" panose="02040503050406030204" pitchFamily="18" charset="0"/>
+                              <a:ea typeface="Cambria Math" panose="02040503050406030204" pitchFamily="18" charset="0"/>
+                            </a:rPr>
+                          </m:ctrlPr>
+                        </m:sSubPr>
+                        <m:e>
+                          <m:r>
+                            <a:rPr lang="en-US" i="1">
+                              <a:latin typeface="Cambria Math" panose="02040503050406030204" pitchFamily="18" charset="0"/>
+                              <a:ea typeface="Cambria Math" panose="02040503050406030204" pitchFamily="18" charset="0"/>
+                            </a:rPr>
+                            <m:t>𝑐</m:t>
+                          </m:r>
+                        </m:e>
+                        <m:sub>
+                          <m:r>
+                            <a:rPr lang="en-US" i="1">
+                              <a:latin typeface="Cambria Math" panose="02040503050406030204" pitchFamily="18" charset="0"/>
+                              <a:ea typeface="Cambria Math" panose="02040503050406030204" pitchFamily="18" charset="0"/>
+                            </a:rPr>
+                            <m:t>𝑚𝑜𝑙𝑒𝑐𝑢𝑙𝑒</m:t>
+                          </m:r>
+                          <m:r>
+                            <a:rPr lang="en-US" i="1">
+                              <a:latin typeface="Cambria Math" panose="02040503050406030204" pitchFamily="18" charset="0"/>
+                              <a:ea typeface="Cambria Math" panose="02040503050406030204" pitchFamily="18" charset="0"/>
+                            </a:rPr>
+                            <m:t>32</m:t>
+                          </m:r>
+                        </m:sub>
+                      </m:sSub>
+                      <m:r>
+                        <a:rPr lang="en-US" i="1">
+                          <a:latin typeface="Cambria Math" panose="02040503050406030204" pitchFamily="18" charset="0"/>
+                          <a:ea typeface="Cambria Math" panose="02040503050406030204" pitchFamily="18" charset="0"/>
+                        </a:rPr>
+                        <m:t>,…,</m:t>
+                      </m:r>
+                      <m:sSub>
+                        <m:sSubPr>
+                          <m:ctrlPr>
+                            <a:rPr lang="en-US" i="1">
+                              <a:latin typeface="Cambria Math" panose="02040503050406030204" pitchFamily="18" charset="0"/>
+                              <a:ea typeface="Cambria Math" panose="02040503050406030204" pitchFamily="18" charset="0"/>
+                            </a:rPr>
+                          </m:ctrlPr>
+                        </m:sSubPr>
+                        <m:e>
+                          <m:r>
+                            <a:rPr lang="en-US" i="1">
+                              <a:latin typeface="Cambria Math" panose="02040503050406030204" pitchFamily="18" charset="0"/>
+                              <a:ea typeface="Cambria Math" panose="02040503050406030204" pitchFamily="18" charset="0"/>
+                            </a:rPr>
+                            <m:t>𝑐</m:t>
+                          </m:r>
+                        </m:e>
+                        <m:sub>
+                          <m:r>
+                            <a:rPr lang="en-US" i="1">
+                              <a:latin typeface="Cambria Math" panose="02040503050406030204" pitchFamily="18" charset="0"/>
+                              <a:ea typeface="Cambria Math" panose="02040503050406030204" pitchFamily="18" charset="0"/>
+                            </a:rPr>
+                            <m:t>𝑒𝑡h𝑎𝑛𝑜𝑙</m:t>
+                          </m:r>
+                        </m:sub>
+                      </m:sSub>
+                      <m:r>
+                        <a:rPr lang="en-US" b="0" i="1" smtClean="0">
+                          <a:latin typeface="Cambria Math" panose="02040503050406030204" pitchFamily="18" charset="0"/>
+                          <a:ea typeface="Cambria Math"/>
+                        </a:rPr>
+                        <m:t>)</m:t>
+                      </m:r>
+                      <m:r>
                         <a:rPr lang="en-GB" b="0" i="1" smtClean="0">
                           <a:latin typeface="Cambria Math"/>
                           <a:ea typeface="Cambria Math"/>
@@ -24335,6 +25224,7 @@
                       <m:nary>
                         <m:naryPr>
                           <m:chr m:val="∑"/>
+                          <m:subHide m:val="on"/>
                           <m:ctrlPr>
                             <a:rPr lang="en-GB" i="1" smtClean="0">
                               <a:latin typeface="Cambria Math" panose="02040503050406030204" pitchFamily="18" charset="0"/>
@@ -24342,46 +25232,14 @@
                             </a:rPr>
                           </m:ctrlPr>
                         </m:naryPr>
-                        <m:sub>
+                        <m:sub/>
+                        <m:sup>
                           <m:r>
-                            <m:rPr>
-                              <m:brk m:alnAt="23"/>
-                            </m:rPr>
-                            <a:rPr lang="en-GB" i="1">
-                              <a:latin typeface="Cambria Math"/>
+                            <a:rPr lang="en-US" b="0" i="1" smtClean="0">
+                              <a:latin typeface="Cambria Math" panose="02040503050406030204" pitchFamily="18" charset="0"/>
                               <a:ea typeface="Cambria Math"/>
                             </a:rPr>
-                            <m:t>𝑖</m:t>
-                          </m:r>
-                          <m:r>
-                            <a:rPr lang="en-GB" i="1">
-                              <a:latin typeface="Cambria Math"/>
-                              <a:ea typeface="Cambria Math"/>
-                            </a:rPr>
-                            <m:t> =</m:t>
-                          </m:r>
-                          <m:r>
-                            <a:rPr lang="en-GB" i="1">
-                              <a:latin typeface="Cambria Math"/>
-                              <a:ea typeface="Cambria Math"/>
-                            </a:rPr>
-                            <m:t>𝑀𝑜𝑙𝑒𝑐𝑢𝑙𝑒</m:t>
-                          </m:r>
-                          <m:r>
-                            <a:rPr lang="en-GB" i="1">
-                              <a:latin typeface="Cambria Math"/>
-                              <a:ea typeface="Cambria Math"/>
-                            </a:rPr>
-                            <m:t> 32</m:t>
-                          </m:r>
-                        </m:sub>
-                        <m:sup>
-                          <m:r>
-                            <a:rPr lang="en-GB" i="1">
-                              <a:latin typeface="Cambria Math"/>
-                              <a:ea typeface="Cambria Math"/>
-                            </a:rPr>
-                            <m:t>𝐸𝑡h𝑎𝑛𝑜𝑙</m:t>
+                            <m:t>𝑤𝑎𝑣𝑒𝑛𝑢𝑚𝑏𝑒𝑟</m:t>
                           </m:r>
                         </m:sup>
                         <m:e>
@@ -24423,6 +25281,104 @@
                                   </m:r>
                                 </m:sub>
                               </m:sSub>
+                              <m:r>
+                                <a:rPr lang="en-US" b="0" i="1" smtClean="0">
+                                  <a:latin typeface="Cambria Math" panose="02040503050406030204" pitchFamily="18" charset="0"/>
+                                  <a:ea typeface="Cambria Math"/>
+                                </a:rPr>
+                                <m:t>(</m:t>
+                              </m:r>
+                              <m:r>
+                                <a:rPr lang="en-US" i="1">
+                                  <a:latin typeface="Cambria Math" panose="02040503050406030204" pitchFamily="18" charset="0"/>
+                                  <a:ea typeface="Cambria Math" panose="02040503050406030204" pitchFamily="18" charset="0"/>
+                                </a:rPr>
+                                <m:t>𝜐</m:t>
+                              </m:r>
+                              <m:r>
+                                <a:rPr lang="en-US" i="1">
+                                  <a:latin typeface="Cambria Math" panose="02040503050406030204" pitchFamily="18" charset="0"/>
+                                  <a:ea typeface="Cambria Math" panose="02040503050406030204" pitchFamily="18" charset="0"/>
+                                </a:rPr>
+                                <m:t>,</m:t>
+                              </m:r>
+                              <m:sSub>
+                                <m:sSubPr>
+                                  <m:ctrlPr>
+                                    <a:rPr lang="en-US" i="1">
+                                      <a:latin typeface="Cambria Math" panose="02040503050406030204" pitchFamily="18" charset="0"/>
+                                      <a:ea typeface="Cambria Math" panose="02040503050406030204" pitchFamily="18" charset="0"/>
+                                    </a:rPr>
+                                  </m:ctrlPr>
+                                </m:sSubPr>
+                                <m:e>
+                                  <m:r>
+                                    <a:rPr lang="en-US" i="1">
+                                      <a:latin typeface="Cambria Math" panose="02040503050406030204" pitchFamily="18" charset="0"/>
+                                      <a:ea typeface="Cambria Math" panose="02040503050406030204" pitchFamily="18" charset="0"/>
+                                    </a:rPr>
+                                    <m:t>𝑐</m:t>
+                                  </m:r>
+                                </m:e>
+                                <m:sub>
+                                  <m:r>
+                                    <a:rPr lang="en-US" i="1">
+                                      <a:latin typeface="Cambria Math" panose="02040503050406030204" pitchFamily="18" charset="0"/>
+                                      <a:ea typeface="Cambria Math" panose="02040503050406030204" pitchFamily="18" charset="0"/>
+                                    </a:rPr>
+                                    <m:t>𝑚𝑜𝑙𝑒𝑐𝑢𝑙𝑒</m:t>
+                                  </m:r>
+                                  <m:r>
+                                    <a:rPr lang="en-US" i="1">
+                                      <a:latin typeface="Cambria Math" panose="02040503050406030204" pitchFamily="18" charset="0"/>
+                                      <a:ea typeface="Cambria Math" panose="02040503050406030204" pitchFamily="18" charset="0"/>
+                                    </a:rPr>
+                                    <m:t>32</m:t>
+                                  </m:r>
+                                </m:sub>
+                              </m:sSub>
+                              <m:r>
+                                <a:rPr lang="en-US" i="1">
+                                  <a:latin typeface="Cambria Math" panose="02040503050406030204" pitchFamily="18" charset="0"/>
+                                  <a:ea typeface="Cambria Math" panose="02040503050406030204" pitchFamily="18" charset="0"/>
+                                </a:rPr>
+                                <m:t>,…,</m:t>
+                              </m:r>
+                              <m:sSub>
+                                <m:sSubPr>
+                                  <m:ctrlPr>
+                                    <a:rPr lang="en-US" i="1">
+                                      <a:latin typeface="Cambria Math" panose="02040503050406030204" pitchFamily="18" charset="0"/>
+                                      <a:ea typeface="Cambria Math" panose="02040503050406030204" pitchFamily="18" charset="0"/>
+                                    </a:rPr>
+                                  </m:ctrlPr>
+                                </m:sSubPr>
+                                <m:e>
+                                  <m:r>
+                                    <a:rPr lang="en-US" i="1">
+                                      <a:latin typeface="Cambria Math" panose="02040503050406030204" pitchFamily="18" charset="0"/>
+                                      <a:ea typeface="Cambria Math" panose="02040503050406030204" pitchFamily="18" charset="0"/>
+                                    </a:rPr>
+                                    <m:t>𝑐</m:t>
+                                  </m:r>
+                                </m:e>
+                                <m:sub>
+                                  <m:r>
+                                    <a:rPr lang="en-US" i="1">
+                                      <a:latin typeface="Cambria Math" panose="02040503050406030204" pitchFamily="18" charset="0"/>
+                                      <a:ea typeface="Cambria Math" panose="02040503050406030204" pitchFamily="18" charset="0"/>
+                                    </a:rPr>
+                                    <m:t>𝑒𝑡h𝑎𝑛𝑜𝑙</m:t>
+                                  </m:r>
+                                </m:sub>
+                              </m:sSub>
+                              <m:r>
+                                <a:rPr lang="en-US" b="0" i="1" smtClean="0">
+                                  <a:latin typeface="Cambria Math" panose="02040503050406030204" pitchFamily="18" charset="0"/>
+                                  <a:ea typeface="Cambria Math"/>
+                                </a:rPr>
+                                <m:t>)</m:t>
+                              </m:r>
                             </m:e>
                             <m:sup>
                               <m:r>
@@ -24444,7 +25400,7 @@
             </p:txBody>
           </p:sp>
         </mc:Choice>
-        <mc:Fallback xmlns="">
+        <mc:Fallback>
           <p:sp>
             <p:nvSpPr>
               <p:cNvPr id="5" name="Rectangle 4"/>
@@ -24455,13 +25411,13 @@
             </p:nvSpPr>
             <p:spPr>
               <a:xfrm>
-                <a:off x="4211960" y="3894657"/>
-                <a:ext cx="2929100" cy="876907"/>
+                <a:off x="1992683" y="5152410"/>
+                <a:ext cx="6935606" cy="875432"/>
               </a:xfrm>
               <a:prstGeom prst="rect">
                 <a:avLst/>
               </a:prstGeom>
-              <a:blipFill rotWithShape="1">
+              <a:blipFill rotWithShape="0">
                 <a:blip r:embed="rId9"/>
                 <a:stretch>
                   <a:fillRect/>
@@ -24473,7 +25429,7 @@
               <a:lstStyle/>
               <a:p>
                 <a:r>
-                  <a:rPr lang="nl-NL">
+                  <a:rPr lang="en-US">
                     <a:noFill/>
                   </a:rPr>
                   <a:t> </a:t>
@@ -24493,7 +25449,7 @@
         </p:nvSpPr>
         <p:spPr>
           <a:xfrm>
-            <a:off x="2607535" y="4159418"/>
+            <a:off x="179512" y="5416434"/>
             <a:ext cx="1376170" cy="347383"/>
           </a:xfrm>
           <a:prstGeom prst="rect">

</xml_diff>

<commit_message>
Finished second draft of wavenumber calibration text. Next: add figures to it. Removed a useless letter C in comment at start of raw_data_to_absorbance.
</commit_message>
<xml_diff>
--- a/Cascading thesis/Presentation/Halfway presentation.pptx
+++ b/Cascading thesis/Presentation/Halfway presentation.pptx
@@ -521,11 +521,11 @@
           <c:showBubbleSize val="0"/>
         </c:dLbls>
         <c:gapWidth val="150"/>
-        <c:axId val="997800576"/>
-        <c:axId val="997801120"/>
+        <c:axId val="1371158288"/>
+        <c:axId val="1371166448"/>
       </c:barChart>
       <c:catAx>
-        <c:axId val="997800576"/>
+        <c:axId val="1371158288"/>
         <c:scaling>
           <c:orientation val="minMax"/>
         </c:scaling>
@@ -535,7 +535,7 @@
         <c:majorTickMark val="out"/>
         <c:minorTickMark val="none"/>
         <c:tickLblPos val="nextTo"/>
-        <c:crossAx val="997801120"/>
+        <c:crossAx val="1371166448"/>
         <c:crossesAt val="1.0000000000000002E-2"/>
         <c:auto val="1"/>
         <c:lblAlgn val="ctr"/>
@@ -543,7 +543,7 @@
         <c:noMultiLvlLbl val="0"/>
       </c:catAx>
       <c:valAx>
-        <c:axId val="997801120"/>
+        <c:axId val="1371166448"/>
         <c:scaling>
           <c:logBase val="10"/>
           <c:orientation val="minMax"/>
@@ -555,7 +555,7 @@
         <c:majorTickMark val="out"/>
         <c:minorTickMark val="none"/>
         <c:tickLblPos val="nextTo"/>
-        <c:crossAx val="997800576"/>
+        <c:crossAx val="1371158288"/>
         <c:crosses val="autoZero"/>
         <c:crossBetween val="between"/>
       </c:valAx>
@@ -6260,776 +6260,6 @@
       <dsp:cNvGrpSpPr/>
     </dsp:nvGrpSpPr>
     <dsp:grpSpPr/>
-    <dsp:sp modelId="{24488344-03B9-4938-8268-6A2816D722F0}">
-      <dsp:nvSpPr>
-        <dsp:cNvPr id="0" name=""/>
-        <dsp:cNvSpPr/>
-      </dsp:nvSpPr>
-      <dsp:spPr>
-        <a:xfrm>
-          <a:off x="0" y="228"/>
-          <a:ext cx="1354183" cy="0"/>
-        </a:xfrm>
-        <a:prstGeom prst="line">
-          <a:avLst/>
-        </a:prstGeom>
-        <a:solidFill>
-          <a:schemeClr val="accent1">
-            <a:hueOff val="0"/>
-            <a:satOff val="0"/>
-            <a:lumOff val="0"/>
-            <a:alphaOff val="0"/>
-          </a:schemeClr>
-        </a:solidFill>
-        <a:ln w="25400" cap="flat" cmpd="sng" algn="ctr">
-          <a:solidFill>
-            <a:schemeClr val="accent1">
-              <a:hueOff val="0"/>
-              <a:satOff val="0"/>
-              <a:lumOff val="0"/>
-              <a:alphaOff val="0"/>
-            </a:schemeClr>
-          </a:solidFill>
-          <a:prstDash val="solid"/>
-        </a:ln>
-        <a:effectLst/>
-      </dsp:spPr>
-      <dsp:style>
-        <a:lnRef idx="2">
-          <a:scrgbClr r="0" g="0" b="0"/>
-        </a:lnRef>
-        <a:fillRef idx="1">
-          <a:scrgbClr r="0" g="0" b="0"/>
-        </a:fillRef>
-        <a:effectRef idx="0">
-          <a:scrgbClr r="0" g="0" b="0"/>
-        </a:effectRef>
-        <a:fontRef idx="minor">
-          <a:schemeClr val="lt1"/>
-        </a:fontRef>
-      </dsp:style>
-    </dsp:sp>
-    <dsp:sp modelId="{D778619D-D5FF-46A3-8581-B8F8902A789A}">
-      <dsp:nvSpPr>
-        <dsp:cNvPr id="0" name=""/>
-        <dsp:cNvSpPr/>
-      </dsp:nvSpPr>
-      <dsp:spPr>
-        <a:xfrm>
-          <a:off x="0" y="228"/>
-          <a:ext cx="1354183" cy="267415"/>
-        </a:xfrm>
-        <a:prstGeom prst="rect">
-          <a:avLst/>
-        </a:prstGeom>
-        <a:noFill/>
-        <a:ln>
-          <a:noFill/>
-        </a:ln>
-        <a:effectLst/>
-      </dsp:spPr>
-      <dsp:style>
-        <a:lnRef idx="0">
-          <a:scrgbClr r="0" g="0" b="0"/>
-        </a:lnRef>
-        <a:fillRef idx="0">
-          <a:scrgbClr r="0" g="0" b="0"/>
-        </a:fillRef>
-        <a:effectRef idx="0">
-          <a:scrgbClr r="0" g="0" b="0"/>
-        </a:effectRef>
-        <a:fontRef idx="minor"/>
-      </dsp:style>
-      <dsp:txBody>
-        <a:bodyPr spcFirstLastPara="0" vert="horz" wrap="square" lIns="45720" tIns="45720" rIns="45720" bIns="45720" numCol="1" spcCol="1270" anchor="t" anchorCtr="0">
-          <a:noAutofit/>
-        </a:bodyPr>
-        <a:lstStyle/>
-        <a:p>
-          <a:pPr lvl="0" algn="l" defTabSz="533400">
-            <a:lnSpc>
-              <a:spcPct val="90000"/>
-            </a:lnSpc>
-            <a:spcBef>
-              <a:spcPct val="0"/>
-            </a:spcBef>
-            <a:spcAft>
-              <a:spcPct val="35000"/>
-            </a:spcAft>
-          </a:pPr>
-          <a:r>
-            <a:rPr lang="en-GB" sz="1200" kern="1200" dirty="0" smtClean="0"/>
-            <a:t>Molecule 32</a:t>
-          </a:r>
-          <a:endParaRPr lang="nl-NL" sz="1200" kern="1200" dirty="0"/>
-        </a:p>
-      </dsp:txBody>
-      <dsp:txXfrm>
-        <a:off x="0" y="228"/>
-        <a:ext cx="1354183" cy="267415"/>
-      </dsp:txXfrm>
-    </dsp:sp>
-    <dsp:sp modelId="{6073C3BF-591B-4F23-A6DC-EEA692BF150E}">
-      <dsp:nvSpPr>
-        <dsp:cNvPr id="0" name=""/>
-        <dsp:cNvSpPr/>
-      </dsp:nvSpPr>
-      <dsp:spPr>
-        <a:xfrm>
-          <a:off x="0" y="267643"/>
-          <a:ext cx="1354183" cy="0"/>
-        </a:xfrm>
-        <a:prstGeom prst="line">
-          <a:avLst/>
-        </a:prstGeom>
-        <a:solidFill>
-          <a:schemeClr val="accent1">
-            <a:hueOff val="0"/>
-            <a:satOff val="0"/>
-            <a:lumOff val="0"/>
-            <a:alphaOff val="0"/>
-          </a:schemeClr>
-        </a:solidFill>
-        <a:ln w="25400" cap="flat" cmpd="sng" algn="ctr">
-          <a:solidFill>
-            <a:schemeClr val="accent1">
-              <a:hueOff val="0"/>
-              <a:satOff val="0"/>
-              <a:lumOff val="0"/>
-              <a:alphaOff val="0"/>
-            </a:schemeClr>
-          </a:solidFill>
-          <a:prstDash val="solid"/>
-        </a:ln>
-        <a:effectLst/>
-      </dsp:spPr>
-      <dsp:style>
-        <a:lnRef idx="2">
-          <a:scrgbClr r="0" g="0" b="0"/>
-        </a:lnRef>
-        <a:fillRef idx="1">
-          <a:scrgbClr r="0" g="0" b="0"/>
-        </a:fillRef>
-        <a:effectRef idx="0">
-          <a:scrgbClr r="0" g="0" b="0"/>
-        </a:effectRef>
-        <a:fontRef idx="minor">
-          <a:schemeClr val="lt1"/>
-        </a:fontRef>
-      </dsp:style>
-    </dsp:sp>
-    <dsp:sp modelId="{6A717171-A44D-4353-9F36-4B4321A28F32}">
-      <dsp:nvSpPr>
-        <dsp:cNvPr id="0" name=""/>
-        <dsp:cNvSpPr/>
-      </dsp:nvSpPr>
-      <dsp:spPr>
-        <a:xfrm>
-          <a:off x="0" y="267643"/>
-          <a:ext cx="1354183" cy="267415"/>
-        </a:xfrm>
-        <a:prstGeom prst="rect">
-          <a:avLst/>
-        </a:prstGeom>
-        <a:noFill/>
-        <a:ln>
-          <a:noFill/>
-        </a:ln>
-        <a:effectLst/>
-      </dsp:spPr>
-      <dsp:style>
-        <a:lnRef idx="0">
-          <a:scrgbClr r="0" g="0" b="0"/>
-        </a:lnRef>
-        <a:fillRef idx="0">
-          <a:scrgbClr r="0" g="0" b="0"/>
-        </a:fillRef>
-        <a:effectRef idx="0">
-          <a:scrgbClr r="0" g="0" b="0"/>
-        </a:effectRef>
-        <a:fontRef idx="minor"/>
-      </dsp:style>
-      <dsp:txBody>
-        <a:bodyPr spcFirstLastPara="0" vert="horz" wrap="square" lIns="45720" tIns="45720" rIns="45720" bIns="45720" numCol="1" spcCol="1270" anchor="t" anchorCtr="0">
-          <a:noAutofit/>
-        </a:bodyPr>
-        <a:lstStyle/>
-        <a:p>
-          <a:pPr lvl="0" algn="l" defTabSz="533400">
-            <a:lnSpc>
-              <a:spcPct val="90000"/>
-            </a:lnSpc>
-            <a:spcBef>
-              <a:spcPct val="0"/>
-            </a:spcBef>
-            <a:spcAft>
-              <a:spcPct val="35000"/>
-            </a:spcAft>
-          </a:pPr>
-          <a:r>
-            <a:rPr lang="en-GB" sz="1200" kern="1200" dirty="0" smtClean="0"/>
-            <a:t>Molecule 192</a:t>
-          </a:r>
-          <a:endParaRPr lang="nl-NL" sz="1200" kern="1200" dirty="0"/>
-        </a:p>
-      </dsp:txBody>
-      <dsp:txXfrm>
-        <a:off x="0" y="267643"/>
-        <a:ext cx="1354183" cy="267415"/>
-      </dsp:txXfrm>
-    </dsp:sp>
-    <dsp:sp modelId="{7762E45A-D92B-4217-AAEB-09D39F4615D0}">
-      <dsp:nvSpPr>
-        <dsp:cNvPr id="0" name=""/>
-        <dsp:cNvSpPr/>
-      </dsp:nvSpPr>
-      <dsp:spPr>
-        <a:xfrm>
-          <a:off x="0" y="535059"/>
-          <a:ext cx="1354183" cy="0"/>
-        </a:xfrm>
-        <a:prstGeom prst="line">
-          <a:avLst/>
-        </a:prstGeom>
-        <a:solidFill>
-          <a:schemeClr val="accent1">
-            <a:hueOff val="0"/>
-            <a:satOff val="0"/>
-            <a:lumOff val="0"/>
-            <a:alphaOff val="0"/>
-          </a:schemeClr>
-        </a:solidFill>
-        <a:ln w="25400" cap="flat" cmpd="sng" algn="ctr">
-          <a:solidFill>
-            <a:schemeClr val="accent1">
-              <a:hueOff val="0"/>
-              <a:satOff val="0"/>
-              <a:lumOff val="0"/>
-              <a:alphaOff val="0"/>
-            </a:schemeClr>
-          </a:solidFill>
-          <a:prstDash val="solid"/>
-        </a:ln>
-        <a:effectLst/>
-      </dsp:spPr>
-      <dsp:style>
-        <a:lnRef idx="2">
-          <a:scrgbClr r="0" g="0" b="0"/>
-        </a:lnRef>
-        <a:fillRef idx="1">
-          <a:scrgbClr r="0" g="0" b="0"/>
-        </a:fillRef>
-        <a:effectRef idx="0">
-          <a:scrgbClr r="0" g="0" b="0"/>
-        </a:effectRef>
-        <a:fontRef idx="minor">
-          <a:schemeClr val="lt1"/>
-        </a:fontRef>
-      </dsp:style>
-    </dsp:sp>
-    <dsp:sp modelId="{26EE5A52-A089-41C3-9ABB-B002C72BB09D}">
-      <dsp:nvSpPr>
-        <dsp:cNvPr id="0" name=""/>
-        <dsp:cNvSpPr/>
-      </dsp:nvSpPr>
-      <dsp:spPr>
-        <a:xfrm>
-          <a:off x="0" y="535059"/>
-          <a:ext cx="1354183" cy="267415"/>
-        </a:xfrm>
-        <a:prstGeom prst="rect">
-          <a:avLst/>
-        </a:prstGeom>
-        <a:noFill/>
-        <a:ln>
-          <a:noFill/>
-        </a:ln>
-        <a:effectLst/>
-      </dsp:spPr>
-      <dsp:style>
-        <a:lnRef idx="0">
-          <a:scrgbClr r="0" g="0" b="0"/>
-        </a:lnRef>
-        <a:fillRef idx="0">
-          <a:scrgbClr r="0" g="0" b="0"/>
-        </a:fillRef>
-        <a:effectRef idx="0">
-          <a:scrgbClr r="0" g="0" b="0"/>
-        </a:effectRef>
-        <a:fontRef idx="minor"/>
-      </dsp:style>
-      <dsp:txBody>
-        <a:bodyPr spcFirstLastPara="0" vert="horz" wrap="square" lIns="45720" tIns="45720" rIns="45720" bIns="45720" numCol="1" spcCol="1270" anchor="t" anchorCtr="0">
-          <a:noAutofit/>
-        </a:bodyPr>
-        <a:lstStyle/>
-        <a:p>
-          <a:pPr lvl="0" algn="l" defTabSz="533400">
-            <a:lnSpc>
-              <a:spcPct val="90000"/>
-            </a:lnSpc>
-            <a:spcBef>
-              <a:spcPct val="0"/>
-            </a:spcBef>
-            <a:spcAft>
-              <a:spcPct val="35000"/>
-            </a:spcAft>
-          </a:pPr>
-          <a:r>
-            <a:rPr lang="en-GB" sz="1200" kern="1200" dirty="0" smtClean="0"/>
-            <a:t>Molecule 230</a:t>
-          </a:r>
-        </a:p>
-      </dsp:txBody>
-      <dsp:txXfrm>
-        <a:off x="0" y="535059"/>
-        <a:ext cx="1354183" cy="267415"/>
-      </dsp:txXfrm>
-    </dsp:sp>
-    <dsp:sp modelId="{96D669F9-91F0-438D-8BF6-1FF0D9BC90DC}">
-      <dsp:nvSpPr>
-        <dsp:cNvPr id="0" name=""/>
-        <dsp:cNvSpPr/>
-      </dsp:nvSpPr>
-      <dsp:spPr>
-        <a:xfrm>
-          <a:off x="0" y="802474"/>
-          <a:ext cx="1354183" cy="0"/>
-        </a:xfrm>
-        <a:prstGeom prst="line">
-          <a:avLst/>
-        </a:prstGeom>
-        <a:solidFill>
-          <a:schemeClr val="accent1">
-            <a:hueOff val="0"/>
-            <a:satOff val="0"/>
-            <a:lumOff val="0"/>
-            <a:alphaOff val="0"/>
-          </a:schemeClr>
-        </a:solidFill>
-        <a:ln w="25400" cap="flat" cmpd="sng" algn="ctr">
-          <a:solidFill>
-            <a:schemeClr val="accent1">
-              <a:hueOff val="0"/>
-              <a:satOff val="0"/>
-              <a:lumOff val="0"/>
-              <a:alphaOff val="0"/>
-            </a:schemeClr>
-          </a:solidFill>
-          <a:prstDash val="solid"/>
-        </a:ln>
-        <a:effectLst/>
-      </dsp:spPr>
-      <dsp:style>
-        <a:lnRef idx="2">
-          <a:scrgbClr r="0" g="0" b="0"/>
-        </a:lnRef>
-        <a:fillRef idx="1">
-          <a:scrgbClr r="0" g="0" b="0"/>
-        </a:fillRef>
-        <a:effectRef idx="0">
-          <a:scrgbClr r="0" g="0" b="0"/>
-        </a:effectRef>
-        <a:fontRef idx="minor">
-          <a:schemeClr val="lt1"/>
-        </a:fontRef>
-      </dsp:style>
-    </dsp:sp>
-    <dsp:sp modelId="{2EED3635-6D7F-45AE-A400-312687E452CB}">
-      <dsp:nvSpPr>
-        <dsp:cNvPr id="0" name=""/>
-        <dsp:cNvSpPr/>
-      </dsp:nvSpPr>
-      <dsp:spPr>
-        <a:xfrm>
-          <a:off x="0" y="802474"/>
-          <a:ext cx="1354183" cy="267415"/>
-        </a:xfrm>
-        <a:prstGeom prst="rect">
-          <a:avLst/>
-        </a:prstGeom>
-        <a:noFill/>
-        <a:ln>
-          <a:noFill/>
-        </a:ln>
-        <a:effectLst/>
-      </dsp:spPr>
-      <dsp:style>
-        <a:lnRef idx="0">
-          <a:scrgbClr r="0" g="0" b="0"/>
-        </a:lnRef>
-        <a:fillRef idx="0">
-          <a:scrgbClr r="0" g="0" b="0"/>
-        </a:fillRef>
-        <a:effectRef idx="0">
-          <a:scrgbClr r="0" g="0" b="0"/>
-        </a:effectRef>
-        <a:fontRef idx="minor"/>
-      </dsp:style>
-      <dsp:txBody>
-        <a:bodyPr spcFirstLastPara="0" vert="horz" wrap="square" lIns="45720" tIns="45720" rIns="45720" bIns="45720" numCol="1" spcCol="1270" anchor="t" anchorCtr="0">
-          <a:noAutofit/>
-        </a:bodyPr>
-        <a:lstStyle/>
-        <a:p>
-          <a:pPr lvl="0" algn="l" defTabSz="533400">
-            <a:lnSpc>
-              <a:spcPct val="90000"/>
-            </a:lnSpc>
-            <a:spcBef>
-              <a:spcPct val="0"/>
-            </a:spcBef>
-            <a:spcAft>
-              <a:spcPct val="35000"/>
-            </a:spcAft>
-          </a:pPr>
-          <a:r>
-            <a:rPr lang="en-GB" sz="1200" kern="1200" dirty="0" smtClean="0"/>
-            <a:t>H</a:t>
-          </a:r>
-          <a:r>
-            <a:rPr lang="en-GB" sz="1200" kern="1200" baseline="-25000" dirty="0" smtClean="0"/>
-            <a:t>2</a:t>
-          </a:r>
-          <a:r>
-            <a:rPr lang="en-GB" sz="1200" kern="1200" dirty="0" smtClean="0"/>
-            <a:t>O</a:t>
-          </a:r>
-        </a:p>
-      </dsp:txBody>
-      <dsp:txXfrm>
-        <a:off x="0" y="802474"/>
-        <a:ext cx="1354183" cy="267415"/>
-      </dsp:txXfrm>
-    </dsp:sp>
-    <dsp:sp modelId="{993AF19B-F4C0-4CCB-B8FD-6845959B2219}">
-      <dsp:nvSpPr>
-        <dsp:cNvPr id="0" name=""/>
-        <dsp:cNvSpPr/>
-      </dsp:nvSpPr>
-      <dsp:spPr>
-        <a:xfrm>
-          <a:off x="0" y="1069890"/>
-          <a:ext cx="1354183" cy="0"/>
-        </a:xfrm>
-        <a:prstGeom prst="line">
-          <a:avLst/>
-        </a:prstGeom>
-        <a:solidFill>
-          <a:schemeClr val="accent1">
-            <a:hueOff val="0"/>
-            <a:satOff val="0"/>
-            <a:lumOff val="0"/>
-            <a:alphaOff val="0"/>
-          </a:schemeClr>
-        </a:solidFill>
-        <a:ln w="25400" cap="flat" cmpd="sng" algn="ctr">
-          <a:solidFill>
-            <a:schemeClr val="accent1">
-              <a:hueOff val="0"/>
-              <a:satOff val="0"/>
-              <a:lumOff val="0"/>
-              <a:alphaOff val="0"/>
-            </a:schemeClr>
-          </a:solidFill>
-          <a:prstDash val="solid"/>
-        </a:ln>
-        <a:effectLst/>
-      </dsp:spPr>
-      <dsp:style>
-        <a:lnRef idx="2">
-          <a:scrgbClr r="0" g="0" b="0"/>
-        </a:lnRef>
-        <a:fillRef idx="1">
-          <a:scrgbClr r="0" g="0" b="0"/>
-        </a:fillRef>
-        <a:effectRef idx="0">
-          <a:scrgbClr r="0" g="0" b="0"/>
-        </a:effectRef>
-        <a:fontRef idx="minor">
-          <a:schemeClr val="lt1"/>
-        </a:fontRef>
-      </dsp:style>
-    </dsp:sp>
-    <dsp:sp modelId="{4835CB2F-D4E1-4DB7-8518-6B7E8BCAEE24}">
-      <dsp:nvSpPr>
-        <dsp:cNvPr id="0" name=""/>
-        <dsp:cNvSpPr/>
-      </dsp:nvSpPr>
-      <dsp:spPr>
-        <a:xfrm>
-          <a:off x="0" y="1069890"/>
-          <a:ext cx="1354183" cy="267415"/>
-        </a:xfrm>
-        <a:prstGeom prst="rect">
-          <a:avLst/>
-        </a:prstGeom>
-        <a:noFill/>
-        <a:ln>
-          <a:noFill/>
-        </a:ln>
-        <a:effectLst/>
-      </dsp:spPr>
-      <dsp:style>
-        <a:lnRef idx="0">
-          <a:scrgbClr r="0" g="0" b="0"/>
-        </a:lnRef>
-        <a:fillRef idx="0">
-          <a:scrgbClr r="0" g="0" b="0"/>
-        </a:fillRef>
-        <a:effectRef idx="0">
-          <a:scrgbClr r="0" g="0" b="0"/>
-        </a:effectRef>
-        <a:fontRef idx="minor"/>
-      </dsp:style>
-      <dsp:txBody>
-        <a:bodyPr spcFirstLastPara="0" vert="horz" wrap="square" lIns="45720" tIns="45720" rIns="45720" bIns="45720" numCol="1" spcCol="1270" anchor="t" anchorCtr="0">
-          <a:noAutofit/>
-        </a:bodyPr>
-        <a:lstStyle/>
-        <a:p>
-          <a:pPr lvl="0" algn="l" defTabSz="533400">
-            <a:lnSpc>
-              <a:spcPct val="90000"/>
-            </a:lnSpc>
-            <a:spcBef>
-              <a:spcPct val="0"/>
-            </a:spcBef>
-            <a:spcAft>
-              <a:spcPct val="35000"/>
-            </a:spcAft>
-          </a:pPr>
-          <a:r>
-            <a:rPr lang="en-GB" sz="1200" kern="1200" dirty="0" smtClean="0"/>
-            <a:t>CO</a:t>
-          </a:r>
-          <a:r>
-            <a:rPr lang="en-GB" sz="1200" kern="1200" baseline="-25000" dirty="0" smtClean="0"/>
-            <a:t>2</a:t>
-          </a:r>
-        </a:p>
-      </dsp:txBody>
-      <dsp:txXfrm>
-        <a:off x="0" y="1069890"/>
-        <a:ext cx="1354183" cy="267415"/>
-      </dsp:txXfrm>
-    </dsp:sp>
-    <dsp:sp modelId="{F95E51AA-825F-49B7-A2EE-D5A68FF57A5A}">
-      <dsp:nvSpPr>
-        <dsp:cNvPr id="0" name=""/>
-        <dsp:cNvSpPr/>
-      </dsp:nvSpPr>
-      <dsp:spPr>
-        <a:xfrm>
-          <a:off x="0" y="1337305"/>
-          <a:ext cx="1354183" cy="0"/>
-        </a:xfrm>
-        <a:prstGeom prst="line">
-          <a:avLst/>
-        </a:prstGeom>
-        <a:solidFill>
-          <a:schemeClr val="accent1">
-            <a:hueOff val="0"/>
-            <a:satOff val="0"/>
-            <a:lumOff val="0"/>
-            <a:alphaOff val="0"/>
-          </a:schemeClr>
-        </a:solidFill>
-        <a:ln w="25400" cap="flat" cmpd="sng" algn="ctr">
-          <a:solidFill>
-            <a:schemeClr val="accent1">
-              <a:hueOff val="0"/>
-              <a:satOff val="0"/>
-              <a:lumOff val="0"/>
-              <a:alphaOff val="0"/>
-            </a:schemeClr>
-          </a:solidFill>
-          <a:prstDash val="solid"/>
-        </a:ln>
-        <a:effectLst/>
-      </dsp:spPr>
-      <dsp:style>
-        <a:lnRef idx="2">
-          <a:scrgbClr r="0" g="0" b="0"/>
-        </a:lnRef>
-        <a:fillRef idx="1">
-          <a:scrgbClr r="0" g="0" b="0"/>
-        </a:fillRef>
-        <a:effectRef idx="0">
-          <a:scrgbClr r="0" g="0" b="0"/>
-        </a:effectRef>
-        <a:fontRef idx="minor">
-          <a:schemeClr val="lt1"/>
-        </a:fontRef>
-      </dsp:style>
-    </dsp:sp>
-    <dsp:sp modelId="{10281058-9C13-4E40-8138-DEE1B55F1E71}">
-      <dsp:nvSpPr>
-        <dsp:cNvPr id="0" name=""/>
-        <dsp:cNvSpPr/>
-      </dsp:nvSpPr>
-      <dsp:spPr>
-        <a:xfrm>
-          <a:off x="0" y="1337305"/>
-          <a:ext cx="1354183" cy="267415"/>
-        </a:xfrm>
-        <a:prstGeom prst="rect">
-          <a:avLst/>
-        </a:prstGeom>
-        <a:noFill/>
-        <a:ln>
-          <a:noFill/>
-        </a:ln>
-        <a:effectLst/>
-      </dsp:spPr>
-      <dsp:style>
-        <a:lnRef idx="0">
-          <a:scrgbClr r="0" g="0" b="0"/>
-        </a:lnRef>
-        <a:fillRef idx="0">
-          <a:scrgbClr r="0" g="0" b="0"/>
-        </a:fillRef>
-        <a:effectRef idx="0">
-          <a:scrgbClr r="0" g="0" b="0"/>
-        </a:effectRef>
-        <a:fontRef idx="minor"/>
-      </dsp:style>
-      <dsp:txBody>
-        <a:bodyPr spcFirstLastPara="0" vert="horz" wrap="square" lIns="45720" tIns="45720" rIns="45720" bIns="45720" numCol="1" spcCol="1270" anchor="t" anchorCtr="0">
-          <a:noAutofit/>
-        </a:bodyPr>
-        <a:lstStyle/>
-        <a:p>
-          <a:pPr lvl="0" algn="l" defTabSz="533400">
-            <a:lnSpc>
-              <a:spcPct val="90000"/>
-            </a:lnSpc>
-            <a:spcBef>
-              <a:spcPct val="0"/>
-            </a:spcBef>
-            <a:spcAft>
-              <a:spcPct val="35000"/>
-            </a:spcAft>
-          </a:pPr>
-          <a:r>
-            <a:rPr lang="en-GB" sz="1200" kern="1200" baseline="-25000" dirty="0" smtClean="0"/>
-            <a:t>…</a:t>
-          </a:r>
-        </a:p>
-      </dsp:txBody>
-      <dsp:txXfrm>
-        <a:off x="0" y="1337305"/>
-        <a:ext cx="1354183" cy="267415"/>
-      </dsp:txXfrm>
-    </dsp:sp>
-    <dsp:sp modelId="{0A629F62-9828-42EE-80FE-80D77846B07B}">
-      <dsp:nvSpPr>
-        <dsp:cNvPr id="0" name=""/>
-        <dsp:cNvSpPr/>
-      </dsp:nvSpPr>
-      <dsp:spPr>
-        <a:xfrm>
-          <a:off x="0" y="1604721"/>
-          <a:ext cx="1354183" cy="0"/>
-        </a:xfrm>
-        <a:prstGeom prst="line">
-          <a:avLst/>
-        </a:prstGeom>
-        <a:solidFill>
-          <a:schemeClr val="accent1">
-            <a:hueOff val="0"/>
-            <a:satOff val="0"/>
-            <a:lumOff val="0"/>
-            <a:alphaOff val="0"/>
-          </a:schemeClr>
-        </a:solidFill>
-        <a:ln w="25400" cap="flat" cmpd="sng" algn="ctr">
-          <a:solidFill>
-            <a:schemeClr val="accent1">
-              <a:hueOff val="0"/>
-              <a:satOff val="0"/>
-              <a:lumOff val="0"/>
-              <a:alphaOff val="0"/>
-            </a:schemeClr>
-          </a:solidFill>
-          <a:prstDash val="solid"/>
-        </a:ln>
-        <a:effectLst/>
-      </dsp:spPr>
-      <dsp:style>
-        <a:lnRef idx="2">
-          <a:scrgbClr r="0" g="0" b="0"/>
-        </a:lnRef>
-        <a:fillRef idx="1">
-          <a:scrgbClr r="0" g="0" b="0"/>
-        </a:fillRef>
-        <a:effectRef idx="0">
-          <a:scrgbClr r="0" g="0" b="0"/>
-        </a:effectRef>
-        <a:fontRef idx="minor">
-          <a:schemeClr val="lt1"/>
-        </a:fontRef>
-      </dsp:style>
-    </dsp:sp>
-    <dsp:sp modelId="{642D9065-24BD-490E-ACB9-43EA48A5275E}">
-      <dsp:nvSpPr>
-        <dsp:cNvPr id="0" name=""/>
-        <dsp:cNvSpPr/>
-      </dsp:nvSpPr>
-      <dsp:spPr>
-        <a:xfrm>
-          <a:off x="0" y="1604721"/>
-          <a:ext cx="1354183" cy="267415"/>
-        </a:xfrm>
-        <a:prstGeom prst="rect">
-          <a:avLst/>
-        </a:prstGeom>
-        <a:noFill/>
-        <a:ln>
-          <a:noFill/>
-        </a:ln>
-        <a:effectLst/>
-      </dsp:spPr>
-      <dsp:style>
-        <a:lnRef idx="0">
-          <a:scrgbClr r="0" g="0" b="0"/>
-        </a:lnRef>
-        <a:fillRef idx="0">
-          <a:scrgbClr r="0" g="0" b="0"/>
-        </a:fillRef>
-        <a:effectRef idx="0">
-          <a:scrgbClr r="0" g="0" b="0"/>
-        </a:effectRef>
-        <a:fontRef idx="minor"/>
-      </dsp:style>
-      <dsp:txBody>
-        <a:bodyPr spcFirstLastPara="0" vert="horz" wrap="square" lIns="45720" tIns="45720" rIns="45720" bIns="45720" numCol="1" spcCol="1270" anchor="t" anchorCtr="0">
-          <a:noAutofit/>
-        </a:bodyPr>
-        <a:lstStyle/>
-        <a:p>
-          <a:pPr lvl="0" algn="l" defTabSz="533400">
-            <a:lnSpc>
-              <a:spcPct val="90000"/>
-            </a:lnSpc>
-            <a:spcBef>
-              <a:spcPct val="0"/>
-            </a:spcBef>
-            <a:spcAft>
-              <a:spcPct val="35000"/>
-            </a:spcAft>
-          </a:pPr>
-          <a:r>
-            <a:rPr lang="en-GB" sz="1200" kern="1200" dirty="0" smtClean="0"/>
-            <a:t>Ethanol</a:t>
-          </a:r>
-        </a:p>
-      </dsp:txBody>
-      <dsp:txXfrm>
-        <a:off x="0" y="1604721"/>
-        <a:ext cx="1354183" cy="267415"/>
-      </dsp:txXfrm>
-    </dsp:sp>
   </dsp:spTree>
 </dsp:drawing>
 </file>
@@ -14616,7 +13846,7 @@
           <a:p>
             <a:fld id="{65607776-32A9-4E15-B814-B319972CFFFE}" type="datetimeFigureOut">
               <a:rPr lang="nl-NL" smtClean="0"/>
-              <a:t>7-1-2015</a:t>
+              <a:t>20-1-2015</a:t>
             </a:fld>
             <a:endParaRPr lang="nl-NL"/>
           </a:p>
@@ -15162,11 +14392,7 @@
           <a:p>
             <a:r>
               <a:rPr lang="en-GB" dirty="0" smtClean="0"/>
-              <a:t>Nonlinear least-squares </a:t>
-            </a:r>
-            <a:r>
-              <a:rPr lang="en-GB" dirty="0" smtClean="0"/>
-              <a:t>regression</a:t>
+              <a:t>Nonlinear least-squares regression</a:t>
             </a:r>
             <a:r>
               <a:rPr lang="en-GB" smtClean="0"/>
@@ -15564,7 +14790,26 @@
           <a:p>
             <a:r>
               <a:rPr lang="en-GB" dirty="0" smtClean="0"/>
-              <a:t>Signals -&gt; Absorbance</a:t>
+              <a:t>LEAVE TABLE AS IT IS,</a:t>
+            </a:r>
+            <a:r>
+              <a:rPr lang="en-GB" baseline="0" dirty="0" smtClean="0"/>
+              <a:t> INTRODUCING THE v’ to show the different wavenumbers (due to piëzo) makes it too complicated for </a:t>
+            </a:r>
+            <a:r>
+              <a:rPr lang="en-GB" baseline="0" smtClean="0"/>
+              <a:t>the presentation.</a:t>
+            </a:r>
+            <a:endParaRPr lang="en-GB" dirty="0" smtClean="0"/>
+          </a:p>
+          <a:p>
+            <a:r>
+              <a:rPr lang="en-GB" dirty="0" smtClean="0"/>
+              <a:t>Signals </a:t>
+            </a:r>
+            <a:r>
+              <a:rPr lang="en-GB" dirty="0" smtClean="0"/>
+              <a:t>-&gt; Absorbance</a:t>
             </a:r>
             <a:endParaRPr lang="nl-NL" dirty="0"/>
           </a:p>
@@ -16402,7 +15647,7 @@
           <a:p>
             <a:fld id="{4088EF54-C641-44F0-83F7-2E2A8BF04AC9}" type="datetimeFigureOut">
               <a:rPr lang="nl-NL" smtClean="0"/>
-              <a:t>7-1-2015</a:t>
+              <a:t>20-1-2015</a:t>
             </a:fld>
             <a:endParaRPr lang="nl-NL"/>
           </a:p>
@@ -17035,7 +16280,7 @@
           <a:p>
             <a:fld id="{4088EF54-C641-44F0-83F7-2E2A8BF04AC9}" type="datetimeFigureOut">
               <a:rPr lang="nl-NL" smtClean="0"/>
-              <a:t>7-1-2015</a:t>
+              <a:t>20-1-2015</a:t>
             </a:fld>
             <a:endParaRPr lang="nl-NL"/>
           </a:p>
@@ -17312,7 +16557,7 @@
           <a:p>
             <a:fld id="{4088EF54-C641-44F0-83F7-2E2A8BF04AC9}" type="datetimeFigureOut">
               <a:rPr lang="nl-NL" smtClean="0"/>
-              <a:t>7-1-2015</a:t>
+              <a:t>20-1-2015</a:t>
             </a:fld>
             <a:endParaRPr lang="nl-NL"/>
           </a:p>
@@ -17477,7 +16722,7 @@
           <a:p>
             <a:fld id="{4088EF54-C641-44F0-83F7-2E2A8BF04AC9}" type="datetimeFigureOut">
               <a:rPr lang="nl-NL" smtClean="0"/>
-              <a:t>7-1-2015</a:t>
+              <a:t>20-1-2015</a:t>
             </a:fld>
             <a:endParaRPr lang="nl-NL"/>
           </a:p>
@@ -17658,7 +16903,7 @@
           <a:p>
             <a:fld id="{4088EF54-C641-44F0-83F7-2E2A8BF04AC9}" type="datetimeFigureOut">
               <a:rPr lang="nl-NL" smtClean="0"/>
-              <a:t>7-1-2015</a:t>
+              <a:t>20-1-2015</a:t>
             </a:fld>
             <a:endParaRPr lang="nl-NL"/>
           </a:p>
@@ -18303,7 +17548,7 @@
           <a:p>
             <a:fld id="{4088EF54-C641-44F0-83F7-2E2A8BF04AC9}" type="datetimeFigureOut">
               <a:rPr lang="nl-NL" smtClean="0"/>
-              <a:t>7-1-2015</a:t>
+              <a:t>20-1-2015</a:t>
             </a:fld>
             <a:endParaRPr lang="nl-NL"/>
           </a:p>
@@ -18729,7 +17974,7 @@
           <a:p>
             <a:fld id="{4088EF54-C641-44F0-83F7-2E2A8BF04AC9}" type="datetimeFigureOut">
               <a:rPr lang="nl-NL" smtClean="0"/>
-              <a:t>7-1-2015</a:t>
+              <a:t>20-1-2015</a:t>
             </a:fld>
             <a:endParaRPr lang="nl-NL"/>
           </a:p>
@@ -18842,7 +18087,7 @@
           <a:p>
             <a:fld id="{4088EF54-C641-44F0-83F7-2E2A8BF04AC9}" type="datetimeFigureOut">
               <a:rPr lang="nl-NL" smtClean="0"/>
-              <a:t>7-1-2015</a:t>
+              <a:t>20-1-2015</a:t>
             </a:fld>
             <a:endParaRPr lang="nl-NL"/>
           </a:p>
@@ -19023,7 +18268,7 @@
           <a:p>
             <a:fld id="{4088EF54-C641-44F0-83F7-2E2A8BF04AC9}" type="datetimeFigureOut">
               <a:rPr lang="nl-NL" smtClean="0"/>
-              <a:t>7-1-2015</a:t>
+              <a:t>20-1-2015</a:t>
             </a:fld>
             <a:endParaRPr lang="nl-NL"/>
           </a:p>
@@ -19289,7 +18534,7 @@
           <a:p>
             <a:fld id="{4088EF54-C641-44F0-83F7-2E2A8BF04AC9}" type="datetimeFigureOut">
               <a:rPr lang="nl-NL" smtClean="0"/>
-              <a:t>7-1-2015</a:t>
+              <a:t>20-1-2015</a:t>
             </a:fld>
             <a:endParaRPr lang="nl-NL"/>
           </a:p>
@@ -19759,7 +19004,7 @@
           <a:p>
             <a:fld id="{4088EF54-C641-44F0-83F7-2E2A8BF04AC9}" type="datetimeFigureOut">
               <a:rPr lang="nl-NL" smtClean="0"/>
-              <a:t>7-1-2015</a:t>
+              <a:t>20-1-2015</a:t>
             </a:fld>
             <a:endParaRPr lang="nl-NL"/>
           </a:p>
@@ -20319,7 +19564,7 @@
           <a:p>
             <a:fld id="{4088EF54-C641-44F0-83F7-2E2A8BF04AC9}" type="datetimeFigureOut">
               <a:rPr lang="nl-NL" smtClean="0"/>
-              <a:t>7-1-2015</a:t>
+              <a:t>20-1-2015</a:t>
             </a:fld>
             <a:endParaRPr lang="nl-NL"/>
           </a:p>
@@ -24678,8 +23923,8 @@
           </a:p>
         </p:txBody>
       </p:sp>
-      <mc:AlternateContent xmlns:mc="http://schemas.openxmlformats.org/markup-compatibility/2006">
-        <mc:Choice xmlns:a14="http://schemas.microsoft.com/office/drawing/2010/main" Requires="a14">
+      <mc:AlternateContent xmlns:mc="http://schemas.openxmlformats.org/markup-compatibility/2006" xmlns:a14="http://schemas.microsoft.com/office/drawing/2010/main">
+        <mc:Choice Requires="a14">
           <p:sp>
             <p:nvSpPr>
               <p:cNvPr id="18" name="TextBox 17"/>
@@ -25054,7 +24299,7 @@
             </p:txBody>
           </p:sp>
         </mc:Choice>
-        <mc:Fallback>
+        <mc:Fallback xmlns="">
           <p:sp>
             <p:nvSpPr>
               <p:cNvPr id="18" name="TextBox 17"/>
@@ -25093,8 +24338,8 @@
           </p:sp>
         </mc:Fallback>
       </mc:AlternateContent>
-      <mc:AlternateContent xmlns:mc="http://schemas.openxmlformats.org/markup-compatibility/2006">
-        <mc:Choice xmlns:a14="http://schemas.microsoft.com/office/drawing/2010/main" Requires="a14">
+      <mc:AlternateContent xmlns:mc="http://schemas.openxmlformats.org/markup-compatibility/2006" xmlns:a14="http://schemas.microsoft.com/office/drawing/2010/main">
+        <mc:Choice Requires="a14">
           <p:sp>
             <p:nvSpPr>
               <p:cNvPr id="5" name="Rectangle 4"/>
@@ -25400,7 +24645,7 @@
             </p:txBody>
           </p:sp>
         </mc:Choice>
-        <mc:Fallback>
+        <mc:Fallback xmlns="">
           <p:sp>
             <p:nvSpPr>
               <p:cNvPr id="5" name="Rectangle 4"/>
@@ -28881,14 +28126,14 @@
           <p:nvPr>
             <p:extLst>
               <p:ext uri="{D42A27DB-BD31-4B8C-83A1-F6EECF244321}">
-                <p14:modId xmlns:p14="http://schemas.microsoft.com/office/powerpoint/2010/main" val="2032061918"/>
+                <p14:modId xmlns:p14="http://schemas.microsoft.com/office/powerpoint/2010/main" val="430461793"/>
               </p:ext>
             </p:extLst>
           </p:nvPr>
         </p:nvGraphicFramePr>
         <p:xfrm>
           <a:off x="1298532" y="2038372"/>
-          <a:ext cx="6573079" cy="1152129"/>
+          <a:ext cx="7017884" cy="1152129"/>
         </p:xfrm>
         <a:graphic>
           <a:graphicData uri="http://schemas.openxmlformats.org/drawingml/2006/table">
@@ -28898,8 +28143,8 @@
               </a:tblPr>
               <a:tblGrid>
                 <a:gridCol w="2136237"/>
-                <a:gridCol w="2300605"/>
-                <a:gridCol w="2136237"/>
+                <a:gridCol w="2505383"/>
+                <a:gridCol w="2376264"/>
               </a:tblGrid>
               <a:tr h="384043">
                 <a:tc>
@@ -29110,14 +28355,14 @@
         </p:nvGrpSpPr>
         <p:grpSpPr>
           <a:xfrm>
-            <a:off x="3448381" y="2398412"/>
-            <a:ext cx="4317750" cy="789360"/>
-            <a:chOff x="3287428" y="5085184"/>
-            <a:chExt cx="4317750" cy="789360"/>
+            <a:off x="3376372" y="2396803"/>
+            <a:ext cx="4868036" cy="790969"/>
+            <a:chOff x="3215419" y="5083575"/>
+            <a:chExt cx="4389759" cy="790969"/>
           </a:xfrm>
         </p:grpSpPr>
-        <mc:AlternateContent xmlns:mc="http://schemas.openxmlformats.org/markup-compatibility/2006" xmlns:a14="http://schemas.microsoft.com/office/drawing/2010/main">
-          <mc:Choice Requires="a14">
+        <mc:AlternateContent xmlns:mc="http://schemas.openxmlformats.org/markup-compatibility/2006">
+          <mc:Choice xmlns:a14="http://schemas.microsoft.com/office/drawing/2010/main" Requires="a14">
             <p:sp>
               <p:nvSpPr>
                 <p:cNvPr id="16" name="TextBox 15"/>
@@ -29126,7 +28371,7 @@
               </p:nvSpPr>
               <p:spPr>
                 <a:xfrm>
-                  <a:off x="3287428" y="5085184"/>
+                  <a:off x="3215419" y="5083575"/>
                   <a:ext cx="2159579" cy="388889"/>
                 </a:xfrm>
                 <a:prstGeom prst="rect">
@@ -29272,7 +28517,7 @@
               </p:txBody>
             </p:sp>
           </mc:Choice>
-          <mc:Fallback xmlns="">
+          <mc:Fallback>
             <p:sp>
               <p:nvSpPr>
                 <p:cNvPr id="16" name="TextBox 15"/>
@@ -29283,16 +28528,16 @@
               </p:nvSpPr>
               <p:spPr>
                 <a:xfrm>
-                  <a:off x="3287428" y="5085184"/>
+                  <a:off x="3215419" y="5083575"/>
                   <a:ext cx="2159579" cy="388889"/>
                 </a:xfrm>
                 <a:prstGeom prst="rect">
                   <a:avLst/>
                 </a:prstGeom>
-                <a:blipFill rotWithShape="1">
+                <a:blipFill rotWithShape="0">
                   <a:blip r:embed="rId4"/>
                   <a:stretch>
-                    <a:fillRect b="-7813"/>
+                    <a:fillRect b="-9375"/>
                   </a:stretch>
                 </a:blipFill>
               </p:spPr>
@@ -29301,7 +28546,7 @@
                 <a:lstStyle/>
                 <a:p>
                   <a:r>
-                    <a:rPr lang="nl-NL">
+                    <a:rPr lang="en-US">
                       <a:noFill/>
                     </a:rPr>
                     <a:t> </a:t>
@@ -29311,8 +28556,8 @@
             </p:sp>
           </mc:Fallback>
         </mc:AlternateContent>
-        <mc:AlternateContent xmlns:mc="http://schemas.openxmlformats.org/markup-compatibility/2006" xmlns:a14="http://schemas.microsoft.com/office/drawing/2010/main">
-          <mc:Choice Requires="a14">
+        <mc:AlternateContent xmlns:mc="http://schemas.openxmlformats.org/markup-compatibility/2006">
+          <mc:Choice xmlns:a14="http://schemas.microsoft.com/office/drawing/2010/main" Requires="a14">
             <p:sp>
               <p:nvSpPr>
                 <p:cNvPr id="17" name="TextBox 16"/>
@@ -29424,7 +28669,7 @@
               </p:txBody>
             </p:sp>
           </mc:Choice>
-          <mc:Fallback xmlns="">
+          <mc:Fallback>
             <p:sp>
               <p:nvSpPr>
                 <p:cNvPr id="17" name="TextBox 16"/>
@@ -29441,10 +28686,10 @@
                 <a:prstGeom prst="rect">
                   <a:avLst/>
                 </a:prstGeom>
-                <a:blipFill rotWithShape="1">
+                <a:blipFill rotWithShape="0">
                   <a:blip r:embed="rId5"/>
                   <a:stretch>
-                    <a:fillRect b="-7813"/>
+                    <a:fillRect b="-9375"/>
                   </a:stretch>
                 </a:blipFill>
               </p:spPr>
@@ -29453,7 +28698,7 @@
                 <a:lstStyle/>
                 <a:p>
                   <a:r>
-                    <a:rPr lang="nl-NL">
+                    <a:rPr lang="en-US">
                       <a:noFill/>
                     </a:rPr>
                     <a:t> </a:t>
@@ -29463,8 +28708,8 @@
             </p:sp>
           </mc:Fallback>
         </mc:AlternateContent>
-        <mc:AlternateContent xmlns:mc="http://schemas.openxmlformats.org/markup-compatibility/2006" xmlns:a14="http://schemas.microsoft.com/office/drawing/2010/main">
-          <mc:Choice Requires="a14">
+        <mc:AlternateContent xmlns:mc="http://schemas.openxmlformats.org/markup-compatibility/2006">
+          <mc:Choice xmlns:a14="http://schemas.microsoft.com/office/drawing/2010/main" Requires="a14">
             <p:sp>
               <p:nvSpPr>
                 <p:cNvPr id="18" name="TextBox 17"/>
@@ -29576,7 +28821,7 @@
               </p:txBody>
             </p:sp>
           </mc:Choice>
-          <mc:Fallback xmlns="">
+          <mc:Fallback>
             <p:sp>
               <p:nvSpPr>
                 <p:cNvPr id="18" name="TextBox 17"/>
@@ -29593,7 +28838,7 @@
                 <a:prstGeom prst="rect">
                   <a:avLst/>
                 </a:prstGeom>
-                <a:blipFill rotWithShape="1">
+                <a:blipFill rotWithShape="0">
                   <a:blip r:embed="rId6"/>
                   <a:stretch>
                     <a:fillRect b="-9524"/>
@@ -29605,7 +28850,7 @@
                 <a:lstStyle/>
                 <a:p>
                   <a:r>
-                    <a:rPr lang="nl-NL">
+                    <a:rPr lang="en-US">
                       <a:noFill/>
                     </a:rPr>
                     <a:t> </a:t>
@@ -29615,8 +28860,8 @@
             </p:sp>
           </mc:Fallback>
         </mc:AlternateContent>
-        <mc:AlternateContent xmlns:mc="http://schemas.openxmlformats.org/markup-compatibility/2006" xmlns:a14="http://schemas.microsoft.com/office/drawing/2010/main">
-          <mc:Choice Requires="a14">
+        <mc:AlternateContent xmlns:mc="http://schemas.openxmlformats.org/markup-compatibility/2006">
+          <mc:Choice xmlns:a14="http://schemas.microsoft.com/office/drawing/2010/main" Requires="a14">
             <p:sp>
               <p:nvSpPr>
                 <p:cNvPr id="19" name="TextBox 18"/>
@@ -29728,7 +28973,7 @@
               </p:txBody>
             </p:sp>
           </mc:Choice>
-          <mc:Fallback xmlns="">
+          <mc:Fallback>
             <p:sp>
               <p:nvSpPr>
                 <p:cNvPr id="19" name="TextBox 18"/>
@@ -29745,10 +28990,10 @@
                 <a:prstGeom prst="rect">
                   <a:avLst/>
                 </a:prstGeom>
-                <a:blipFill rotWithShape="1">
+                <a:blipFill rotWithShape="0">
                   <a:blip r:embed="rId7"/>
                   <a:stretch>
-                    <a:fillRect b="-7813"/>
+                    <a:fillRect b="-9375"/>
                   </a:stretch>
                 </a:blipFill>
               </p:spPr>
@@ -29757,7 +29002,7 @@
                 <a:lstStyle/>
                 <a:p>
                   <a:r>
-                    <a:rPr lang="nl-NL">
+                    <a:rPr lang="en-US">
                       <a:noFill/>
                     </a:rPr>
                     <a:t> </a:t>

</xml_diff>